<commit_message>
index and pptx file modify
</commit_message>
<xml_diff>
--- a/js 1st class slide - part 01 .pptx
+++ b/js 1st class slide - part 01 .pptx
@@ -20,6 +20,9 @@
     <p:sldId id="267" r:id="rId14"/>
     <p:sldId id="268" r:id="rId15"/>
     <p:sldId id="269" r:id="rId16"/>
+    <p:sldId id="271" r:id="rId17"/>
+    <p:sldId id="272" r:id="rId18"/>
+    <p:sldId id="273" r:id="rId19"/>
   </p:sldIdLst>
   <p:sldSz cx="12192000" cy="6858000"/>
   <p:notesSz cx="6858000" cy="9144000"/>
@@ -142,6 +145,9 @@
             <p14:sldId id="267"/>
             <p14:sldId id="268"/>
             <p14:sldId id="269"/>
+            <p14:sldId id="271"/>
+            <p14:sldId id="272"/>
+            <p14:sldId id="273"/>
           </p14:sldIdLst>
         </p14:section>
       </p14:sectionLst>
@@ -300,7 +306,7 @@
           <a:p>
             <a:fld id="{76439928-7ED9-495B-BAD6-CC71D17435BF}" type="datetimeFigureOut">
               <a:rPr lang="en-US" smtClean="0"/>
-              <a:t>12/28/2022</a:t>
+              <a:t>12/29/2022</a:t>
             </a:fld>
             <a:endParaRPr lang="en-US"/>
           </a:p>
@@ -498,7 +504,7 @@
           <a:p>
             <a:fld id="{76439928-7ED9-495B-BAD6-CC71D17435BF}" type="datetimeFigureOut">
               <a:rPr lang="en-US" smtClean="0"/>
-              <a:t>12/28/2022</a:t>
+              <a:t>12/29/2022</a:t>
             </a:fld>
             <a:endParaRPr lang="en-US"/>
           </a:p>
@@ -706,7 +712,7 @@
           <a:p>
             <a:fld id="{76439928-7ED9-495B-BAD6-CC71D17435BF}" type="datetimeFigureOut">
               <a:rPr lang="en-US" smtClean="0"/>
-              <a:t>12/28/2022</a:t>
+              <a:t>12/29/2022</a:t>
             </a:fld>
             <a:endParaRPr lang="en-US"/>
           </a:p>
@@ -904,7 +910,7 @@
           <a:p>
             <a:fld id="{76439928-7ED9-495B-BAD6-CC71D17435BF}" type="datetimeFigureOut">
               <a:rPr lang="en-US" smtClean="0"/>
-              <a:t>12/28/2022</a:t>
+              <a:t>12/29/2022</a:t>
             </a:fld>
             <a:endParaRPr lang="en-US"/>
           </a:p>
@@ -1179,7 +1185,7 @@
           <a:p>
             <a:fld id="{76439928-7ED9-495B-BAD6-CC71D17435BF}" type="datetimeFigureOut">
               <a:rPr lang="en-US" smtClean="0"/>
-              <a:t>12/28/2022</a:t>
+              <a:t>12/29/2022</a:t>
             </a:fld>
             <a:endParaRPr lang="en-US"/>
           </a:p>
@@ -1444,7 +1450,7 @@
           <a:p>
             <a:fld id="{76439928-7ED9-495B-BAD6-CC71D17435BF}" type="datetimeFigureOut">
               <a:rPr lang="en-US" smtClean="0"/>
-              <a:t>12/28/2022</a:t>
+              <a:t>12/29/2022</a:t>
             </a:fld>
             <a:endParaRPr lang="en-US"/>
           </a:p>
@@ -1856,7 +1862,7 @@
           <a:p>
             <a:fld id="{76439928-7ED9-495B-BAD6-CC71D17435BF}" type="datetimeFigureOut">
               <a:rPr lang="en-US" smtClean="0"/>
-              <a:t>12/28/2022</a:t>
+              <a:t>12/29/2022</a:t>
             </a:fld>
             <a:endParaRPr lang="en-US"/>
           </a:p>
@@ -1997,7 +2003,7 @@
           <a:p>
             <a:fld id="{76439928-7ED9-495B-BAD6-CC71D17435BF}" type="datetimeFigureOut">
               <a:rPr lang="en-US" smtClean="0"/>
-              <a:t>12/28/2022</a:t>
+              <a:t>12/29/2022</a:t>
             </a:fld>
             <a:endParaRPr lang="en-US"/>
           </a:p>
@@ -2110,7 +2116,7 @@
           <a:p>
             <a:fld id="{76439928-7ED9-495B-BAD6-CC71D17435BF}" type="datetimeFigureOut">
               <a:rPr lang="en-US" smtClean="0"/>
-              <a:t>12/28/2022</a:t>
+              <a:t>12/29/2022</a:t>
             </a:fld>
             <a:endParaRPr lang="en-US"/>
           </a:p>
@@ -2421,7 +2427,7 @@
           <a:p>
             <a:fld id="{76439928-7ED9-495B-BAD6-CC71D17435BF}" type="datetimeFigureOut">
               <a:rPr lang="en-US" smtClean="0"/>
-              <a:t>12/28/2022</a:t>
+              <a:t>12/29/2022</a:t>
             </a:fld>
             <a:endParaRPr lang="en-US"/>
           </a:p>
@@ -2709,7 +2715,7 @@
           <a:p>
             <a:fld id="{76439928-7ED9-495B-BAD6-CC71D17435BF}" type="datetimeFigureOut">
               <a:rPr lang="en-US" smtClean="0"/>
-              <a:t>12/28/2022</a:t>
+              <a:t>12/29/2022</a:t>
             </a:fld>
             <a:endParaRPr lang="en-US"/>
           </a:p>
@@ -2950,7 +2956,7 @@
           <a:p>
             <a:fld id="{76439928-7ED9-495B-BAD6-CC71D17435BF}" type="datetimeFigureOut">
               <a:rPr lang="en-US" smtClean="0"/>
-              <a:t>12/28/2022</a:t>
+              <a:t>12/29/2022</a:t>
             </a:fld>
             <a:endParaRPr lang="en-US"/>
           </a:p>
@@ -3974,7 +3980,7 @@
               <a:rPr lang="en-US" b="1" dirty="0">
                 <a:latin typeface="+mn-lt"/>
               </a:rPr>
-              <a:t>Day 02 </a:t>
+              <a:t>Day 03 </a:t>
             </a:r>
           </a:p>
         </p:txBody>
@@ -4061,32 +4067,39 @@
             <p:ph type="title"/>
           </p:nvPr>
         </p:nvSpPr>
-        <p:spPr/>
-        <p:txBody>
-          <a:bodyPr/>
+        <p:spPr>
+          <a:xfrm>
+            <a:off x="1676400" y="2651123"/>
+            <a:ext cx="10515600" cy="1325563"/>
+          </a:xfrm>
+        </p:spPr>
+        <p:txBody>
+          <a:bodyPr>
+            <a:normAutofit/>
+          </a:bodyPr>
           <a:lstStyle/>
           <a:p>
             <a:r>
-              <a:rPr lang="en-US" u="sng" dirty="0" err="1">
+              <a:rPr lang="en-US" sz="6600" u="sng" dirty="0" err="1">
                 <a:latin typeface="+mn-lt"/>
               </a:rPr>
-              <a:t>Js</a:t>
-            </a:r>
-            <a:r>
-              <a:rPr lang="en-US" u="sng" dirty="0">
+              <a:t>Javascript</a:t>
+            </a:r>
+            <a:r>
+              <a:rPr lang="en-US" sz="6600" u="sng" dirty="0">
                 <a:latin typeface="+mn-lt"/>
               </a:rPr>
-              <a:t> output </a:t>
+              <a:t> Data Type </a:t>
             </a:r>
           </a:p>
         </p:txBody>
       </p:sp>
       <p:pic>
         <p:nvPicPr>
-          <p:cNvPr id="6" name="Picture 5">
-            <a:extLst>
-              <a:ext uri="{FF2B5EF4-FFF2-40B4-BE49-F238E27FC236}">
-                <a16:creationId xmlns:a16="http://schemas.microsoft.com/office/drawing/2014/main" id="{24372CE4-41E2-6AED-41BD-3DFF68F0CC24}"/>
+          <p:cNvPr id="3" name="Picture 2">
+            <a:extLst>
+              <a:ext uri="{FF2B5EF4-FFF2-40B4-BE49-F238E27FC236}">
+                <a16:creationId xmlns:a16="http://schemas.microsoft.com/office/drawing/2014/main" id="{811980EE-25C8-0280-914E-0FF078A0A172}"/>
               </a:ext>
             </a:extLst>
           </p:cNvPr>
@@ -4096,37 +4109,7 @@
           <p:nvPr/>
         </p:nvPicPr>
         <p:blipFill>
-          <a:blip r:embed="rId2"/>
-          <a:stretch>
-            <a:fillRect/>
-          </a:stretch>
-        </p:blipFill>
-        <p:spPr>
-          <a:xfrm>
-            <a:off x="909098" y="1753925"/>
-            <a:ext cx="10225047" cy="2921442"/>
-          </a:xfrm>
-          <a:prstGeom prst="rect">
-            <a:avLst/>
-          </a:prstGeom>
-        </p:spPr>
-      </p:pic>
-      <p:pic>
-        <p:nvPicPr>
-          <p:cNvPr id="3" name="Picture 2">
-            <a:extLst>
-              <a:ext uri="{FF2B5EF4-FFF2-40B4-BE49-F238E27FC236}">
-                <a16:creationId xmlns:a16="http://schemas.microsoft.com/office/drawing/2014/main" id="{811980EE-25C8-0280-914E-0FF078A0A172}"/>
-              </a:ext>
-            </a:extLst>
-          </p:cNvPr>
-          <p:cNvPicPr>
-            <a:picLocks noChangeAspect="1"/>
-          </p:cNvPicPr>
-          <p:nvPr/>
-        </p:nvPicPr>
-        <p:blipFill>
-          <a:blip r:embed="rId3">
+          <a:blip r:embed="rId2">
             <a:extLst>
               <a:ext uri="{28A0092B-C50C-407E-A947-70E740481C1C}">
                 <a14:useLocalDpi xmlns:a14="http://schemas.microsoft.com/office/drawing/2010/main" val="0"/>
@@ -4145,6 +4128,55 @@
           <a:prstGeom prst="rect">
             <a:avLst/>
           </a:prstGeom>
+        </p:spPr>
+      </p:pic>
+      <p:pic>
+        <p:nvPicPr>
+          <p:cNvPr id="4" name="Picture 2" descr="What is JavaScript?">
+            <a:extLst>
+              <a:ext uri="{FF2B5EF4-FFF2-40B4-BE49-F238E27FC236}">
+                <a16:creationId xmlns:a16="http://schemas.microsoft.com/office/drawing/2014/main" id="{B10EA80C-6AA8-1542-DBEA-35F5C8CCD3EF}"/>
+              </a:ext>
+            </a:extLst>
+          </p:cNvPr>
+          <p:cNvPicPr>
+            <a:picLocks noGrp="1" noChangeAspect="1" noChangeArrowheads="1"/>
+          </p:cNvPicPr>
+          <p:nvPr>
+            <p:ph idx="1"/>
+          </p:nvPr>
+        </p:nvPicPr>
+        <p:blipFill>
+          <a:blip r:embed="rId3">
+            <a:extLst>
+              <a:ext uri="{28A0092B-C50C-407E-A947-70E740481C1C}">
+                <a14:useLocalDpi xmlns:a14="http://schemas.microsoft.com/office/drawing/2010/main" val="0"/>
+              </a:ext>
+            </a:extLst>
+          </a:blip>
+          <a:srcRect/>
+          <a:stretch>
+            <a:fillRect/>
+          </a:stretch>
+        </p:blipFill>
+        <p:spPr bwMode="auto">
+          <a:xfrm>
+            <a:off x="9105119" y="2242341"/>
+            <a:ext cx="2143125" cy="2143125"/>
+          </a:xfrm>
+          <a:prstGeom prst="rect">
+            <a:avLst/>
+          </a:prstGeom>
+          <a:noFill/>
+          <a:extLst>
+            <a:ext uri="{909E8E84-426E-40DD-AFC4-6F175D3DCCD1}">
+              <a14:hiddenFill xmlns:a14="http://schemas.microsoft.com/office/drawing/2010/main">
+                <a:solidFill>
+                  <a:srgbClr val="FFFFFF"/>
+                </a:solidFill>
+              </a14:hiddenFill>
+            </a:ext>
+          </a:extLst>
         </p:spPr>
       </p:pic>
     </p:spTree>
@@ -4177,66 +4209,12 @@
           <a:chExt cx="0" cy="0"/>
         </a:xfrm>
       </p:grpSpPr>
-      <p:sp>
-        <p:nvSpPr>
-          <p:cNvPr id="2" name="Title 1">
-            <a:extLst>
-              <a:ext uri="{FF2B5EF4-FFF2-40B4-BE49-F238E27FC236}">
-                <a16:creationId xmlns:a16="http://schemas.microsoft.com/office/drawing/2014/main" id="{9B74A13F-16C1-60B0-0E94-0F14C5CE3A6B}"/>
-              </a:ext>
-            </a:extLst>
-          </p:cNvPr>
-          <p:cNvSpPr>
-            <a:spLocks noGrp="1"/>
-          </p:cNvSpPr>
-          <p:nvPr>
-            <p:ph type="title"/>
-          </p:nvPr>
-        </p:nvSpPr>
-        <p:spPr/>
-        <p:txBody>
-          <a:bodyPr>
-            <a:normAutofit/>
-          </a:bodyPr>
-          <a:lstStyle/>
-          <a:p>
-            <a:r>
-              <a:rPr lang="en-US" sz="3200" b="1" u="sng" dirty="0" err="1">
-                <a:latin typeface="Arial" panose="020B0604020202020204" pitchFamily="34" charset="0"/>
-                <a:cs typeface="Arial" panose="020B0604020202020204" pitchFamily="34" charset="0"/>
-              </a:rPr>
-              <a:t>Js</a:t>
-            </a:r>
-            <a:r>
-              <a:rPr lang="en-US" sz="3200" b="1" u="sng" dirty="0">
-                <a:latin typeface="Arial" panose="020B0604020202020204" pitchFamily="34" charset="0"/>
-                <a:cs typeface="Arial" panose="020B0604020202020204" pitchFamily="34" charset="0"/>
-              </a:rPr>
-              <a:t> </a:t>
-            </a:r>
-            <a:r>
-              <a:rPr lang="en-US" sz="3200" b="1" u="sng" dirty="0" err="1">
-                <a:latin typeface="Arial" panose="020B0604020202020204" pitchFamily="34" charset="0"/>
-                <a:cs typeface="Arial" panose="020B0604020202020204" pitchFamily="34" charset="0"/>
-              </a:rPr>
-              <a:t>Syntex</a:t>
-            </a:r>
-            <a:r>
-              <a:rPr lang="en-US" sz="3200" b="1" u="sng" dirty="0">
-                <a:latin typeface="Arial" panose="020B0604020202020204" pitchFamily="34" charset="0"/>
-                <a:cs typeface="Arial" panose="020B0604020202020204" pitchFamily="34" charset="0"/>
-              </a:rPr>
-              <a:t> and Statement </a:t>
-            </a:r>
-          </a:p>
-        </p:txBody>
-      </p:sp>
       <p:pic>
         <p:nvPicPr>
-          <p:cNvPr id="5" name="Picture 4">
-            <a:extLst>
-              <a:ext uri="{FF2B5EF4-FFF2-40B4-BE49-F238E27FC236}">
-                <a16:creationId xmlns:a16="http://schemas.microsoft.com/office/drawing/2014/main" id="{CDA3A878-F26F-310D-5570-E57DDD2390B0}"/>
+          <p:cNvPr id="3" name="Picture 2">
+            <a:extLst>
+              <a:ext uri="{FF2B5EF4-FFF2-40B4-BE49-F238E27FC236}">
+                <a16:creationId xmlns:a16="http://schemas.microsoft.com/office/drawing/2014/main" id="{FA214EDC-7760-41D5-EB40-4FA7CA92D208}"/>
               </a:ext>
             </a:extLst>
           </p:cNvPr>
@@ -4246,37 +4224,7 @@
           <p:nvPr/>
         </p:nvPicPr>
         <p:blipFill>
-          <a:blip r:embed="rId2"/>
-          <a:stretch>
-            <a:fillRect/>
-          </a:stretch>
-        </p:blipFill>
-        <p:spPr>
-          <a:xfrm>
-            <a:off x="838200" y="2275233"/>
-            <a:ext cx="8001000" cy="2705100"/>
-          </a:xfrm>
-          <a:prstGeom prst="rect">
-            <a:avLst/>
-          </a:prstGeom>
-        </p:spPr>
-      </p:pic>
-      <p:pic>
-        <p:nvPicPr>
-          <p:cNvPr id="3" name="Picture 2">
-            <a:extLst>
-              <a:ext uri="{FF2B5EF4-FFF2-40B4-BE49-F238E27FC236}">
-                <a16:creationId xmlns:a16="http://schemas.microsoft.com/office/drawing/2014/main" id="{FA214EDC-7760-41D5-EB40-4FA7CA92D208}"/>
-              </a:ext>
-            </a:extLst>
-          </p:cNvPr>
-          <p:cNvPicPr>
-            <a:picLocks noChangeAspect="1"/>
-          </p:cNvPicPr>
-          <p:nvPr/>
-        </p:nvPicPr>
-        <p:blipFill>
-          <a:blip r:embed="rId3">
+          <a:blip r:embed="rId2">
             <a:extLst>
               <a:ext uri="{28A0092B-C50C-407E-A947-70E740481C1C}">
                 <a14:useLocalDpi xmlns:a14="http://schemas.microsoft.com/office/drawing/2010/main" val="0"/>
@@ -4295,6 +4243,300 @@
           <a:prstGeom prst="rect">
             <a:avLst/>
           </a:prstGeom>
+        </p:spPr>
+      </p:pic>
+      <p:sp>
+        <p:nvSpPr>
+          <p:cNvPr id="6" name="Title 5">
+            <a:extLst>
+              <a:ext uri="{FF2B5EF4-FFF2-40B4-BE49-F238E27FC236}">
+                <a16:creationId xmlns:a16="http://schemas.microsoft.com/office/drawing/2014/main" id="{33DE9A6D-2659-B70A-B510-BB94E2EA5AC7}"/>
+              </a:ext>
+            </a:extLst>
+          </p:cNvPr>
+          <p:cNvSpPr>
+            <a:spLocks noGrp="1"/>
+          </p:cNvSpPr>
+          <p:nvPr>
+            <p:ph type="title"/>
+          </p:nvPr>
+        </p:nvSpPr>
+        <p:spPr>
+          <a:xfrm>
+            <a:off x="850556" y="444843"/>
+            <a:ext cx="7737389" cy="1190655"/>
+          </a:xfrm>
+        </p:spPr>
+        <p:txBody>
+          <a:bodyPr>
+            <a:normAutofit fontScale="90000"/>
+          </a:bodyPr>
+          <a:lstStyle/>
+          <a:p>
+            <a:r>
+              <a:rPr lang="en-US" b="0" i="0" dirty="0">
+                <a:effectLst/>
+                <a:latin typeface="Times New Roman" panose="02020603050405020304" pitchFamily="18" charset="0"/>
+                <a:ea typeface="Fira Code" panose="020B0809050000020004" pitchFamily="49" charset="0"/>
+                <a:cs typeface="Times New Roman" panose="02020603050405020304" pitchFamily="18" charset="0"/>
+              </a:rPr>
+              <a:t>JavaScript has 8 Datatypes</a:t>
+            </a:r>
+            <a:br>
+              <a:rPr lang="en-US" b="0" i="0" dirty="0">
+                <a:effectLst/>
+                <a:latin typeface="Times New Roman" panose="02020603050405020304" pitchFamily="18" charset="0"/>
+                <a:ea typeface="Fira Code" panose="020B0809050000020004" pitchFamily="49" charset="0"/>
+                <a:cs typeface="Times New Roman" panose="02020603050405020304" pitchFamily="18" charset="0"/>
+              </a:rPr>
+            </a:br>
+            <a:endParaRPr lang="en-US" dirty="0">
+              <a:latin typeface="Times New Roman" panose="02020603050405020304" pitchFamily="18" charset="0"/>
+              <a:ea typeface="Fira Code" panose="020B0809050000020004" pitchFamily="49" charset="0"/>
+              <a:cs typeface="Times New Roman" panose="02020603050405020304" pitchFamily="18" charset="0"/>
+            </a:endParaRPr>
+          </a:p>
+        </p:txBody>
+      </p:sp>
+      <p:sp>
+        <p:nvSpPr>
+          <p:cNvPr id="7" name="Title 5">
+            <a:extLst>
+              <a:ext uri="{FF2B5EF4-FFF2-40B4-BE49-F238E27FC236}">
+                <a16:creationId xmlns:a16="http://schemas.microsoft.com/office/drawing/2014/main" id="{4C4CB563-2A9E-DD8B-93A9-FA7384E5A8B2}"/>
+              </a:ext>
+            </a:extLst>
+          </p:cNvPr>
+          <p:cNvSpPr txBox="1">
+            <a:spLocks/>
+          </p:cNvSpPr>
+          <p:nvPr/>
+        </p:nvSpPr>
+        <p:spPr>
+          <a:xfrm>
+            <a:off x="850557" y="1201552"/>
+            <a:ext cx="7737389" cy="3605225"/>
+          </a:xfrm>
+          <a:prstGeom prst="rect">
+            <a:avLst/>
+          </a:prstGeom>
+        </p:spPr>
+        <p:txBody>
+          <a:bodyPr vert="horz" lIns="91440" tIns="45720" rIns="91440" bIns="45720" rtlCol="0" anchor="ctr">
+            <a:normAutofit/>
+          </a:bodyPr>
+          <a:lstStyle>
+            <a:lvl1pPr algn="l" defTabSz="914400" rtl="0" eaLnBrk="1" latinLnBrk="0" hangingPunct="1">
+              <a:lnSpc>
+                <a:spcPct val="90000"/>
+              </a:lnSpc>
+              <a:spcBef>
+                <a:spcPct val="0"/>
+              </a:spcBef>
+              <a:buNone/>
+              <a:defRPr sz="4400" kern="1200">
+                <a:solidFill>
+                  <a:schemeClr val="tx1"/>
+                </a:solidFill>
+                <a:latin typeface="+mj-lt"/>
+                <a:ea typeface="+mj-ea"/>
+                <a:cs typeface="+mj-cs"/>
+              </a:defRPr>
+            </a:lvl1pPr>
+          </a:lstStyle>
+          <a:p>
+            <a:pPr>
+              <a:lnSpc>
+                <a:spcPct val="200000"/>
+              </a:lnSpc>
+            </a:pPr>
+            <a:r>
+              <a:rPr lang="en-GB" sz="1400" b="0" i="0" dirty="0">
+                <a:solidFill>
+                  <a:srgbClr val="002060"/>
+                </a:solidFill>
+                <a:effectLst/>
+                <a:latin typeface="Verdana" panose="020B0604030504040204" pitchFamily="34" charset="0"/>
+              </a:rPr>
+              <a:t>1. STRING</a:t>
+            </a:r>
+            <a:br>
+              <a:rPr lang="en-GB" sz="1400" dirty="0">
+                <a:solidFill>
+                  <a:srgbClr val="002060"/>
+                </a:solidFill>
+              </a:rPr>
+            </a:br>
+            <a:r>
+              <a:rPr lang="en-GB" sz="1400" b="0" i="0" dirty="0">
+                <a:solidFill>
+                  <a:srgbClr val="002060"/>
+                </a:solidFill>
+                <a:effectLst/>
+                <a:latin typeface="Verdana" panose="020B0604030504040204" pitchFamily="34" charset="0"/>
+              </a:rPr>
+              <a:t>2. NUMBER</a:t>
+            </a:r>
+            <a:br>
+              <a:rPr lang="en-GB" sz="1400" dirty="0">
+                <a:solidFill>
+                  <a:srgbClr val="002060"/>
+                </a:solidFill>
+              </a:rPr>
+            </a:br>
+            <a:r>
+              <a:rPr lang="en-GB" sz="1400" b="0" i="0" dirty="0">
+                <a:solidFill>
+                  <a:srgbClr val="002060"/>
+                </a:solidFill>
+                <a:effectLst/>
+                <a:latin typeface="Verdana" panose="020B0604030504040204" pitchFamily="34" charset="0"/>
+              </a:rPr>
+              <a:t>3. BIGINT</a:t>
+            </a:r>
+            <a:br>
+              <a:rPr lang="en-GB" sz="1400" dirty="0">
+                <a:solidFill>
+                  <a:srgbClr val="002060"/>
+                </a:solidFill>
+              </a:rPr>
+            </a:br>
+            <a:r>
+              <a:rPr lang="en-GB" sz="1400" b="0" i="0" dirty="0">
+                <a:solidFill>
+                  <a:srgbClr val="002060"/>
+                </a:solidFill>
+                <a:effectLst/>
+                <a:latin typeface="Verdana" panose="020B0604030504040204" pitchFamily="34" charset="0"/>
+              </a:rPr>
+              <a:t>4. BOOLEAN</a:t>
+            </a:r>
+            <a:br>
+              <a:rPr lang="en-GB" sz="1400" dirty="0">
+                <a:solidFill>
+                  <a:srgbClr val="002060"/>
+                </a:solidFill>
+              </a:rPr>
+            </a:br>
+            <a:r>
+              <a:rPr lang="en-GB" sz="1400" b="0" i="0" dirty="0">
+                <a:solidFill>
+                  <a:srgbClr val="002060"/>
+                </a:solidFill>
+                <a:effectLst/>
+                <a:latin typeface="Verdana" panose="020B0604030504040204" pitchFamily="34" charset="0"/>
+              </a:rPr>
+              <a:t>5. UNDEFINED</a:t>
+            </a:r>
+            <a:br>
+              <a:rPr lang="en-GB" sz="1400" dirty="0">
+                <a:solidFill>
+                  <a:srgbClr val="002060"/>
+                </a:solidFill>
+              </a:rPr>
+            </a:br>
+            <a:r>
+              <a:rPr lang="en-GB" sz="1400" b="0" i="0" dirty="0">
+                <a:solidFill>
+                  <a:srgbClr val="002060"/>
+                </a:solidFill>
+                <a:effectLst/>
+                <a:latin typeface="Verdana" panose="020B0604030504040204" pitchFamily="34" charset="0"/>
+              </a:rPr>
+              <a:t>5. NULL</a:t>
+            </a:r>
+            <a:br>
+              <a:rPr lang="en-GB" sz="1400" dirty="0">
+                <a:solidFill>
+                  <a:srgbClr val="002060"/>
+                </a:solidFill>
+              </a:rPr>
+            </a:br>
+            <a:r>
+              <a:rPr lang="en-GB" sz="1400" b="0" i="0" dirty="0">
+                <a:solidFill>
+                  <a:srgbClr val="002060"/>
+                </a:solidFill>
+                <a:effectLst/>
+                <a:latin typeface="Verdana" panose="020B0604030504040204" pitchFamily="34" charset="0"/>
+              </a:rPr>
+              <a:t>7. SYMBOL</a:t>
+            </a:r>
+            <a:br>
+              <a:rPr lang="en-GB" sz="1400" dirty="0">
+                <a:solidFill>
+                  <a:srgbClr val="002060"/>
+                </a:solidFill>
+              </a:rPr>
+            </a:br>
+            <a:r>
+              <a:rPr lang="en-GB" sz="1400" b="0" i="0" dirty="0">
+                <a:solidFill>
+                  <a:srgbClr val="002060"/>
+                </a:solidFill>
+                <a:effectLst/>
+                <a:latin typeface="Verdana" panose="020B0604030504040204" pitchFamily="34" charset="0"/>
+              </a:rPr>
+              <a:t>8. OBJECT</a:t>
+            </a:r>
+            <a:endParaRPr lang="en-US" sz="1400" dirty="0">
+              <a:solidFill>
+                <a:srgbClr val="002060"/>
+              </a:solidFill>
+              <a:latin typeface="Times New Roman" panose="02020603050405020304" pitchFamily="18" charset="0"/>
+              <a:ea typeface="Fira Code" panose="020B0809050000020004" pitchFamily="49" charset="0"/>
+              <a:cs typeface="Times New Roman" panose="02020603050405020304" pitchFamily="18" charset="0"/>
+            </a:endParaRPr>
+          </a:p>
+        </p:txBody>
+      </p:sp>
+      <p:pic>
+        <p:nvPicPr>
+          <p:cNvPr id="9" name="Picture 2" descr="What is JavaScript?">
+            <a:extLst>
+              <a:ext uri="{FF2B5EF4-FFF2-40B4-BE49-F238E27FC236}">
+                <a16:creationId xmlns:a16="http://schemas.microsoft.com/office/drawing/2014/main" id="{24FFF205-CD60-50B8-16A0-5DD2D0418AEA}"/>
+              </a:ext>
+            </a:extLst>
+          </p:cNvPr>
+          <p:cNvPicPr>
+            <a:picLocks noGrp="1" noChangeAspect="1" noChangeArrowheads="1"/>
+          </p:cNvPicPr>
+          <p:nvPr>
+            <p:ph idx="1"/>
+          </p:nvPr>
+        </p:nvPicPr>
+        <p:blipFill>
+          <a:blip r:embed="rId3">
+            <a:extLst>
+              <a:ext uri="{28A0092B-C50C-407E-A947-70E740481C1C}">
+                <a14:useLocalDpi xmlns:a14="http://schemas.microsoft.com/office/drawing/2010/main" val="0"/>
+              </a:ext>
+            </a:extLst>
+          </a:blip>
+          <a:srcRect/>
+          <a:stretch>
+            <a:fillRect/>
+          </a:stretch>
+        </p:blipFill>
+        <p:spPr bwMode="auto">
+          <a:xfrm>
+            <a:off x="10763494" y="5653201"/>
+            <a:ext cx="857627" cy="857627"/>
+          </a:xfrm>
+          <a:prstGeom prst="rect">
+            <a:avLst/>
+          </a:prstGeom>
+          <a:noFill/>
+          <a:extLst>
+            <a:ext uri="{909E8E84-426E-40DD-AFC4-6F175D3DCCD1}">
+              <a14:hiddenFill xmlns:a14="http://schemas.microsoft.com/office/drawing/2010/main">
+                <a:solidFill>
+                  <a:srgbClr val="FFFFFF"/>
+                </a:solidFill>
+              </a14:hiddenFill>
+            </a:ext>
+          </a:extLst>
         </p:spPr>
       </p:pic>
     </p:spTree>
@@ -4348,29 +4590,27 @@
           <a:bodyPr/>
           <a:lstStyle/>
           <a:p>
-            <a:r>
-              <a:rPr lang="en-US" b="1" u="sng" dirty="0" err="1">
-                <a:latin typeface="Arial" panose="020B0604020202020204" pitchFamily="34" charset="0"/>
-                <a:cs typeface="Arial" panose="020B0604020202020204" pitchFamily="34" charset="0"/>
+            <a:pPr algn="l"/>
+            <a:r>
+              <a:rPr lang="en-US" b="1" i="0" u="sng" dirty="0">
+                <a:solidFill>
+                  <a:srgbClr val="002060"/>
+                </a:solidFill>
+                <a:effectLst/>
+                <a:latin typeface="Times New Roman" panose="02020603050405020304" pitchFamily="18" charset="0"/>
+                <a:cs typeface="Times New Roman" panose="02020603050405020304" pitchFamily="18" charset="0"/>
               </a:rPr>
-              <a:t>Js</a:t>
-            </a:r>
-            <a:r>
-              <a:rPr lang="en-US" b="1" u="sng" dirty="0">
-                <a:latin typeface="Arial" panose="020B0604020202020204" pitchFamily="34" charset="0"/>
-                <a:cs typeface="Arial" panose="020B0604020202020204" pitchFamily="34" charset="0"/>
-              </a:rPr>
-              <a:t> Variable </a:t>
+              <a:t>The Object Datatype</a:t>
             </a:r>
           </a:p>
         </p:txBody>
       </p:sp>
       <p:pic>
         <p:nvPicPr>
-          <p:cNvPr id="5" name="Picture 4">
-            <a:extLst>
-              <a:ext uri="{FF2B5EF4-FFF2-40B4-BE49-F238E27FC236}">
-                <a16:creationId xmlns:a16="http://schemas.microsoft.com/office/drawing/2014/main" id="{E62A427A-FA91-67E7-505D-B1D6871E4C1F}"/>
+          <p:cNvPr id="3" name="Picture 2">
+            <a:extLst>
+              <a:ext uri="{FF2B5EF4-FFF2-40B4-BE49-F238E27FC236}">
+                <a16:creationId xmlns:a16="http://schemas.microsoft.com/office/drawing/2014/main" id="{E73FBD28-D27B-0B3F-6417-7E4C2EAE7991}"/>
               </a:ext>
             </a:extLst>
           </p:cNvPr>
@@ -4380,27 +4620,337 @@
           <p:nvPr/>
         </p:nvPicPr>
         <p:blipFill>
-          <a:blip r:embed="rId2"/>
+          <a:blip r:embed="rId2">
+            <a:extLst>
+              <a:ext uri="{28A0092B-C50C-407E-A947-70E740481C1C}">
+                <a14:useLocalDpi xmlns:a14="http://schemas.microsoft.com/office/drawing/2010/main" val="0"/>
+              </a:ext>
+            </a:extLst>
+          </a:blip>
           <a:stretch>
             <a:fillRect/>
           </a:stretch>
         </p:blipFill>
         <p:spPr>
           <a:xfrm>
-            <a:off x="491070" y="1588648"/>
-            <a:ext cx="5316110" cy="4969825"/>
+            <a:off x="10969210" y="718478"/>
+            <a:ext cx="769180" cy="618855"/>
           </a:xfrm>
           <a:prstGeom prst="rect">
             <a:avLst/>
           </a:prstGeom>
         </p:spPr>
       </p:pic>
+      <p:sp>
+        <p:nvSpPr>
+          <p:cNvPr id="4" name="Title 1">
+            <a:extLst>
+              <a:ext uri="{FF2B5EF4-FFF2-40B4-BE49-F238E27FC236}">
+                <a16:creationId xmlns:a16="http://schemas.microsoft.com/office/drawing/2014/main" id="{2399145C-9A8A-13EC-DA66-B8906CC5ACFB}"/>
+              </a:ext>
+            </a:extLst>
+          </p:cNvPr>
+          <p:cNvSpPr txBox="1">
+            <a:spLocks/>
+          </p:cNvSpPr>
+          <p:nvPr/>
+        </p:nvSpPr>
+        <p:spPr>
+          <a:xfrm>
+            <a:off x="838200" y="1690688"/>
+            <a:ext cx="5154827" cy="867671"/>
+          </a:xfrm>
+          <a:prstGeom prst="rect">
+            <a:avLst/>
+          </a:prstGeom>
+        </p:spPr>
+        <p:txBody>
+          <a:bodyPr vert="horz" lIns="91440" tIns="45720" rIns="91440" bIns="45720" rtlCol="0" anchor="ctr">
+            <a:normAutofit/>
+          </a:bodyPr>
+          <a:lstStyle>
+            <a:lvl1pPr algn="l" defTabSz="914400" rtl="0" eaLnBrk="1" latinLnBrk="0" hangingPunct="1">
+              <a:lnSpc>
+                <a:spcPct val="90000"/>
+              </a:lnSpc>
+              <a:spcBef>
+                <a:spcPct val="0"/>
+              </a:spcBef>
+              <a:buNone/>
+              <a:defRPr sz="4400" kern="1200">
+                <a:solidFill>
+                  <a:schemeClr val="tx1"/>
+                </a:solidFill>
+                <a:latin typeface="+mj-lt"/>
+                <a:ea typeface="+mj-ea"/>
+                <a:cs typeface="+mj-cs"/>
+              </a:defRPr>
+            </a:lvl1pPr>
+          </a:lstStyle>
+          <a:p>
+            <a:r>
+              <a:rPr lang="en-GB" sz="2000" b="0" i="0" dirty="0">
+                <a:solidFill>
+                  <a:srgbClr val="002060"/>
+                </a:solidFill>
+                <a:effectLst/>
+                <a:latin typeface="Verdana" panose="020B0604030504040204" pitchFamily="34" charset="0"/>
+              </a:rPr>
+              <a:t>The object data type can contain:</a:t>
+            </a:r>
+            <a:endParaRPr lang="en-US" sz="2000" b="1" dirty="0">
+              <a:solidFill>
+                <a:srgbClr val="002060"/>
+              </a:solidFill>
+              <a:latin typeface="Times New Roman" panose="02020603050405020304" pitchFamily="18" charset="0"/>
+              <a:cs typeface="Times New Roman" panose="02020603050405020304" pitchFamily="18" charset="0"/>
+            </a:endParaRPr>
+          </a:p>
+        </p:txBody>
+      </p:sp>
+      <p:sp>
+        <p:nvSpPr>
+          <p:cNvPr id="8" name="Title 1">
+            <a:extLst>
+              <a:ext uri="{FF2B5EF4-FFF2-40B4-BE49-F238E27FC236}">
+                <a16:creationId xmlns:a16="http://schemas.microsoft.com/office/drawing/2014/main" id="{1A56503C-D5B2-019C-CEE7-1F6365E28A54}"/>
+              </a:ext>
+            </a:extLst>
+          </p:cNvPr>
+          <p:cNvSpPr txBox="1">
+            <a:spLocks/>
+          </p:cNvSpPr>
+          <p:nvPr/>
+        </p:nvSpPr>
+        <p:spPr>
+          <a:xfrm>
+            <a:off x="838199" y="2582415"/>
+            <a:ext cx="5154827" cy="867671"/>
+          </a:xfrm>
+          <a:prstGeom prst="rect">
+            <a:avLst/>
+          </a:prstGeom>
+        </p:spPr>
+        <p:txBody>
+          <a:bodyPr vert="horz" lIns="91440" tIns="45720" rIns="91440" bIns="45720" rtlCol="0" anchor="ctr">
+            <a:noAutofit/>
+          </a:bodyPr>
+          <a:lstStyle>
+            <a:lvl1pPr algn="l" defTabSz="914400" rtl="0" eaLnBrk="1" latinLnBrk="0" hangingPunct="1">
+              <a:lnSpc>
+                <a:spcPct val="90000"/>
+              </a:lnSpc>
+              <a:spcBef>
+                <a:spcPct val="0"/>
+              </a:spcBef>
+              <a:buNone/>
+              <a:defRPr sz="4400" kern="1200">
+                <a:solidFill>
+                  <a:schemeClr val="tx1"/>
+                </a:solidFill>
+                <a:latin typeface="+mj-lt"/>
+                <a:ea typeface="+mj-ea"/>
+                <a:cs typeface="+mj-cs"/>
+              </a:defRPr>
+            </a:lvl1pPr>
+          </a:lstStyle>
+          <a:p>
+            <a:pPr>
+              <a:lnSpc>
+                <a:spcPct val="150000"/>
+              </a:lnSpc>
+            </a:pPr>
+            <a:r>
+              <a:rPr lang="en-GB" sz="1600" b="0" i="0" dirty="0">
+                <a:solidFill>
+                  <a:srgbClr val="002060"/>
+                </a:solidFill>
+                <a:effectLst/>
+                <a:latin typeface="Verdana" panose="020B0604030504040204" pitchFamily="34" charset="0"/>
+              </a:rPr>
+              <a:t>1. An object</a:t>
+            </a:r>
+            <a:br>
+              <a:rPr lang="en-GB" sz="1600" dirty="0">
+                <a:solidFill>
+                  <a:srgbClr val="002060"/>
+                </a:solidFill>
+              </a:rPr>
+            </a:br>
+            <a:r>
+              <a:rPr lang="en-GB" sz="1600" b="0" i="0" dirty="0">
+                <a:solidFill>
+                  <a:srgbClr val="002060"/>
+                </a:solidFill>
+                <a:effectLst/>
+                <a:latin typeface="Verdana" panose="020B0604030504040204" pitchFamily="34" charset="0"/>
+              </a:rPr>
+              <a:t>2. An array</a:t>
+            </a:r>
+            <a:br>
+              <a:rPr lang="en-GB" sz="1600" dirty="0">
+                <a:solidFill>
+                  <a:srgbClr val="002060"/>
+                </a:solidFill>
+              </a:rPr>
+            </a:br>
+            <a:r>
+              <a:rPr lang="en-GB" sz="1600" b="0" i="0" dirty="0">
+                <a:solidFill>
+                  <a:srgbClr val="002060"/>
+                </a:solidFill>
+                <a:effectLst/>
+                <a:latin typeface="Verdana" panose="020B0604030504040204" pitchFamily="34" charset="0"/>
+              </a:rPr>
+              <a:t>3. A date</a:t>
+            </a:r>
+            <a:endParaRPr lang="en-US" sz="1600" b="1" dirty="0">
+              <a:solidFill>
+                <a:srgbClr val="002060"/>
+              </a:solidFill>
+              <a:latin typeface="Times New Roman" panose="02020603050405020304" pitchFamily="18" charset="0"/>
+              <a:cs typeface="Times New Roman" panose="02020603050405020304" pitchFamily="18" charset="0"/>
+            </a:endParaRPr>
+          </a:p>
+        </p:txBody>
+      </p:sp>
       <p:pic>
         <p:nvPicPr>
-          <p:cNvPr id="7" name="Picture 6">
-            <a:extLst>
-              <a:ext uri="{FF2B5EF4-FFF2-40B4-BE49-F238E27FC236}">
-                <a16:creationId xmlns:a16="http://schemas.microsoft.com/office/drawing/2014/main" id="{5CD0BAEE-7ACD-ED57-0A77-B3616CA7542D}"/>
+          <p:cNvPr id="9" name="Picture 2" descr="What is JavaScript?">
+            <a:extLst>
+              <a:ext uri="{FF2B5EF4-FFF2-40B4-BE49-F238E27FC236}">
+                <a16:creationId xmlns:a16="http://schemas.microsoft.com/office/drawing/2014/main" id="{A0257796-C8E4-865C-A4A1-CB9CE76DDCD3}"/>
+              </a:ext>
+            </a:extLst>
+          </p:cNvPr>
+          <p:cNvPicPr>
+            <a:picLocks noGrp="1" noChangeAspect="1" noChangeArrowheads="1"/>
+          </p:cNvPicPr>
+          <p:nvPr>
+            <p:ph idx="1"/>
+          </p:nvPr>
+        </p:nvPicPr>
+        <p:blipFill>
+          <a:blip r:embed="rId3">
+            <a:extLst>
+              <a:ext uri="{28A0092B-C50C-407E-A947-70E740481C1C}">
+                <a14:useLocalDpi xmlns:a14="http://schemas.microsoft.com/office/drawing/2010/main" val="0"/>
+              </a:ext>
+            </a:extLst>
+          </a:blip>
+          <a:srcRect/>
+          <a:stretch>
+            <a:fillRect/>
+          </a:stretch>
+        </p:blipFill>
+        <p:spPr bwMode="auto">
+          <a:xfrm>
+            <a:off x="10763494" y="5653201"/>
+            <a:ext cx="857627" cy="857627"/>
+          </a:xfrm>
+          <a:prstGeom prst="rect">
+            <a:avLst/>
+          </a:prstGeom>
+          <a:noFill/>
+          <a:extLst>
+            <a:ext uri="{909E8E84-426E-40DD-AFC4-6F175D3DCCD1}">
+              <a14:hiddenFill xmlns:a14="http://schemas.microsoft.com/office/drawing/2010/main">
+                <a:solidFill>
+                  <a:srgbClr val="FFFFFF"/>
+                </a:solidFill>
+              </a14:hiddenFill>
+            </a:ext>
+          </a:extLst>
+        </p:spPr>
+      </p:pic>
+    </p:spTree>
+    <p:extLst>
+      <p:ext uri="{BB962C8B-B14F-4D97-AF65-F5344CB8AC3E}">
+        <p14:creationId xmlns:p14="http://schemas.microsoft.com/office/powerpoint/2010/main" val="3427856679"/>
+      </p:ext>
+    </p:extLst>
+  </p:cSld>
+  <p:clrMapOvr>
+    <a:masterClrMapping/>
+  </p:clrMapOvr>
+</p:sld>
+</file>
+
+<file path=ppt/slides/slide16.xml><?xml version="1.0" encoding="utf-8"?>
+<p:sld xmlns:a="http://schemas.openxmlformats.org/drawingml/2006/main" xmlns:r="http://schemas.openxmlformats.org/officeDocument/2006/relationships" xmlns:p="http://schemas.openxmlformats.org/presentationml/2006/main">
+  <p:cSld>
+    <p:spTree>
+      <p:nvGrpSpPr>
+        <p:cNvPr id="1" name=""/>
+        <p:cNvGrpSpPr/>
+        <p:nvPr/>
+      </p:nvGrpSpPr>
+      <p:grpSpPr>
+        <a:xfrm>
+          <a:off x="0" y="0"/>
+          <a:ext cx="0" cy="0"/>
+          <a:chOff x="0" y="0"/>
+          <a:chExt cx="0" cy="0"/>
+        </a:xfrm>
+      </p:grpSpPr>
+      <p:sp>
+        <p:nvSpPr>
+          <p:cNvPr id="4" name="Title 1">
+            <a:extLst>
+              <a:ext uri="{FF2B5EF4-FFF2-40B4-BE49-F238E27FC236}">
+                <a16:creationId xmlns:a16="http://schemas.microsoft.com/office/drawing/2014/main" id="{7282855F-1F34-BC2E-2CF6-E8F6A520C235}"/>
+              </a:ext>
+            </a:extLst>
+          </p:cNvPr>
+          <p:cNvSpPr>
+            <a:spLocks noGrp="1"/>
+          </p:cNvSpPr>
+          <p:nvPr>
+            <p:ph type="title"/>
+          </p:nvPr>
+        </p:nvSpPr>
+        <p:spPr>
+          <a:xfrm>
+            <a:off x="838200" y="365125"/>
+            <a:ext cx="10515600" cy="1325563"/>
+          </a:xfrm>
+        </p:spPr>
+        <p:txBody>
+          <a:bodyPr/>
+          <a:lstStyle/>
+          <a:p>
+            <a:pPr algn="l"/>
+            <a:r>
+              <a:rPr lang="en-US" b="1" i="0" u="sng" dirty="0" err="1">
+                <a:solidFill>
+                  <a:srgbClr val="002060"/>
+                </a:solidFill>
+                <a:effectLst/>
+                <a:latin typeface="Times New Roman" panose="02020603050405020304" pitchFamily="18" charset="0"/>
+                <a:cs typeface="Times New Roman" panose="02020603050405020304" pitchFamily="18" charset="0"/>
+              </a:rPr>
+              <a:t>DataType</a:t>
+            </a:r>
+            <a:r>
+              <a:rPr lang="en-US" b="1" i="0" u="sng" dirty="0">
+                <a:solidFill>
+                  <a:srgbClr val="002060"/>
+                </a:solidFill>
+                <a:effectLst/>
+                <a:latin typeface="Times New Roman" panose="02020603050405020304" pitchFamily="18" charset="0"/>
+                <a:cs typeface="Times New Roman" panose="02020603050405020304" pitchFamily="18" charset="0"/>
+              </a:rPr>
+              <a:t> Examples</a:t>
+            </a:r>
+          </a:p>
+        </p:txBody>
+      </p:sp>
+      <p:pic>
+        <p:nvPicPr>
+          <p:cNvPr id="5" name="Picture 4">
+            <a:extLst>
+              <a:ext uri="{FF2B5EF4-FFF2-40B4-BE49-F238E27FC236}">
+                <a16:creationId xmlns:a16="http://schemas.microsoft.com/office/drawing/2014/main" id="{4BED3A3E-DEFB-FC14-5D1C-DA5E1CFB1A54}"/>
               </a:ext>
             </a:extLst>
           </p:cNvPr>
@@ -4410,15 +4960,21 @@
           <p:nvPr/>
         </p:nvPicPr>
         <p:blipFill>
-          <a:blip r:embed="rId3"/>
+          <a:blip r:embed="rId2">
+            <a:extLst>
+              <a:ext uri="{28A0092B-C50C-407E-A947-70E740481C1C}">
+                <a14:useLocalDpi xmlns:a14="http://schemas.microsoft.com/office/drawing/2010/main" val="0"/>
+              </a:ext>
+            </a:extLst>
+          </a:blip>
           <a:stretch>
             <a:fillRect/>
           </a:stretch>
         </p:blipFill>
         <p:spPr>
           <a:xfrm>
-            <a:off x="6154310" y="1588647"/>
-            <a:ext cx="5546620" cy="4969825"/>
+            <a:off x="10969210" y="718478"/>
+            <a:ext cx="769180" cy="618855"/>
           </a:xfrm>
           <a:prstGeom prst="rect">
             <a:avLst/>
@@ -4427,10 +4983,59 @@
       </p:pic>
       <p:pic>
         <p:nvPicPr>
-          <p:cNvPr id="3" name="Picture 2">
-            <a:extLst>
-              <a:ext uri="{FF2B5EF4-FFF2-40B4-BE49-F238E27FC236}">
-                <a16:creationId xmlns:a16="http://schemas.microsoft.com/office/drawing/2014/main" id="{E73FBD28-D27B-0B3F-6417-7E4C2EAE7991}"/>
+          <p:cNvPr id="8" name="Picture 2" descr="What is JavaScript?">
+            <a:extLst>
+              <a:ext uri="{FF2B5EF4-FFF2-40B4-BE49-F238E27FC236}">
+                <a16:creationId xmlns:a16="http://schemas.microsoft.com/office/drawing/2014/main" id="{C20DE320-EEED-AAA9-6EAA-79A2207379C4}"/>
+              </a:ext>
+            </a:extLst>
+          </p:cNvPr>
+          <p:cNvPicPr>
+            <a:picLocks noGrp="1" noChangeAspect="1" noChangeArrowheads="1"/>
+          </p:cNvPicPr>
+          <p:nvPr>
+            <p:ph idx="1"/>
+          </p:nvPr>
+        </p:nvPicPr>
+        <p:blipFill>
+          <a:blip r:embed="rId3">
+            <a:extLst>
+              <a:ext uri="{28A0092B-C50C-407E-A947-70E740481C1C}">
+                <a14:useLocalDpi xmlns:a14="http://schemas.microsoft.com/office/drawing/2010/main" val="0"/>
+              </a:ext>
+            </a:extLst>
+          </a:blip>
+          <a:srcRect/>
+          <a:stretch>
+            <a:fillRect/>
+          </a:stretch>
+        </p:blipFill>
+        <p:spPr bwMode="auto">
+          <a:xfrm>
+            <a:off x="10763494" y="5653201"/>
+            <a:ext cx="857627" cy="857627"/>
+          </a:xfrm>
+          <a:prstGeom prst="rect">
+            <a:avLst/>
+          </a:prstGeom>
+          <a:noFill/>
+          <a:extLst>
+            <a:ext uri="{909E8E84-426E-40DD-AFC4-6F175D3DCCD1}">
+              <a14:hiddenFill xmlns:a14="http://schemas.microsoft.com/office/drawing/2010/main">
+                <a:solidFill>
+                  <a:srgbClr val="FFFFFF"/>
+                </a:solidFill>
+              </a14:hiddenFill>
+            </a:ext>
+          </a:extLst>
+        </p:spPr>
+      </p:pic>
+      <p:pic>
+        <p:nvPicPr>
+          <p:cNvPr id="10" name="Picture 9">
+            <a:extLst>
+              <a:ext uri="{FF2B5EF4-FFF2-40B4-BE49-F238E27FC236}">
+                <a16:creationId xmlns:a16="http://schemas.microsoft.com/office/drawing/2014/main" id="{44B96001-2E7A-FE31-5B23-1629FAA604B8}"/>
               </a:ext>
             </a:extLst>
           </p:cNvPr>
@@ -4440,7 +5045,119 @@
           <p:nvPr/>
         </p:nvPicPr>
         <p:blipFill>
-          <a:blip r:embed="rId4">
+          <a:blip r:embed="rId4"/>
+          <a:stretch>
+            <a:fillRect/>
+          </a:stretch>
+        </p:blipFill>
+        <p:spPr>
+          <a:xfrm>
+            <a:off x="993689" y="1690688"/>
+            <a:ext cx="4495800" cy="4438650"/>
+          </a:xfrm>
+          <a:prstGeom prst="rect">
+            <a:avLst/>
+          </a:prstGeom>
+        </p:spPr>
+      </p:pic>
+    </p:spTree>
+    <p:extLst>
+      <p:ext uri="{BB962C8B-B14F-4D97-AF65-F5344CB8AC3E}">
+        <p14:creationId xmlns:p14="http://schemas.microsoft.com/office/powerpoint/2010/main" val="1390628873"/>
+      </p:ext>
+    </p:extLst>
+  </p:cSld>
+  <p:clrMapOvr>
+    <a:masterClrMapping/>
+  </p:clrMapOvr>
+</p:sld>
+</file>
+
+<file path=ppt/slides/slide17.xml><?xml version="1.0" encoding="utf-8"?>
+<p:sld xmlns:a="http://schemas.openxmlformats.org/drawingml/2006/main" xmlns:r="http://schemas.openxmlformats.org/officeDocument/2006/relationships" xmlns:p="http://schemas.openxmlformats.org/presentationml/2006/main">
+  <p:cSld>
+    <p:spTree>
+      <p:nvGrpSpPr>
+        <p:cNvPr id="1" name=""/>
+        <p:cNvGrpSpPr/>
+        <p:nvPr/>
+      </p:nvGrpSpPr>
+      <p:grpSpPr>
+        <a:xfrm>
+          <a:off x="0" y="0"/>
+          <a:ext cx="0" cy="0"/>
+          <a:chOff x="0" y="0"/>
+          <a:chExt cx="0" cy="0"/>
+        </a:xfrm>
+      </p:grpSpPr>
+      <p:sp>
+        <p:nvSpPr>
+          <p:cNvPr id="4" name="Title 1">
+            <a:extLst>
+              <a:ext uri="{FF2B5EF4-FFF2-40B4-BE49-F238E27FC236}">
+                <a16:creationId xmlns:a16="http://schemas.microsoft.com/office/drawing/2014/main" id="{1A5F0312-1913-DF3E-BED5-EDDE3A31FC33}"/>
+              </a:ext>
+            </a:extLst>
+          </p:cNvPr>
+          <p:cNvSpPr>
+            <a:spLocks noGrp="1"/>
+          </p:cNvSpPr>
+          <p:nvPr>
+            <p:ph type="title"/>
+          </p:nvPr>
+        </p:nvSpPr>
+        <p:spPr>
+          <a:xfrm>
+            <a:off x="838200" y="365125"/>
+            <a:ext cx="10515600" cy="1325563"/>
+          </a:xfrm>
+        </p:spPr>
+        <p:txBody>
+          <a:bodyPr/>
+          <a:lstStyle/>
+          <a:p>
+            <a:pPr algn="l"/>
+            <a:r>
+              <a:rPr lang="en-US" b="1" i="0" u="sng" dirty="0" err="1">
+                <a:solidFill>
+                  <a:srgbClr val="002060"/>
+                </a:solidFill>
+                <a:effectLst/>
+                <a:latin typeface="Times New Roman" panose="02020603050405020304" pitchFamily="18" charset="0"/>
+                <a:cs typeface="Times New Roman" panose="02020603050405020304" pitchFamily="18" charset="0"/>
+              </a:rPr>
+              <a:t>DataType</a:t>
+            </a:r>
+            <a:r>
+              <a:rPr lang="en-US" b="1" i="0" u="sng" dirty="0">
+                <a:solidFill>
+                  <a:srgbClr val="002060"/>
+                </a:solidFill>
+                <a:effectLst/>
+                <a:latin typeface="Times New Roman" panose="02020603050405020304" pitchFamily="18" charset="0"/>
+                <a:cs typeface="Times New Roman" panose="02020603050405020304" pitchFamily="18" charset="0"/>
+              </a:rPr>
+              <a:t> : Numbers</a:t>
+            </a:r>
+          </a:p>
+        </p:txBody>
+      </p:sp>
+      <p:pic>
+        <p:nvPicPr>
+          <p:cNvPr id="5" name="Picture 4">
+            <a:extLst>
+              <a:ext uri="{FF2B5EF4-FFF2-40B4-BE49-F238E27FC236}">
+                <a16:creationId xmlns:a16="http://schemas.microsoft.com/office/drawing/2014/main" id="{250DFFC9-57FF-C36B-78EE-DE1B4CA11D77}"/>
+              </a:ext>
+            </a:extLst>
+          </p:cNvPr>
+          <p:cNvPicPr>
+            <a:picLocks noChangeAspect="1"/>
+          </p:cNvPicPr>
+          <p:nvPr/>
+        </p:nvPicPr>
+        <p:blipFill>
+          <a:blip r:embed="rId2">
             <a:extLst>
               <a:ext uri="{28A0092B-C50C-407E-A947-70E740481C1C}">
                 <a14:useLocalDpi xmlns:a14="http://schemas.microsoft.com/office/drawing/2010/main" val="0"/>
@@ -4453,8 +5170,147 @@
         </p:blipFill>
         <p:spPr>
           <a:xfrm>
-            <a:off x="10851941" y="257115"/>
+            <a:off x="10969210" y="718478"/>
             <a:ext cx="769180" cy="618855"/>
+          </a:xfrm>
+          <a:prstGeom prst="rect">
+            <a:avLst/>
+          </a:prstGeom>
+        </p:spPr>
+      </p:pic>
+      <p:pic>
+        <p:nvPicPr>
+          <p:cNvPr id="6" name="Picture 2" descr="What is JavaScript?">
+            <a:extLst>
+              <a:ext uri="{FF2B5EF4-FFF2-40B4-BE49-F238E27FC236}">
+                <a16:creationId xmlns:a16="http://schemas.microsoft.com/office/drawing/2014/main" id="{AE006087-FF3F-4819-07B5-BE7B1D054E49}"/>
+              </a:ext>
+            </a:extLst>
+          </p:cNvPr>
+          <p:cNvPicPr>
+            <a:picLocks noGrp="1" noChangeAspect="1" noChangeArrowheads="1"/>
+          </p:cNvPicPr>
+          <p:nvPr>
+            <p:ph idx="1"/>
+          </p:nvPr>
+        </p:nvPicPr>
+        <p:blipFill>
+          <a:blip r:embed="rId3">
+            <a:extLst>
+              <a:ext uri="{28A0092B-C50C-407E-A947-70E740481C1C}">
+                <a14:useLocalDpi xmlns:a14="http://schemas.microsoft.com/office/drawing/2010/main" val="0"/>
+              </a:ext>
+            </a:extLst>
+          </a:blip>
+          <a:srcRect/>
+          <a:stretch>
+            <a:fillRect/>
+          </a:stretch>
+        </p:blipFill>
+        <p:spPr bwMode="auto">
+          <a:xfrm>
+            <a:off x="10763494" y="5653201"/>
+            <a:ext cx="857627" cy="857627"/>
+          </a:xfrm>
+          <a:prstGeom prst="rect">
+            <a:avLst/>
+          </a:prstGeom>
+          <a:noFill/>
+          <a:extLst>
+            <a:ext uri="{909E8E84-426E-40DD-AFC4-6F175D3DCCD1}">
+              <a14:hiddenFill xmlns:a14="http://schemas.microsoft.com/office/drawing/2010/main">
+                <a:solidFill>
+                  <a:srgbClr val="FFFFFF"/>
+                </a:solidFill>
+              </a14:hiddenFill>
+            </a:ext>
+          </a:extLst>
+        </p:spPr>
+      </p:pic>
+      <p:pic>
+        <p:nvPicPr>
+          <p:cNvPr id="11" name="Picture 10">
+            <a:extLst>
+              <a:ext uri="{FF2B5EF4-FFF2-40B4-BE49-F238E27FC236}">
+                <a16:creationId xmlns:a16="http://schemas.microsoft.com/office/drawing/2014/main" id="{A2F2BEEE-3C9D-2530-3C2B-EA23C0F449FF}"/>
+              </a:ext>
+            </a:extLst>
+          </p:cNvPr>
+          <p:cNvPicPr>
+            <a:picLocks noChangeAspect="1"/>
+          </p:cNvPicPr>
+          <p:nvPr/>
+        </p:nvPicPr>
+        <p:blipFill>
+          <a:blip r:embed="rId4"/>
+          <a:stretch>
+            <a:fillRect/>
+          </a:stretch>
+        </p:blipFill>
+        <p:spPr>
+          <a:xfrm>
+            <a:off x="838200" y="1690688"/>
+            <a:ext cx="3326027" cy="2332948"/>
+          </a:xfrm>
+          <a:prstGeom prst="rect">
+            <a:avLst/>
+          </a:prstGeom>
+        </p:spPr>
+      </p:pic>
+      <p:pic>
+        <p:nvPicPr>
+          <p:cNvPr id="13" name="Picture 12">
+            <a:extLst>
+              <a:ext uri="{FF2B5EF4-FFF2-40B4-BE49-F238E27FC236}">
+                <a16:creationId xmlns:a16="http://schemas.microsoft.com/office/drawing/2014/main" id="{2731835C-AF38-4397-F4AB-6DBAC779BB54}"/>
+              </a:ext>
+            </a:extLst>
+          </p:cNvPr>
+          <p:cNvPicPr>
+            <a:picLocks noChangeAspect="1"/>
+          </p:cNvPicPr>
+          <p:nvPr/>
+        </p:nvPicPr>
+        <p:blipFill>
+          <a:blip r:embed="rId5"/>
+          <a:stretch>
+            <a:fillRect/>
+          </a:stretch>
+        </p:blipFill>
+        <p:spPr>
+          <a:xfrm>
+            <a:off x="838199" y="4288983"/>
+            <a:ext cx="9566189" cy="2120432"/>
+          </a:xfrm>
+          <a:prstGeom prst="rect">
+            <a:avLst/>
+          </a:prstGeom>
+        </p:spPr>
+      </p:pic>
+      <p:pic>
+        <p:nvPicPr>
+          <p:cNvPr id="15" name="Picture 14">
+            <a:extLst>
+              <a:ext uri="{FF2B5EF4-FFF2-40B4-BE49-F238E27FC236}">
+                <a16:creationId xmlns:a16="http://schemas.microsoft.com/office/drawing/2014/main" id="{3FA75C2F-F9AC-3E91-70DE-C2A6F37F063C}"/>
+              </a:ext>
+            </a:extLst>
+          </p:cNvPr>
+          <p:cNvPicPr>
+            <a:picLocks noChangeAspect="1"/>
+          </p:cNvPicPr>
+          <p:nvPr/>
+        </p:nvPicPr>
+        <p:blipFill>
+          <a:blip r:embed="rId6"/>
+          <a:stretch>
+            <a:fillRect/>
+          </a:stretch>
+        </p:blipFill>
+        <p:spPr>
+          <a:xfrm>
+            <a:off x="4449719" y="1784221"/>
+            <a:ext cx="5663896" cy="1973782"/>
           </a:xfrm>
           <a:prstGeom prst="rect">
             <a:avLst/>
@@ -4464,7 +5320,37 @@
     </p:spTree>
     <p:extLst>
       <p:ext uri="{BB962C8B-B14F-4D97-AF65-F5344CB8AC3E}">
-        <p14:creationId xmlns:p14="http://schemas.microsoft.com/office/powerpoint/2010/main" val="3427856679"/>
+        <p14:creationId xmlns:p14="http://schemas.microsoft.com/office/powerpoint/2010/main" val="2983978209"/>
+      </p:ext>
+    </p:extLst>
+  </p:cSld>
+  <p:clrMapOvr>
+    <a:masterClrMapping/>
+  </p:clrMapOvr>
+</p:sld>
+</file>
+
+<file path=ppt/slides/slide18.xml><?xml version="1.0" encoding="utf-8"?>
+<p:sld xmlns:a="http://schemas.openxmlformats.org/drawingml/2006/main" xmlns:r="http://schemas.openxmlformats.org/officeDocument/2006/relationships" xmlns:p="http://schemas.openxmlformats.org/presentationml/2006/main">
+  <p:cSld>
+    <p:spTree>
+      <p:nvGrpSpPr>
+        <p:cNvPr id="1" name=""/>
+        <p:cNvGrpSpPr/>
+        <p:nvPr/>
+      </p:nvGrpSpPr>
+      <p:grpSpPr>
+        <a:xfrm>
+          <a:off x="0" y="0"/>
+          <a:ext cx="0" cy="0"/>
+          <a:chOff x="0" y="0"/>
+          <a:chExt cx="0" cy="0"/>
+        </a:xfrm>
+      </p:grpSpPr>
+    </p:spTree>
+    <p:extLst>
+      <p:ext uri="{BB962C8B-B14F-4D97-AF65-F5344CB8AC3E}">
+        <p14:creationId xmlns:p14="http://schemas.microsoft.com/office/powerpoint/2010/main" val="944544167"/>
       </p:ext>
     </p:extLst>
   </p:cSld>

</xml_diff>

<commit_message>
js day 06 last update
</commit_message>
<xml_diff>
--- a/js 1st class slide - part 01 .pptx
+++ b/js 1st class slide - part 01 .pptx
@@ -5502,63 +5502,6 @@
           </a:extLst>
         </p:spPr>
       </p:pic>
-      <p:sp>
-        <p:nvSpPr>
-          <p:cNvPr id="4" name="Title 1">
-            <a:extLst>
-              <a:ext uri="{FF2B5EF4-FFF2-40B4-BE49-F238E27FC236}">
-                <a16:creationId xmlns:a16="http://schemas.microsoft.com/office/drawing/2014/main" id="{F460D559-9512-9874-FB33-37A62D71DE20}"/>
-              </a:ext>
-            </a:extLst>
-          </p:cNvPr>
-          <p:cNvSpPr txBox="1">
-            <a:spLocks/>
-          </p:cNvSpPr>
-          <p:nvPr/>
-        </p:nvSpPr>
-        <p:spPr>
-          <a:xfrm>
-            <a:off x="1869881" y="2966524"/>
-            <a:ext cx="5326712" cy="1325563"/>
-          </a:xfrm>
-          <a:prstGeom prst="rect">
-            <a:avLst/>
-          </a:prstGeom>
-        </p:spPr>
-        <p:txBody>
-          <a:bodyPr vert="horz" lIns="91440" tIns="45720" rIns="91440" bIns="45720" rtlCol="0" anchor="ctr">
-            <a:normAutofit/>
-          </a:bodyPr>
-          <a:lstStyle>
-            <a:lvl1pPr algn="l" defTabSz="914400" rtl="0" eaLnBrk="1" latinLnBrk="0" hangingPunct="1">
-              <a:lnSpc>
-                <a:spcPct val="90000"/>
-              </a:lnSpc>
-              <a:spcBef>
-                <a:spcPct val="0"/>
-              </a:spcBef>
-              <a:buNone/>
-              <a:defRPr sz="4400" kern="1200">
-                <a:solidFill>
-                  <a:schemeClr val="tx1"/>
-                </a:solidFill>
-                <a:latin typeface="+mj-lt"/>
-                <a:ea typeface="+mj-ea"/>
-                <a:cs typeface="+mj-cs"/>
-              </a:defRPr>
-            </a:lvl1pPr>
-          </a:lstStyle>
-          <a:p>
-            <a:pPr algn="ctr"/>
-            <a:r>
-              <a:rPr lang="en-US" b="1" dirty="0">
-                <a:latin typeface="+mn-lt"/>
-              </a:rPr>
-              <a:t>Day 04 </a:t>
-            </a:r>
-          </a:p>
-        </p:txBody>
-      </p:sp>
       <p:pic>
         <p:nvPicPr>
           <p:cNvPr id="5" name="Picture 4">

</xml_diff>

<commit_message>
js day 07 last update
</commit_message>
<xml_diff>
--- a/js 1st class slide - part 01 .pptx
+++ b/js 1st class slide - part 01 .pptx
@@ -37,13 +37,19 @@
     <p:sldId id="284" r:id="rId31"/>
     <p:sldId id="285" r:id="rId32"/>
     <p:sldId id="286" r:id="rId33"/>
-    <p:sldId id="287" r:id="rId34"/>
-    <p:sldId id="288" r:id="rId35"/>
-    <p:sldId id="289" r:id="rId36"/>
-    <p:sldId id="290" r:id="rId37"/>
-    <p:sldId id="291" r:id="rId38"/>
-    <p:sldId id="292" r:id="rId39"/>
-    <p:sldId id="293" r:id="rId40"/>
+    <p:sldId id="300" r:id="rId34"/>
+    <p:sldId id="287" r:id="rId35"/>
+    <p:sldId id="288" r:id="rId36"/>
+    <p:sldId id="289" r:id="rId37"/>
+    <p:sldId id="290" r:id="rId38"/>
+    <p:sldId id="291" r:id="rId39"/>
+    <p:sldId id="292" r:id="rId40"/>
+    <p:sldId id="293" r:id="rId41"/>
+    <p:sldId id="295" r:id="rId42"/>
+    <p:sldId id="296" r:id="rId43"/>
+    <p:sldId id="297" r:id="rId44"/>
+    <p:sldId id="298" r:id="rId45"/>
+    <p:sldId id="299" r:id="rId46"/>
   </p:sldIdLst>
   <p:sldSz cx="12192000" cy="6858000"/>
   <p:notesSz cx="6858000" cy="9144000"/>
@@ -183,6 +189,7 @@
             <p14:sldId id="284"/>
             <p14:sldId id="285"/>
             <p14:sldId id="286"/>
+            <p14:sldId id="300"/>
             <p14:sldId id="287"/>
             <p14:sldId id="288"/>
             <p14:sldId id="289"/>
@@ -190,6 +197,11 @@
             <p14:sldId id="291"/>
             <p14:sldId id="292"/>
             <p14:sldId id="293"/>
+            <p14:sldId id="295"/>
+            <p14:sldId id="296"/>
+            <p14:sldId id="297"/>
+            <p14:sldId id="298"/>
+            <p14:sldId id="299"/>
           </p14:sldIdLst>
         </p14:section>
       </p14:sectionLst>
@@ -374,7 +386,7 @@
           <a:p>
             <a:fld id="{76439928-7ED9-495B-BAD6-CC71D17435BF}" type="datetimeFigureOut">
               <a:rPr lang="en-US" smtClean="0"/>
-              <a:t>1/5/2023</a:t>
+              <a:t>1/12/2023</a:t>
             </a:fld>
             <a:endParaRPr lang="en-US"/>
           </a:p>
@@ -572,7 +584,7 @@
           <a:p>
             <a:fld id="{76439928-7ED9-495B-BAD6-CC71D17435BF}" type="datetimeFigureOut">
               <a:rPr lang="en-US" smtClean="0"/>
-              <a:t>1/5/2023</a:t>
+              <a:t>1/12/2023</a:t>
             </a:fld>
             <a:endParaRPr lang="en-US"/>
           </a:p>
@@ -780,7 +792,7 @@
           <a:p>
             <a:fld id="{76439928-7ED9-495B-BAD6-CC71D17435BF}" type="datetimeFigureOut">
               <a:rPr lang="en-US" smtClean="0"/>
-              <a:t>1/5/2023</a:t>
+              <a:t>1/12/2023</a:t>
             </a:fld>
             <a:endParaRPr lang="en-US"/>
           </a:p>
@@ -978,7 +990,7 @@
           <a:p>
             <a:fld id="{76439928-7ED9-495B-BAD6-CC71D17435BF}" type="datetimeFigureOut">
               <a:rPr lang="en-US" smtClean="0"/>
-              <a:t>1/5/2023</a:t>
+              <a:t>1/12/2023</a:t>
             </a:fld>
             <a:endParaRPr lang="en-US"/>
           </a:p>
@@ -1253,7 +1265,7 @@
           <a:p>
             <a:fld id="{76439928-7ED9-495B-BAD6-CC71D17435BF}" type="datetimeFigureOut">
               <a:rPr lang="en-US" smtClean="0"/>
-              <a:t>1/5/2023</a:t>
+              <a:t>1/12/2023</a:t>
             </a:fld>
             <a:endParaRPr lang="en-US"/>
           </a:p>
@@ -1518,7 +1530,7 @@
           <a:p>
             <a:fld id="{76439928-7ED9-495B-BAD6-CC71D17435BF}" type="datetimeFigureOut">
               <a:rPr lang="en-US" smtClean="0"/>
-              <a:t>1/5/2023</a:t>
+              <a:t>1/12/2023</a:t>
             </a:fld>
             <a:endParaRPr lang="en-US"/>
           </a:p>
@@ -1930,7 +1942,7 @@
           <a:p>
             <a:fld id="{76439928-7ED9-495B-BAD6-CC71D17435BF}" type="datetimeFigureOut">
               <a:rPr lang="en-US" smtClean="0"/>
-              <a:t>1/5/2023</a:t>
+              <a:t>1/12/2023</a:t>
             </a:fld>
             <a:endParaRPr lang="en-US"/>
           </a:p>
@@ -2071,7 +2083,7 @@
           <a:p>
             <a:fld id="{76439928-7ED9-495B-BAD6-CC71D17435BF}" type="datetimeFigureOut">
               <a:rPr lang="en-US" smtClean="0"/>
-              <a:t>1/5/2023</a:t>
+              <a:t>1/12/2023</a:t>
             </a:fld>
             <a:endParaRPr lang="en-US"/>
           </a:p>
@@ -2184,7 +2196,7 @@
           <a:p>
             <a:fld id="{76439928-7ED9-495B-BAD6-CC71D17435BF}" type="datetimeFigureOut">
               <a:rPr lang="en-US" smtClean="0"/>
-              <a:t>1/5/2023</a:t>
+              <a:t>1/12/2023</a:t>
             </a:fld>
             <a:endParaRPr lang="en-US"/>
           </a:p>
@@ -2495,7 +2507,7 @@
           <a:p>
             <a:fld id="{76439928-7ED9-495B-BAD6-CC71D17435BF}" type="datetimeFigureOut">
               <a:rPr lang="en-US" smtClean="0"/>
-              <a:t>1/5/2023</a:t>
+              <a:t>1/12/2023</a:t>
             </a:fld>
             <a:endParaRPr lang="en-US"/>
           </a:p>
@@ -2783,7 +2795,7 @@
           <a:p>
             <a:fld id="{76439928-7ED9-495B-BAD6-CC71D17435BF}" type="datetimeFigureOut">
               <a:rPr lang="en-US" smtClean="0"/>
-              <a:t>1/5/2023</a:t>
+              <a:t>1/12/2023</a:t>
             </a:fld>
             <a:endParaRPr lang="en-US"/>
           </a:p>
@@ -3024,7 +3036,7 @@
           <a:p>
             <a:fld id="{76439928-7ED9-495B-BAD6-CC71D17435BF}" type="datetimeFigureOut">
               <a:rPr lang="en-US" smtClean="0"/>
-              <a:t>1/5/2023</a:t>
+              <a:t>1/12/2023</a:t>
             </a:fld>
             <a:endParaRPr lang="en-US"/>
           </a:p>
@@ -8746,7 +8758,7 @@
           <p:cNvPr id="4" name="Title 1">
             <a:extLst>
               <a:ext uri="{FF2B5EF4-FFF2-40B4-BE49-F238E27FC236}">
-                <a16:creationId xmlns:a16="http://schemas.microsoft.com/office/drawing/2014/main" id="{24D4EAD2-A5DB-5E1D-4AC9-3A513A6F7446}"/>
+                <a16:creationId xmlns:a16="http://schemas.microsoft.com/office/drawing/2014/main" id="{A6A1CB99-5099-0253-BA4D-355036A12814}"/>
               </a:ext>
             </a:extLst>
           </p:cNvPr>
@@ -8759,8 +8771,8 @@
         </p:nvSpPr>
         <p:spPr>
           <a:xfrm>
-            <a:off x="710978" y="318053"/>
-            <a:ext cx="7566329" cy="1173853"/>
+            <a:off x="1948069" y="1573721"/>
+            <a:ext cx="5326712" cy="1325563"/>
           </a:xfrm>
         </p:spPr>
         <p:txBody>
@@ -8769,76 +8781,34 @@
           </a:bodyPr>
           <a:lstStyle/>
           <a:p>
-            <a:r>
-              <a:rPr lang="en-US" b="1" i="0" u="sng" dirty="0">
-                <a:solidFill>
-                  <a:schemeClr val="accent1">
-                    <a:lumMod val="50000"/>
-                  </a:schemeClr>
-                </a:solidFill>
-                <a:effectLst/>
-                <a:latin typeface="Times New Roman" panose="02020603050405020304" pitchFamily="18" charset="0"/>
-                <a:cs typeface="Times New Roman" panose="02020603050405020304" pitchFamily="18" charset="0"/>
+            <a:pPr algn="ctr"/>
+            <a:r>
+              <a:rPr lang="en-US" sz="8000" b="1" dirty="0">
+                <a:latin typeface="+mn-lt"/>
               </a:rPr>
-              <a:t>.</a:t>
+              <a:t>JavaScript</a:t>
             </a:r>
           </a:p>
         </p:txBody>
       </p:sp>
       <p:pic>
         <p:nvPicPr>
-          <p:cNvPr id="5" name="Picture 4">
-            <a:extLst>
-              <a:ext uri="{FF2B5EF4-FFF2-40B4-BE49-F238E27FC236}">
-                <a16:creationId xmlns:a16="http://schemas.microsoft.com/office/drawing/2014/main" id="{E1A7BD3F-9FFD-CE0C-C777-955EAF7E2DB5}"/>
+          <p:cNvPr id="5" name="Content Placeholder 2" descr="What is JavaScript?">
+            <a:extLst>
+              <a:ext uri="{FF2B5EF4-FFF2-40B4-BE49-F238E27FC236}">
+                <a16:creationId xmlns:a16="http://schemas.microsoft.com/office/drawing/2014/main" id="{9EC9C428-97BB-64C6-4896-7BFB56E24832}"/>
               </a:ext>
             </a:extLst>
           </p:cNvPr>
           <p:cNvPicPr>
-            <a:picLocks noChangeAspect="1"/>
+            <a:picLocks noGrp="1" noChangeAspect="1" noChangeArrowheads="1"/>
           </p:cNvPicPr>
-          <p:nvPr/>
+          <p:nvPr>
+            <p:ph idx="1"/>
+          </p:nvPr>
         </p:nvPicPr>
         <p:blipFill>
           <a:blip r:embed="rId2">
-            <a:extLst>
-              <a:ext uri="{28A0092B-C50C-407E-A947-70E740481C1C}">
-                <a14:useLocalDpi xmlns:a14="http://schemas.microsoft.com/office/drawing/2010/main" val="0"/>
-              </a:ext>
-            </a:extLst>
-          </a:blip>
-          <a:stretch>
-            <a:fillRect/>
-          </a:stretch>
-        </p:blipFill>
-        <p:spPr>
-          <a:xfrm>
-            <a:off x="10969210" y="718478"/>
-            <a:ext cx="769180" cy="618855"/>
-          </a:xfrm>
-          <a:prstGeom prst="rect">
-            <a:avLst/>
-          </a:prstGeom>
-        </p:spPr>
-      </p:pic>
-      <p:pic>
-        <p:nvPicPr>
-          <p:cNvPr id="6" name="Picture 2" descr="What is JavaScript?">
-            <a:extLst>
-              <a:ext uri="{FF2B5EF4-FFF2-40B4-BE49-F238E27FC236}">
-                <a16:creationId xmlns:a16="http://schemas.microsoft.com/office/drawing/2014/main" id="{5D024F5C-F33B-7E32-15A6-85BE4C1737D9}"/>
-              </a:ext>
-            </a:extLst>
-          </p:cNvPr>
-          <p:cNvPicPr>
-            <a:picLocks noGrp="1" noChangeAspect="1" noChangeArrowheads="1"/>
-          </p:cNvPicPr>
-          <p:nvPr>
-            <p:ph idx="1"/>
-          </p:nvPr>
-        </p:nvPicPr>
-        <p:blipFill>
-          <a:blip r:embed="rId3">
             <a:extLst>
               <a:ext uri="{28A0092B-C50C-407E-A947-70E740481C1C}">
                 <a14:useLocalDpi xmlns:a14="http://schemas.microsoft.com/office/drawing/2010/main" val="0"/>
@@ -8852,8 +8822,8 @@
         </p:blipFill>
         <p:spPr bwMode="auto">
           <a:xfrm>
-            <a:off x="10763494" y="5653201"/>
-            <a:ext cx="857627" cy="857627"/>
+            <a:off x="8451449" y="1164941"/>
+            <a:ext cx="2143125" cy="2143125"/>
           </a:xfrm>
           <a:prstGeom prst="rect">
             <a:avLst/>
@@ -8870,10 +8840,103 @@
           </a:extLst>
         </p:spPr>
       </p:pic>
+      <p:sp>
+        <p:nvSpPr>
+          <p:cNvPr id="6" name="Title 1">
+            <a:extLst>
+              <a:ext uri="{FF2B5EF4-FFF2-40B4-BE49-F238E27FC236}">
+                <a16:creationId xmlns:a16="http://schemas.microsoft.com/office/drawing/2014/main" id="{9F108ADB-03B9-F705-F44C-DD019572AD99}"/>
+              </a:ext>
+            </a:extLst>
+          </p:cNvPr>
+          <p:cNvSpPr txBox="1">
+            <a:spLocks/>
+          </p:cNvSpPr>
+          <p:nvPr/>
+        </p:nvSpPr>
+        <p:spPr>
+          <a:xfrm>
+            <a:off x="1869881" y="2966524"/>
+            <a:ext cx="5326712" cy="1325563"/>
+          </a:xfrm>
+          <a:prstGeom prst="rect">
+            <a:avLst/>
+          </a:prstGeom>
+        </p:spPr>
+        <p:txBody>
+          <a:bodyPr vert="horz" lIns="91440" tIns="45720" rIns="91440" bIns="45720" rtlCol="0" anchor="ctr">
+            <a:normAutofit/>
+          </a:bodyPr>
+          <a:lstStyle>
+            <a:lvl1pPr algn="l" defTabSz="914400" rtl="0" eaLnBrk="1" latinLnBrk="0" hangingPunct="1">
+              <a:lnSpc>
+                <a:spcPct val="90000"/>
+              </a:lnSpc>
+              <a:spcBef>
+                <a:spcPct val="0"/>
+              </a:spcBef>
+              <a:buNone/>
+              <a:defRPr sz="4400" kern="1200">
+                <a:solidFill>
+                  <a:schemeClr val="tx1"/>
+                </a:solidFill>
+                <a:latin typeface="+mj-lt"/>
+                <a:ea typeface="+mj-ea"/>
+                <a:cs typeface="+mj-cs"/>
+              </a:defRPr>
+            </a:lvl1pPr>
+          </a:lstStyle>
+          <a:p>
+            <a:pPr algn="ctr"/>
+            <a:r>
+              <a:rPr lang="en-US" b="1" dirty="0">
+                <a:latin typeface="+mn-lt"/>
+              </a:rPr>
+              <a:t>Day 08 </a:t>
+            </a:r>
+          </a:p>
+        </p:txBody>
+      </p:sp>
+      <p:pic>
+        <p:nvPicPr>
+          <p:cNvPr id="7" name="Picture 6">
+            <a:extLst>
+              <a:ext uri="{FF2B5EF4-FFF2-40B4-BE49-F238E27FC236}">
+                <a16:creationId xmlns:a16="http://schemas.microsoft.com/office/drawing/2014/main" id="{B533D128-F5FF-941C-8EDC-26346865FBDA}"/>
+              </a:ext>
+            </a:extLst>
+          </p:cNvPr>
+          <p:cNvPicPr>
+            <a:picLocks noChangeAspect="1"/>
+          </p:cNvPicPr>
+          <p:nvPr/>
+        </p:nvPicPr>
+        <p:blipFill>
+          <a:blip r:embed="rId3">
+            <a:extLst>
+              <a:ext uri="{28A0092B-C50C-407E-A947-70E740481C1C}">
+                <a14:useLocalDpi xmlns:a14="http://schemas.microsoft.com/office/drawing/2010/main" val="0"/>
+              </a:ext>
+            </a:extLst>
+          </a:blip>
+          <a:stretch>
+            <a:fillRect/>
+          </a:stretch>
+        </p:blipFill>
+        <p:spPr>
+          <a:xfrm>
+            <a:off x="10851941" y="257115"/>
+            <a:ext cx="769180" cy="618855"/>
+          </a:xfrm>
+          <a:prstGeom prst="rect">
+            <a:avLst/>
+          </a:prstGeom>
+        </p:spPr>
+      </p:pic>
     </p:spTree>
     <p:extLst>
       <p:ext uri="{BB962C8B-B14F-4D97-AF65-F5344CB8AC3E}">
-        <p14:creationId xmlns:p14="http://schemas.microsoft.com/office/powerpoint/2010/main" val="16493660"/>
+        <p14:creationId xmlns:p14="http://schemas.microsoft.com/office/powerpoint/2010/main" val="1904920003"/>
       </p:ext>
     </p:extLst>
   </p:cSld>
@@ -8905,7 +8968,7 @@
           <p:cNvPr id="4" name="Title 1">
             <a:extLst>
               <a:ext uri="{FF2B5EF4-FFF2-40B4-BE49-F238E27FC236}">
-                <a16:creationId xmlns:a16="http://schemas.microsoft.com/office/drawing/2014/main" id="{0A2D8781-27E6-B37E-A307-63292067B150}"/>
+                <a16:creationId xmlns:a16="http://schemas.microsoft.com/office/drawing/2014/main" id="{24D4EAD2-A5DB-5E1D-4AC9-3A513A6F7446}"/>
               </a:ext>
             </a:extLst>
           </p:cNvPr>
@@ -8928,6 +8991,7 @@
           </a:bodyPr>
           <a:lstStyle/>
           <a:p>
+            <a:pPr algn="l"/>
             <a:r>
               <a:rPr lang="en-US" b="1" i="0" u="sng" dirty="0">
                 <a:solidFill>
@@ -8936,11 +9000,20 @@
                   </a:schemeClr>
                 </a:solidFill>
                 <a:effectLst/>
-                <a:latin typeface="Times New Roman" panose="02020603050405020304" pitchFamily="18" charset="0"/>
-                <a:cs typeface="Times New Roman" panose="02020603050405020304" pitchFamily="18" charset="0"/>
+                <a:latin typeface="Segoe UI" panose="020B0502040204020203" pitchFamily="34" charset="0"/>
               </a:rPr>
-              <a:t>.</a:t>
-            </a:r>
+              <a:t>Why Use Arrays?</a:t>
+            </a:r>
+            <a:endParaRPr lang="en-US" b="1" i="0" u="sng" dirty="0">
+              <a:solidFill>
+                <a:schemeClr val="accent1">
+                  <a:lumMod val="50000"/>
+                </a:schemeClr>
+              </a:solidFill>
+              <a:effectLst/>
+              <a:latin typeface="Times New Roman" panose="02020603050405020304" pitchFamily="18" charset="0"/>
+              <a:cs typeface="Times New Roman" panose="02020603050405020304" pitchFamily="18" charset="0"/>
+            </a:endParaRPr>
           </a:p>
         </p:txBody>
       </p:sp>
@@ -8949,7 +9022,7 @@
           <p:cNvPr id="5" name="Picture 4">
             <a:extLst>
               <a:ext uri="{FF2B5EF4-FFF2-40B4-BE49-F238E27FC236}">
-                <a16:creationId xmlns:a16="http://schemas.microsoft.com/office/drawing/2014/main" id="{02EC626B-8B36-2E0A-0E25-438FC9583A82}"/>
+                <a16:creationId xmlns:a16="http://schemas.microsoft.com/office/drawing/2014/main" id="{E1A7BD3F-9FFD-CE0C-C777-955EAF7E2DB5}"/>
               </a:ext>
             </a:extLst>
           </p:cNvPr>
@@ -8985,7 +9058,7 @@
           <p:cNvPr id="6" name="Picture 2" descr="What is JavaScript?">
             <a:extLst>
               <a:ext uri="{FF2B5EF4-FFF2-40B4-BE49-F238E27FC236}">
-                <a16:creationId xmlns:a16="http://schemas.microsoft.com/office/drawing/2014/main" id="{4C3A2054-F616-B4F3-7149-CB8DC56D02F1}"/>
+                <a16:creationId xmlns:a16="http://schemas.microsoft.com/office/drawing/2014/main" id="{5D024F5C-F33B-7E32-15A6-85BE4C1737D9}"/>
               </a:ext>
             </a:extLst>
           </p:cNvPr>
@@ -9029,10 +9102,40 @@
           </a:extLst>
         </p:spPr>
       </p:pic>
+      <p:pic>
+        <p:nvPicPr>
+          <p:cNvPr id="8" name="Picture 7">
+            <a:extLst>
+              <a:ext uri="{FF2B5EF4-FFF2-40B4-BE49-F238E27FC236}">
+                <a16:creationId xmlns:a16="http://schemas.microsoft.com/office/drawing/2014/main" id="{927C90CE-899B-3FC0-880A-984BE52696BA}"/>
+              </a:ext>
+            </a:extLst>
+          </p:cNvPr>
+          <p:cNvPicPr>
+            <a:picLocks noChangeAspect="1"/>
+          </p:cNvPicPr>
+          <p:nvPr/>
+        </p:nvPicPr>
+        <p:blipFill>
+          <a:blip r:embed="rId4"/>
+          <a:stretch>
+            <a:fillRect/>
+          </a:stretch>
+        </p:blipFill>
+        <p:spPr>
+          <a:xfrm>
+            <a:off x="861112" y="1627873"/>
+            <a:ext cx="10432002" cy="3203619"/>
+          </a:xfrm>
+          <a:prstGeom prst="rect">
+            <a:avLst/>
+          </a:prstGeom>
+        </p:spPr>
+      </p:pic>
     </p:spTree>
     <p:extLst>
       <p:ext uri="{BB962C8B-B14F-4D97-AF65-F5344CB8AC3E}">
-        <p14:creationId xmlns:p14="http://schemas.microsoft.com/office/powerpoint/2010/main" val="877298607"/>
+        <p14:creationId xmlns:p14="http://schemas.microsoft.com/office/powerpoint/2010/main" val="16493660"/>
       </p:ext>
     </p:extLst>
   </p:cSld>
@@ -9064,7 +9167,7 @@
           <p:cNvPr id="4" name="Title 1">
             <a:extLst>
               <a:ext uri="{FF2B5EF4-FFF2-40B4-BE49-F238E27FC236}">
-                <a16:creationId xmlns:a16="http://schemas.microsoft.com/office/drawing/2014/main" id="{354EF84C-1A64-53F6-98D1-0A759FFE94E1}"/>
+                <a16:creationId xmlns:a16="http://schemas.microsoft.com/office/drawing/2014/main" id="{0A2D8781-27E6-B37E-A307-63292067B150}"/>
               </a:ext>
             </a:extLst>
           </p:cNvPr>
@@ -9108,7 +9211,7 @@
           <p:cNvPr id="5" name="Picture 4">
             <a:extLst>
               <a:ext uri="{FF2B5EF4-FFF2-40B4-BE49-F238E27FC236}">
-                <a16:creationId xmlns:a16="http://schemas.microsoft.com/office/drawing/2014/main" id="{5EC6FB4E-B31A-6AD6-F146-77A5C294C6F7}"/>
+                <a16:creationId xmlns:a16="http://schemas.microsoft.com/office/drawing/2014/main" id="{02EC626B-8B36-2E0A-0E25-438FC9583A82}"/>
               </a:ext>
             </a:extLst>
           </p:cNvPr>
@@ -9144,7 +9247,7 @@
           <p:cNvPr id="6" name="Picture 2" descr="What is JavaScript?">
             <a:extLst>
               <a:ext uri="{FF2B5EF4-FFF2-40B4-BE49-F238E27FC236}">
-                <a16:creationId xmlns:a16="http://schemas.microsoft.com/office/drawing/2014/main" id="{BCA78ED9-C49A-8BE4-8815-F3AC294F7352}"/>
+                <a16:creationId xmlns:a16="http://schemas.microsoft.com/office/drawing/2014/main" id="{4C3A2054-F616-B4F3-7149-CB8DC56D02F1}"/>
               </a:ext>
             </a:extLst>
           </p:cNvPr>
@@ -9188,10 +9291,70 @@
           </a:extLst>
         </p:spPr>
       </p:pic>
+      <p:pic>
+        <p:nvPicPr>
+          <p:cNvPr id="3" name="Picture 2">
+            <a:extLst>
+              <a:ext uri="{FF2B5EF4-FFF2-40B4-BE49-F238E27FC236}">
+                <a16:creationId xmlns:a16="http://schemas.microsoft.com/office/drawing/2014/main" id="{C3664B25-5CA4-0D17-6F84-88AFC85EFD6C}"/>
+              </a:ext>
+            </a:extLst>
+          </p:cNvPr>
+          <p:cNvPicPr>
+            <a:picLocks noChangeAspect="1"/>
+          </p:cNvPicPr>
+          <p:nvPr/>
+        </p:nvPicPr>
+        <p:blipFill>
+          <a:blip r:embed="rId4"/>
+          <a:stretch>
+            <a:fillRect/>
+          </a:stretch>
+        </p:blipFill>
+        <p:spPr>
+          <a:xfrm>
+            <a:off x="1010550" y="1644478"/>
+            <a:ext cx="7477125" cy="2209800"/>
+          </a:xfrm>
+          <a:prstGeom prst="rect">
+            <a:avLst/>
+          </a:prstGeom>
+        </p:spPr>
+      </p:pic>
+      <p:pic>
+        <p:nvPicPr>
+          <p:cNvPr id="8" name="Picture 7">
+            <a:extLst>
+              <a:ext uri="{FF2B5EF4-FFF2-40B4-BE49-F238E27FC236}">
+                <a16:creationId xmlns:a16="http://schemas.microsoft.com/office/drawing/2014/main" id="{3C30A813-805D-A124-0AAE-DF2326378943}"/>
+              </a:ext>
+            </a:extLst>
+          </p:cNvPr>
+          <p:cNvPicPr>
+            <a:picLocks noChangeAspect="1"/>
+          </p:cNvPicPr>
+          <p:nvPr/>
+        </p:nvPicPr>
+        <p:blipFill>
+          <a:blip r:embed="rId5"/>
+          <a:stretch>
+            <a:fillRect/>
+          </a:stretch>
+        </p:blipFill>
+        <p:spPr>
+          <a:xfrm>
+            <a:off x="1010549" y="4186728"/>
+            <a:ext cx="5835093" cy="2489096"/>
+          </a:xfrm>
+          <a:prstGeom prst="rect">
+            <a:avLst/>
+          </a:prstGeom>
+        </p:spPr>
+      </p:pic>
     </p:spTree>
     <p:extLst>
       <p:ext uri="{BB962C8B-B14F-4D97-AF65-F5344CB8AC3E}">
-        <p14:creationId xmlns:p14="http://schemas.microsoft.com/office/powerpoint/2010/main" val="3396732666"/>
+        <p14:creationId xmlns:p14="http://schemas.microsoft.com/office/powerpoint/2010/main" val="877298607"/>
       </p:ext>
     </p:extLst>
   </p:cSld>
@@ -9223,7 +9386,7 @@
           <p:cNvPr id="4" name="Title 1">
             <a:extLst>
               <a:ext uri="{FF2B5EF4-FFF2-40B4-BE49-F238E27FC236}">
-                <a16:creationId xmlns:a16="http://schemas.microsoft.com/office/drawing/2014/main" id="{AFE8D16C-9EC9-5D6D-D744-927F543FE561}"/>
+                <a16:creationId xmlns:a16="http://schemas.microsoft.com/office/drawing/2014/main" id="{354EF84C-1A64-53F6-98D1-0A759FFE94E1}"/>
               </a:ext>
             </a:extLst>
           </p:cNvPr>
@@ -9259,6 +9422,32 @@
               </a:rPr>
               <a:t>.</a:t>
             </a:r>
+            <a:r>
+              <a:rPr lang="en-US" b="1" i="0" u="sng" dirty="0" err="1">
+                <a:solidFill>
+                  <a:schemeClr val="accent1">
+                    <a:lumMod val="50000"/>
+                  </a:schemeClr>
+                </a:solidFill>
+                <a:effectLst/>
+                <a:latin typeface="Times New Roman" panose="02020603050405020304" pitchFamily="18" charset="0"/>
+                <a:cs typeface="Times New Roman" panose="02020603050405020304" pitchFamily="18" charset="0"/>
+              </a:rPr>
+              <a:t>Js</a:t>
+            </a:r>
+            <a:r>
+              <a:rPr lang="en-US" b="1" i="0" u="sng" dirty="0">
+                <a:solidFill>
+                  <a:schemeClr val="accent1">
+                    <a:lumMod val="50000"/>
+                  </a:schemeClr>
+                </a:solidFill>
+                <a:effectLst/>
+                <a:latin typeface="Times New Roman" panose="02020603050405020304" pitchFamily="18" charset="0"/>
+                <a:cs typeface="Times New Roman" panose="02020603050405020304" pitchFamily="18" charset="0"/>
+              </a:rPr>
+              <a:t> Keyword new</a:t>
+            </a:r>
           </a:p>
         </p:txBody>
       </p:sp>
@@ -9267,7 +9456,7 @@
           <p:cNvPr id="5" name="Picture 4">
             <a:extLst>
               <a:ext uri="{FF2B5EF4-FFF2-40B4-BE49-F238E27FC236}">
-                <a16:creationId xmlns:a16="http://schemas.microsoft.com/office/drawing/2014/main" id="{0046B51C-E3AC-B6AD-4521-4EBAE15C987F}"/>
+                <a16:creationId xmlns:a16="http://schemas.microsoft.com/office/drawing/2014/main" id="{5EC6FB4E-B31A-6AD6-F146-77A5C294C6F7}"/>
               </a:ext>
             </a:extLst>
           </p:cNvPr>
@@ -9303,7 +9492,7 @@
           <p:cNvPr id="6" name="Picture 2" descr="What is JavaScript?">
             <a:extLst>
               <a:ext uri="{FF2B5EF4-FFF2-40B4-BE49-F238E27FC236}">
-                <a16:creationId xmlns:a16="http://schemas.microsoft.com/office/drawing/2014/main" id="{68507F48-587C-8CC4-CB94-35680C50992A}"/>
+                <a16:creationId xmlns:a16="http://schemas.microsoft.com/office/drawing/2014/main" id="{BCA78ED9-C49A-8BE4-8815-F3AC294F7352}"/>
               </a:ext>
             </a:extLst>
           </p:cNvPr>
@@ -9347,10 +9536,40 @@
           </a:extLst>
         </p:spPr>
       </p:pic>
+      <p:pic>
+        <p:nvPicPr>
+          <p:cNvPr id="3" name="Picture 2">
+            <a:extLst>
+              <a:ext uri="{FF2B5EF4-FFF2-40B4-BE49-F238E27FC236}">
+                <a16:creationId xmlns:a16="http://schemas.microsoft.com/office/drawing/2014/main" id="{E909CC3C-29EC-0D0A-B461-4734F120AEB0}"/>
+              </a:ext>
+            </a:extLst>
+          </p:cNvPr>
+          <p:cNvPicPr>
+            <a:picLocks noChangeAspect="1"/>
+          </p:cNvPicPr>
+          <p:nvPr/>
+        </p:nvPicPr>
+        <p:blipFill>
+          <a:blip r:embed="rId4"/>
+          <a:stretch>
+            <a:fillRect/>
+          </a:stretch>
+        </p:blipFill>
+        <p:spPr>
+          <a:xfrm>
+            <a:off x="827017" y="1746164"/>
+            <a:ext cx="7334250" cy="3143250"/>
+          </a:xfrm>
+          <a:prstGeom prst="rect">
+            <a:avLst/>
+          </a:prstGeom>
+        </p:spPr>
+      </p:pic>
     </p:spTree>
     <p:extLst>
       <p:ext uri="{BB962C8B-B14F-4D97-AF65-F5344CB8AC3E}">
-        <p14:creationId xmlns:p14="http://schemas.microsoft.com/office/powerpoint/2010/main" val="3681836792"/>
+        <p14:creationId xmlns:p14="http://schemas.microsoft.com/office/powerpoint/2010/main" val="3396732666"/>
       </p:ext>
     </p:extLst>
   </p:cSld>
@@ -9382,7 +9601,7 @@
           <p:cNvPr id="4" name="Title 1">
             <a:extLst>
               <a:ext uri="{FF2B5EF4-FFF2-40B4-BE49-F238E27FC236}">
-                <a16:creationId xmlns:a16="http://schemas.microsoft.com/office/drawing/2014/main" id="{25A43975-41E3-A9A4-1435-1589B9D66916}"/>
+                <a16:creationId xmlns:a16="http://schemas.microsoft.com/office/drawing/2014/main" id="{AFE8D16C-9EC9-5D6D-D744-927F543FE561}"/>
               </a:ext>
             </a:extLst>
           </p:cNvPr>
@@ -9395,7 +9614,7 @@
         </p:nvSpPr>
         <p:spPr>
           <a:xfrm>
-            <a:off x="710978" y="318053"/>
+            <a:off x="1133557" y="-145948"/>
             <a:ext cx="7566329" cy="1173853"/>
           </a:xfrm>
         </p:spPr>
@@ -9426,7 +9645,7 @@
           <p:cNvPr id="5" name="Picture 4">
             <a:extLst>
               <a:ext uri="{FF2B5EF4-FFF2-40B4-BE49-F238E27FC236}">
-                <a16:creationId xmlns:a16="http://schemas.microsoft.com/office/drawing/2014/main" id="{08938E75-F035-1A6E-F4A2-747E7A6D2BA6}"/>
+                <a16:creationId xmlns:a16="http://schemas.microsoft.com/office/drawing/2014/main" id="{0046B51C-E3AC-B6AD-4521-4EBAE15C987F}"/>
               </a:ext>
             </a:extLst>
           </p:cNvPr>
@@ -9462,7 +9681,7 @@
           <p:cNvPr id="6" name="Picture 2" descr="What is JavaScript?">
             <a:extLst>
               <a:ext uri="{FF2B5EF4-FFF2-40B4-BE49-F238E27FC236}">
-                <a16:creationId xmlns:a16="http://schemas.microsoft.com/office/drawing/2014/main" id="{200D89B4-611B-6787-034F-20A51C47DE98}"/>
+                <a16:creationId xmlns:a16="http://schemas.microsoft.com/office/drawing/2014/main" id="{68507F48-587C-8CC4-CB94-35680C50992A}"/>
               </a:ext>
             </a:extLst>
           </p:cNvPr>
@@ -9506,10 +9725,70 @@
           </a:extLst>
         </p:spPr>
       </p:pic>
+      <p:pic>
+        <p:nvPicPr>
+          <p:cNvPr id="3" name="Picture 2">
+            <a:extLst>
+              <a:ext uri="{FF2B5EF4-FFF2-40B4-BE49-F238E27FC236}">
+                <a16:creationId xmlns:a16="http://schemas.microsoft.com/office/drawing/2014/main" id="{1C49CDC9-8AAD-03BB-3997-A7F2C2AB7CE9}"/>
+              </a:ext>
+            </a:extLst>
+          </p:cNvPr>
+          <p:cNvPicPr>
+            <a:picLocks noChangeAspect="1"/>
+          </p:cNvPicPr>
+          <p:nvPr/>
+        </p:nvPicPr>
+        <p:blipFill>
+          <a:blip r:embed="rId4"/>
+          <a:stretch>
+            <a:fillRect/>
+          </a:stretch>
+        </p:blipFill>
+        <p:spPr>
+          <a:xfrm>
+            <a:off x="1133557" y="879624"/>
+            <a:ext cx="7414360" cy="2066925"/>
+          </a:xfrm>
+          <a:prstGeom prst="rect">
+            <a:avLst/>
+          </a:prstGeom>
+        </p:spPr>
+      </p:pic>
+      <p:pic>
+        <p:nvPicPr>
+          <p:cNvPr id="8" name="Picture 7">
+            <a:extLst>
+              <a:ext uri="{FF2B5EF4-FFF2-40B4-BE49-F238E27FC236}">
+                <a16:creationId xmlns:a16="http://schemas.microsoft.com/office/drawing/2014/main" id="{046C048C-98B3-33E7-521A-CBED518580B9}"/>
+              </a:ext>
+            </a:extLst>
+          </p:cNvPr>
+          <p:cNvPicPr>
+            <a:picLocks noChangeAspect="1"/>
+          </p:cNvPicPr>
+          <p:nvPr/>
+        </p:nvPicPr>
+        <p:blipFill>
+          <a:blip r:embed="rId5"/>
+          <a:stretch>
+            <a:fillRect/>
+          </a:stretch>
+        </p:blipFill>
+        <p:spPr>
+          <a:xfrm>
+            <a:off x="1127942" y="3094830"/>
+            <a:ext cx="7419975" cy="3533775"/>
+          </a:xfrm>
+          <a:prstGeom prst="rect">
+            <a:avLst/>
+          </a:prstGeom>
+        </p:spPr>
+      </p:pic>
     </p:spTree>
     <p:extLst>
       <p:ext uri="{BB962C8B-B14F-4D97-AF65-F5344CB8AC3E}">
-        <p14:creationId xmlns:p14="http://schemas.microsoft.com/office/powerpoint/2010/main" val="2866215550"/>
+        <p14:creationId xmlns:p14="http://schemas.microsoft.com/office/powerpoint/2010/main" val="3681836792"/>
       </p:ext>
     </p:extLst>
   </p:cSld>
@@ -9541,7 +9820,7 @@
           <p:cNvPr id="4" name="Title 1">
             <a:extLst>
               <a:ext uri="{FF2B5EF4-FFF2-40B4-BE49-F238E27FC236}">
-                <a16:creationId xmlns:a16="http://schemas.microsoft.com/office/drawing/2014/main" id="{A46C90B0-0D80-23F9-716B-15E5F0B54B40}"/>
+                <a16:creationId xmlns:a16="http://schemas.microsoft.com/office/drawing/2014/main" id="{25A43975-41E3-A9A4-1435-1589B9D66916}"/>
               </a:ext>
             </a:extLst>
           </p:cNvPr>
@@ -9585,7 +9864,7 @@
           <p:cNvPr id="5" name="Picture 4">
             <a:extLst>
               <a:ext uri="{FF2B5EF4-FFF2-40B4-BE49-F238E27FC236}">
-                <a16:creationId xmlns:a16="http://schemas.microsoft.com/office/drawing/2014/main" id="{00FAFA57-8397-18AE-2DF2-BB60070B4C7F}"/>
+                <a16:creationId xmlns:a16="http://schemas.microsoft.com/office/drawing/2014/main" id="{08938E75-F035-1A6E-F4A2-747E7A6D2BA6}"/>
               </a:ext>
             </a:extLst>
           </p:cNvPr>
@@ -9621,7 +9900,7 @@
           <p:cNvPr id="6" name="Picture 2" descr="What is JavaScript?">
             <a:extLst>
               <a:ext uri="{FF2B5EF4-FFF2-40B4-BE49-F238E27FC236}">
-                <a16:creationId xmlns:a16="http://schemas.microsoft.com/office/drawing/2014/main" id="{F0F8E035-42A3-3474-0C05-11EDE848DF43}"/>
+                <a16:creationId xmlns:a16="http://schemas.microsoft.com/office/drawing/2014/main" id="{200D89B4-611B-6787-034F-20A51C47DE98}"/>
               </a:ext>
             </a:extLst>
           </p:cNvPr>
@@ -9665,10 +9944,40 @@
           </a:extLst>
         </p:spPr>
       </p:pic>
+      <p:pic>
+        <p:nvPicPr>
+          <p:cNvPr id="3" name="Picture 2">
+            <a:extLst>
+              <a:ext uri="{FF2B5EF4-FFF2-40B4-BE49-F238E27FC236}">
+                <a16:creationId xmlns:a16="http://schemas.microsoft.com/office/drawing/2014/main" id="{9A071AC1-3FE4-FE10-F3C7-5A8487E5BB8B}"/>
+              </a:ext>
+            </a:extLst>
+          </p:cNvPr>
+          <p:cNvPicPr>
+            <a:picLocks noChangeAspect="1"/>
+          </p:cNvPicPr>
+          <p:nvPr/>
+        </p:nvPicPr>
+        <p:blipFill>
+          <a:blip r:embed="rId4"/>
+          <a:stretch>
+            <a:fillRect/>
+          </a:stretch>
+        </p:blipFill>
+        <p:spPr>
+          <a:xfrm>
+            <a:off x="2038350" y="1990725"/>
+            <a:ext cx="8115300" cy="2876550"/>
+          </a:xfrm>
+          <a:prstGeom prst="rect">
+            <a:avLst/>
+          </a:prstGeom>
+        </p:spPr>
+      </p:pic>
     </p:spTree>
     <p:extLst>
       <p:ext uri="{BB962C8B-B14F-4D97-AF65-F5344CB8AC3E}">
-        <p14:creationId xmlns:p14="http://schemas.microsoft.com/office/powerpoint/2010/main" val="1624858420"/>
+        <p14:creationId xmlns:p14="http://schemas.microsoft.com/office/powerpoint/2010/main" val="2866215550"/>
       </p:ext>
     </p:extLst>
   </p:cSld>
@@ -9700,7 +10009,7 @@
           <p:cNvPr id="4" name="Title 1">
             <a:extLst>
               <a:ext uri="{FF2B5EF4-FFF2-40B4-BE49-F238E27FC236}">
-                <a16:creationId xmlns:a16="http://schemas.microsoft.com/office/drawing/2014/main" id="{F5368745-AA74-613E-B78B-27EEEC7E472E}"/>
+                <a16:creationId xmlns:a16="http://schemas.microsoft.com/office/drawing/2014/main" id="{A46C90B0-0D80-23F9-716B-15E5F0B54B40}"/>
               </a:ext>
             </a:extLst>
           </p:cNvPr>
@@ -9724,18 +10033,27 @@
           <a:lstStyle/>
           <a:p>
             <a:r>
-              <a:rPr lang="en-US" b="1" i="0" u="sng" dirty="0">
+              <a:rPr lang="en-US" b="1" u="sng" dirty="0">
                 <a:solidFill>
                   <a:schemeClr val="accent1">
                     <a:lumMod val="50000"/>
                   </a:schemeClr>
                 </a:solidFill>
-                <a:effectLst/>
                 <a:latin typeface="Times New Roman" panose="02020603050405020304" pitchFamily="18" charset="0"/>
                 <a:cs typeface="Times New Roman" panose="02020603050405020304" pitchFamily="18" charset="0"/>
               </a:rPr>
-              <a:t>.</a:t>
-            </a:r>
+              <a:t>Array to strings</a:t>
+            </a:r>
+            <a:endParaRPr lang="en-US" b="1" i="0" u="sng" dirty="0">
+              <a:solidFill>
+                <a:schemeClr val="accent1">
+                  <a:lumMod val="50000"/>
+                </a:schemeClr>
+              </a:solidFill>
+              <a:effectLst/>
+              <a:latin typeface="Times New Roman" panose="02020603050405020304" pitchFamily="18" charset="0"/>
+              <a:cs typeface="Times New Roman" panose="02020603050405020304" pitchFamily="18" charset="0"/>
+            </a:endParaRPr>
           </a:p>
         </p:txBody>
       </p:sp>
@@ -9744,7 +10062,7 @@
           <p:cNvPr id="5" name="Picture 4">
             <a:extLst>
               <a:ext uri="{FF2B5EF4-FFF2-40B4-BE49-F238E27FC236}">
-                <a16:creationId xmlns:a16="http://schemas.microsoft.com/office/drawing/2014/main" id="{FCD96D84-EAE8-E2FE-DD6C-92B351A4AAAA}"/>
+                <a16:creationId xmlns:a16="http://schemas.microsoft.com/office/drawing/2014/main" id="{00FAFA57-8397-18AE-2DF2-BB60070B4C7F}"/>
               </a:ext>
             </a:extLst>
           </p:cNvPr>
@@ -9780,7 +10098,7 @@
           <p:cNvPr id="6" name="Picture 2" descr="What is JavaScript?">
             <a:extLst>
               <a:ext uri="{FF2B5EF4-FFF2-40B4-BE49-F238E27FC236}">
-                <a16:creationId xmlns:a16="http://schemas.microsoft.com/office/drawing/2014/main" id="{898F85E9-A195-3497-B050-013650468C6B}"/>
+                <a16:creationId xmlns:a16="http://schemas.microsoft.com/office/drawing/2014/main" id="{F0F8E035-42A3-3474-0C05-11EDE848DF43}"/>
               </a:ext>
             </a:extLst>
           </p:cNvPr>
@@ -9824,10 +10142,40 @@
           </a:extLst>
         </p:spPr>
       </p:pic>
+      <p:pic>
+        <p:nvPicPr>
+          <p:cNvPr id="3" name="Picture 2">
+            <a:extLst>
+              <a:ext uri="{FF2B5EF4-FFF2-40B4-BE49-F238E27FC236}">
+                <a16:creationId xmlns:a16="http://schemas.microsoft.com/office/drawing/2014/main" id="{AE776F87-5877-E854-9D53-63CBC93EE7D5}"/>
+              </a:ext>
+            </a:extLst>
+          </p:cNvPr>
+          <p:cNvPicPr>
+            <a:picLocks noChangeAspect="1"/>
+          </p:cNvPicPr>
+          <p:nvPr/>
+        </p:nvPicPr>
+        <p:blipFill>
+          <a:blip r:embed="rId4"/>
+          <a:stretch>
+            <a:fillRect/>
+          </a:stretch>
+        </p:blipFill>
+        <p:spPr>
+          <a:xfrm>
+            <a:off x="710978" y="1491906"/>
+            <a:ext cx="9289574" cy="4019208"/>
+          </a:xfrm>
+          <a:prstGeom prst="rect">
+            <a:avLst/>
+          </a:prstGeom>
+        </p:spPr>
+      </p:pic>
     </p:spTree>
     <p:extLst>
       <p:ext uri="{BB962C8B-B14F-4D97-AF65-F5344CB8AC3E}">
-        <p14:creationId xmlns:p14="http://schemas.microsoft.com/office/powerpoint/2010/main" val="1124991411"/>
+        <p14:creationId xmlns:p14="http://schemas.microsoft.com/office/powerpoint/2010/main" val="1624858420"/>
       </p:ext>
     </p:extLst>
   </p:cSld>
@@ -9968,6 +10316,1002 @@
     <p:extLst>
       <p:ext uri="{BB962C8B-B14F-4D97-AF65-F5344CB8AC3E}">
         <p14:creationId xmlns:p14="http://schemas.microsoft.com/office/powerpoint/2010/main" val="3402741234"/>
+      </p:ext>
+    </p:extLst>
+  </p:cSld>
+  <p:clrMapOvr>
+    <a:masterClrMapping/>
+  </p:clrMapOvr>
+</p:sld>
+</file>
+
+<file path=ppt/slides/slide40.xml><?xml version="1.0" encoding="utf-8"?>
+<p:sld xmlns:a="http://schemas.openxmlformats.org/drawingml/2006/main" xmlns:r="http://schemas.openxmlformats.org/officeDocument/2006/relationships" xmlns:p="http://schemas.openxmlformats.org/presentationml/2006/main">
+  <p:cSld>
+    <p:spTree>
+      <p:nvGrpSpPr>
+        <p:cNvPr id="1" name=""/>
+        <p:cNvGrpSpPr/>
+        <p:nvPr/>
+      </p:nvGrpSpPr>
+      <p:grpSpPr>
+        <a:xfrm>
+          <a:off x="0" y="0"/>
+          <a:ext cx="0" cy="0"/>
+          <a:chOff x="0" y="0"/>
+          <a:chExt cx="0" cy="0"/>
+        </a:xfrm>
+      </p:grpSpPr>
+      <p:sp>
+        <p:nvSpPr>
+          <p:cNvPr id="4" name="Title 1">
+            <a:extLst>
+              <a:ext uri="{FF2B5EF4-FFF2-40B4-BE49-F238E27FC236}">
+                <a16:creationId xmlns:a16="http://schemas.microsoft.com/office/drawing/2014/main" id="{F5368745-AA74-613E-B78B-27EEEC7E472E}"/>
+              </a:ext>
+            </a:extLst>
+          </p:cNvPr>
+          <p:cNvSpPr>
+            <a:spLocks noGrp="1"/>
+          </p:cNvSpPr>
+          <p:nvPr>
+            <p:ph type="title"/>
+          </p:nvPr>
+        </p:nvSpPr>
+        <p:spPr>
+          <a:xfrm>
+            <a:off x="710978" y="318053"/>
+            <a:ext cx="7566329" cy="1173853"/>
+          </a:xfrm>
+        </p:spPr>
+        <p:txBody>
+          <a:bodyPr>
+            <a:normAutofit/>
+          </a:bodyPr>
+          <a:lstStyle/>
+          <a:p>
+            <a:r>
+              <a:rPr lang="en-US" b="1" i="0" u="sng" dirty="0">
+                <a:solidFill>
+                  <a:schemeClr val="accent1">
+                    <a:lumMod val="50000"/>
+                  </a:schemeClr>
+                </a:solidFill>
+                <a:effectLst/>
+                <a:latin typeface="Times New Roman" panose="02020603050405020304" pitchFamily="18" charset="0"/>
+                <a:cs typeface="Times New Roman" panose="02020603050405020304" pitchFamily="18" charset="0"/>
+              </a:rPr>
+              <a:t>.</a:t>
+            </a:r>
+          </a:p>
+        </p:txBody>
+      </p:sp>
+      <p:pic>
+        <p:nvPicPr>
+          <p:cNvPr id="5" name="Picture 4">
+            <a:extLst>
+              <a:ext uri="{FF2B5EF4-FFF2-40B4-BE49-F238E27FC236}">
+                <a16:creationId xmlns:a16="http://schemas.microsoft.com/office/drawing/2014/main" id="{FCD96D84-EAE8-E2FE-DD6C-92B351A4AAAA}"/>
+              </a:ext>
+            </a:extLst>
+          </p:cNvPr>
+          <p:cNvPicPr>
+            <a:picLocks noChangeAspect="1"/>
+          </p:cNvPicPr>
+          <p:nvPr/>
+        </p:nvPicPr>
+        <p:blipFill>
+          <a:blip r:embed="rId2">
+            <a:extLst>
+              <a:ext uri="{28A0092B-C50C-407E-A947-70E740481C1C}">
+                <a14:useLocalDpi xmlns:a14="http://schemas.microsoft.com/office/drawing/2010/main" val="0"/>
+              </a:ext>
+            </a:extLst>
+          </a:blip>
+          <a:stretch>
+            <a:fillRect/>
+          </a:stretch>
+        </p:blipFill>
+        <p:spPr>
+          <a:xfrm>
+            <a:off x="10969210" y="718478"/>
+            <a:ext cx="769180" cy="618855"/>
+          </a:xfrm>
+          <a:prstGeom prst="rect">
+            <a:avLst/>
+          </a:prstGeom>
+        </p:spPr>
+      </p:pic>
+      <p:pic>
+        <p:nvPicPr>
+          <p:cNvPr id="6" name="Picture 2" descr="What is JavaScript?">
+            <a:extLst>
+              <a:ext uri="{FF2B5EF4-FFF2-40B4-BE49-F238E27FC236}">
+                <a16:creationId xmlns:a16="http://schemas.microsoft.com/office/drawing/2014/main" id="{898F85E9-A195-3497-B050-013650468C6B}"/>
+              </a:ext>
+            </a:extLst>
+          </p:cNvPr>
+          <p:cNvPicPr>
+            <a:picLocks noGrp="1" noChangeAspect="1" noChangeArrowheads="1"/>
+          </p:cNvPicPr>
+          <p:nvPr>
+            <p:ph idx="1"/>
+          </p:nvPr>
+        </p:nvPicPr>
+        <p:blipFill>
+          <a:blip r:embed="rId3">
+            <a:extLst>
+              <a:ext uri="{28A0092B-C50C-407E-A947-70E740481C1C}">
+                <a14:useLocalDpi xmlns:a14="http://schemas.microsoft.com/office/drawing/2010/main" val="0"/>
+              </a:ext>
+            </a:extLst>
+          </a:blip>
+          <a:srcRect/>
+          <a:stretch>
+            <a:fillRect/>
+          </a:stretch>
+        </p:blipFill>
+        <p:spPr bwMode="auto">
+          <a:xfrm>
+            <a:off x="10763494" y="5653201"/>
+            <a:ext cx="857627" cy="857627"/>
+          </a:xfrm>
+          <a:prstGeom prst="rect">
+            <a:avLst/>
+          </a:prstGeom>
+          <a:noFill/>
+          <a:extLst>
+            <a:ext uri="{909E8E84-426E-40DD-AFC4-6F175D3DCCD1}">
+              <a14:hiddenFill xmlns:a14="http://schemas.microsoft.com/office/drawing/2010/main">
+                <a:solidFill>
+                  <a:srgbClr val="FFFFFF"/>
+                </a:solidFill>
+              </a14:hiddenFill>
+            </a:ext>
+          </a:extLst>
+        </p:spPr>
+      </p:pic>
+      <p:pic>
+        <p:nvPicPr>
+          <p:cNvPr id="3" name="Picture 2">
+            <a:extLst>
+              <a:ext uri="{FF2B5EF4-FFF2-40B4-BE49-F238E27FC236}">
+                <a16:creationId xmlns:a16="http://schemas.microsoft.com/office/drawing/2014/main" id="{A7C9577C-6EC1-8F9E-2F53-4A7052D8246B}"/>
+              </a:ext>
+            </a:extLst>
+          </p:cNvPr>
+          <p:cNvPicPr>
+            <a:picLocks noChangeAspect="1"/>
+          </p:cNvPicPr>
+          <p:nvPr/>
+        </p:nvPicPr>
+        <p:blipFill>
+          <a:blip r:embed="rId4"/>
+          <a:stretch>
+            <a:fillRect/>
+          </a:stretch>
+        </p:blipFill>
+        <p:spPr>
+          <a:xfrm>
+            <a:off x="864200" y="1337333"/>
+            <a:ext cx="6534150" cy="3228975"/>
+          </a:xfrm>
+          <a:prstGeom prst="rect">
+            <a:avLst/>
+          </a:prstGeom>
+        </p:spPr>
+      </p:pic>
+    </p:spTree>
+    <p:extLst>
+      <p:ext uri="{BB962C8B-B14F-4D97-AF65-F5344CB8AC3E}">
+        <p14:creationId xmlns:p14="http://schemas.microsoft.com/office/powerpoint/2010/main" val="1124991411"/>
+      </p:ext>
+    </p:extLst>
+  </p:cSld>
+  <p:clrMapOvr>
+    <a:masterClrMapping/>
+  </p:clrMapOvr>
+</p:sld>
+</file>
+
+<file path=ppt/slides/slide41.xml><?xml version="1.0" encoding="utf-8"?>
+<p:sld xmlns:a="http://schemas.openxmlformats.org/drawingml/2006/main" xmlns:r="http://schemas.openxmlformats.org/officeDocument/2006/relationships" xmlns:p="http://schemas.openxmlformats.org/presentationml/2006/main">
+  <p:cSld>
+    <p:spTree>
+      <p:nvGrpSpPr>
+        <p:cNvPr id="1" name=""/>
+        <p:cNvGrpSpPr/>
+        <p:nvPr/>
+      </p:nvGrpSpPr>
+      <p:grpSpPr>
+        <a:xfrm>
+          <a:off x="0" y="0"/>
+          <a:ext cx="0" cy="0"/>
+          <a:chOff x="0" y="0"/>
+          <a:chExt cx="0" cy="0"/>
+        </a:xfrm>
+      </p:grpSpPr>
+      <p:sp>
+        <p:nvSpPr>
+          <p:cNvPr id="4" name="Title 1">
+            <a:extLst>
+              <a:ext uri="{FF2B5EF4-FFF2-40B4-BE49-F238E27FC236}">
+                <a16:creationId xmlns:a16="http://schemas.microsoft.com/office/drawing/2014/main" id="{135C6B51-0BFC-38B4-5ACE-89046397A55E}"/>
+              </a:ext>
+            </a:extLst>
+          </p:cNvPr>
+          <p:cNvSpPr>
+            <a:spLocks noGrp="1"/>
+          </p:cNvSpPr>
+          <p:nvPr>
+            <p:ph type="title"/>
+          </p:nvPr>
+        </p:nvSpPr>
+        <p:spPr>
+          <a:xfrm>
+            <a:off x="710978" y="318053"/>
+            <a:ext cx="7566329" cy="1173853"/>
+          </a:xfrm>
+        </p:spPr>
+        <p:txBody>
+          <a:bodyPr>
+            <a:normAutofit/>
+          </a:bodyPr>
+          <a:lstStyle/>
+          <a:p>
+            <a:r>
+              <a:rPr lang="en-US" b="1" i="0" u="sng" dirty="0">
+                <a:solidFill>
+                  <a:schemeClr val="accent1">
+                    <a:lumMod val="50000"/>
+                  </a:schemeClr>
+                </a:solidFill>
+                <a:effectLst/>
+                <a:latin typeface="Times New Roman" panose="02020603050405020304" pitchFamily="18" charset="0"/>
+                <a:cs typeface="Times New Roman" panose="02020603050405020304" pitchFamily="18" charset="0"/>
+              </a:rPr>
+              <a:t>.</a:t>
+            </a:r>
+          </a:p>
+        </p:txBody>
+      </p:sp>
+      <p:pic>
+        <p:nvPicPr>
+          <p:cNvPr id="5" name="Picture 4">
+            <a:extLst>
+              <a:ext uri="{FF2B5EF4-FFF2-40B4-BE49-F238E27FC236}">
+                <a16:creationId xmlns:a16="http://schemas.microsoft.com/office/drawing/2014/main" id="{A2839B17-BF41-BABF-BB68-4F2278409F48}"/>
+              </a:ext>
+            </a:extLst>
+          </p:cNvPr>
+          <p:cNvPicPr>
+            <a:picLocks noChangeAspect="1"/>
+          </p:cNvPicPr>
+          <p:nvPr/>
+        </p:nvPicPr>
+        <p:blipFill>
+          <a:blip r:embed="rId2">
+            <a:extLst>
+              <a:ext uri="{28A0092B-C50C-407E-A947-70E740481C1C}">
+                <a14:useLocalDpi xmlns:a14="http://schemas.microsoft.com/office/drawing/2010/main" val="0"/>
+              </a:ext>
+            </a:extLst>
+          </a:blip>
+          <a:stretch>
+            <a:fillRect/>
+          </a:stretch>
+        </p:blipFill>
+        <p:spPr>
+          <a:xfrm>
+            <a:off x="10969210" y="718478"/>
+            <a:ext cx="769180" cy="618855"/>
+          </a:xfrm>
+          <a:prstGeom prst="rect">
+            <a:avLst/>
+          </a:prstGeom>
+        </p:spPr>
+      </p:pic>
+      <p:pic>
+        <p:nvPicPr>
+          <p:cNvPr id="6" name="Picture 2" descr="What is JavaScript?">
+            <a:extLst>
+              <a:ext uri="{FF2B5EF4-FFF2-40B4-BE49-F238E27FC236}">
+                <a16:creationId xmlns:a16="http://schemas.microsoft.com/office/drawing/2014/main" id="{2D4056F1-F696-2334-476A-C41B3140333C}"/>
+              </a:ext>
+            </a:extLst>
+          </p:cNvPr>
+          <p:cNvPicPr>
+            <a:picLocks noGrp="1" noChangeAspect="1" noChangeArrowheads="1"/>
+          </p:cNvPicPr>
+          <p:nvPr>
+            <p:ph idx="1"/>
+          </p:nvPr>
+        </p:nvPicPr>
+        <p:blipFill>
+          <a:blip r:embed="rId3">
+            <a:extLst>
+              <a:ext uri="{28A0092B-C50C-407E-A947-70E740481C1C}">
+                <a14:useLocalDpi xmlns:a14="http://schemas.microsoft.com/office/drawing/2010/main" val="0"/>
+              </a:ext>
+            </a:extLst>
+          </a:blip>
+          <a:srcRect/>
+          <a:stretch>
+            <a:fillRect/>
+          </a:stretch>
+        </p:blipFill>
+        <p:spPr bwMode="auto">
+          <a:xfrm>
+            <a:off x="10763494" y="5653201"/>
+            <a:ext cx="857627" cy="857627"/>
+          </a:xfrm>
+          <a:prstGeom prst="rect">
+            <a:avLst/>
+          </a:prstGeom>
+          <a:noFill/>
+          <a:extLst>
+            <a:ext uri="{909E8E84-426E-40DD-AFC4-6F175D3DCCD1}">
+              <a14:hiddenFill xmlns:a14="http://schemas.microsoft.com/office/drawing/2010/main">
+                <a:solidFill>
+                  <a:srgbClr val="FFFFFF"/>
+                </a:solidFill>
+              </a14:hiddenFill>
+            </a:ext>
+          </a:extLst>
+        </p:spPr>
+      </p:pic>
+      <p:pic>
+        <p:nvPicPr>
+          <p:cNvPr id="8" name="Picture 7">
+            <a:extLst>
+              <a:ext uri="{FF2B5EF4-FFF2-40B4-BE49-F238E27FC236}">
+                <a16:creationId xmlns:a16="http://schemas.microsoft.com/office/drawing/2014/main" id="{01548F2D-1467-288E-E447-8B1B60E36C7A}"/>
+              </a:ext>
+            </a:extLst>
+          </p:cNvPr>
+          <p:cNvPicPr>
+            <a:picLocks noChangeAspect="1"/>
+          </p:cNvPicPr>
+          <p:nvPr/>
+        </p:nvPicPr>
+        <p:blipFill>
+          <a:blip r:embed="rId4"/>
+          <a:stretch>
+            <a:fillRect/>
+          </a:stretch>
+        </p:blipFill>
+        <p:spPr>
+          <a:xfrm>
+            <a:off x="802030" y="1491906"/>
+            <a:ext cx="7820025" cy="2438400"/>
+          </a:xfrm>
+          <a:prstGeom prst="rect">
+            <a:avLst/>
+          </a:prstGeom>
+        </p:spPr>
+      </p:pic>
+    </p:spTree>
+    <p:extLst>
+      <p:ext uri="{BB962C8B-B14F-4D97-AF65-F5344CB8AC3E}">
+        <p14:creationId xmlns:p14="http://schemas.microsoft.com/office/powerpoint/2010/main" val="3595280056"/>
+      </p:ext>
+    </p:extLst>
+  </p:cSld>
+  <p:clrMapOvr>
+    <a:masterClrMapping/>
+  </p:clrMapOvr>
+</p:sld>
+</file>
+
+<file path=ppt/slides/slide42.xml><?xml version="1.0" encoding="utf-8"?>
+<p:sld xmlns:a="http://schemas.openxmlformats.org/drawingml/2006/main" xmlns:r="http://schemas.openxmlformats.org/officeDocument/2006/relationships" xmlns:p="http://schemas.openxmlformats.org/presentationml/2006/main">
+  <p:cSld>
+    <p:spTree>
+      <p:nvGrpSpPr>
+        <p:cNvPr id="1" name=""/>
+        <p:cNvGrpSpPr/>
+        <p:nvPr/>
+      </p:nvGrpSpPr>
+      <p:grpSpPr>
+        <a:xfrm>
+          <a:off x="0" y="0"/>
+          <a:ext cx="0" cy="0"/>
+          <a:chOff x="0" y="0"/>
+          <a:chExt cx="0" cy="0"/>
+        </a:xfrm>
+      </p:grpSpPr>
+      <p:sp>
+        <p:nvSpPr>
+          <p:cNvPr id="4" name="Title 1">
+            <a:extLst>
+              <a:ext uri="{FF2B5EF4-FFF2-40B4-BE49-F238E27FC236}">
+                <a16:creationId xmlns:a16="http://schemas.microsoft.com/office/drawing/2014/main" id="{02F0178C-8570-38BF-6006-78E8395C78BA}"/>
+              </a:ext>
+            </a:extLst>
+          </p:cNvPr>
+          <p:cNvSpPr>
+            <a:spLocks noGrp="1"/>
+          </p:cNvSpPr>
+          <p:nvPr>
+            <p:ph type="title"/>
+          </p:nvPr>
+        </p:nvSpPr>
+        <p:spPr>
+          <a:xfrm>
+            <a:off x="710978" y="318053"/>
+            <a:ext cx="7566329" cy="1173853"/>
+          </a:xfrm>
+        </p:spPr>
+        <p:txBody>
+          <a:bodyPr>
+            <a:normAutofit/>
+          </a:bodyPr>
+          <a:lstStyle/>
+          <a:p>
+            <a:r>
+              <a:rPr lang="en-US" b="1" i="0" u="sng" dirty="0">
+                <a:solidFill>
+                  <a:schemeClr val="accent1">
+                    <a:lumMod val="50000"/>
+                  </a:schemeClr>
+                </a:solidFill>
+                <a:effectLst/>
+                <a:latin typeface="Times New Roman" panose="02020603050405020304" pitchFamily="18" charset="0"/>
+                <a:cs typeface="Times New Roman" panose="02020603050405020304" pitchFamily="18" charset="0"/>
+              </a:rPr>
+              <a:t>.</a:t>
+            </a:r>
+          </a:p>
+        </p:txBody>
+      </p:sp>
+      <p:pic>
+        <p:nvPicPr>
+          <p:cNvPr id="5" name="Picture 4">
+            <a:extLst>
+              <a:ext uri="{FF2B5EF4-FFF2-40B4-BE49-F238E27FC236}">
+                <a16:creationId xmlns:a16="http://schemas.microsoft.com/office/drawing/2014/main" id="{68E0909E-F831-4CB2-3125-1C009B1DAFE5}"/>
+              </a:ext>
+            </a:extLst>
+          </p:cNvPr>
+          <p:cNvPicPr>
+            <a:picLocks noChangeAspect="1"/>
+          </p:cNvPicPr>
+          <p:nvPr/>
+        </p:nvPicPr>
+        <p:blipFill>
+          <a:blip r:embed="rId2">
+            <a:extLst>
+              <a:ext uri="{28A0092B-C50C-407E-A947-70E740481C1C}">
+                <a14:useLocalDpi xmlns:a14="http://schemas.microsoft.com/office/drawing/2010/main" val="0"/>
+              </a:ext>
+            </a:extLst>
+          </a:blip>
+          <a:stretch>
+            <a:fillRect/>
+          </a:stretch>
+        </p:blipFill>
+        <p:spPr>
+          <a:xfrm>
+            <a:off x="10969210" y="718478"/>
+            <a:ext cx="769180" cy="618855"/>
+          </a:xfrm>
+          <a:prstGeom prst="rect">
+            <a:avLst/>
+          </a:prstGeom>
+        </p:spPr>
+      </p:pic>
+      <p:pic>
+        <p:nvPicPr>
+          <p:cNvPr id="6" name="Picture 2" descr="What is JavaScript?">
+            <a:extLst>
+              <a:ext uri="{FF2B5EF4-FFF2-40B4-BE49-F238E27FC236}">
+                <a16:creationId xmlns:a16="http://schemas.microsoft.com/office/drawing/2014/main" id="{F60F8738-28C9-1F53-892B-18BE6B1A505A}"/>
+              </a:ext>
+            </a:extLst>
+          </p:cNvPr>
+          <p:cNvPicPr>
+            <a:picLocks noGrp="1" noChangeAspect="1" noChangeArrowheads="1"/>
+          </p:cNvPicPr>
+          <p:nvPr>
+            <p:ph idx="1"/>
+          </p:nvPr>
+        </p:nvPicPr>
+        <p:blipFill>
+          <a:blip r:embed="rId3">
+            <a:extLst>
+              <a:ext uri="{28A0092B-C50C-407E-A947-70E740481C1C}">
+                <a14:useLocalDpi xmlns:a14="http://schemas.microsoft.com/office/drawing/2010/main" val="0"/>
+              </a:ext>
+            </a:extLst>
+          </a:blip>
+          <a:srcRect/>
+          <a:stretch>
+            <a:fillRect/>
+          </a:stretch>
+        </p:blipFill>
+        <p:spPr bwMode="auto">
+          <a:xfrm>
+            <a:off x="10763494" y="5653201"/>
+            <a:ext cx="857627" cy="857627"/>
+          </a:xfrm>
+          <a:prstGeom prst="rect">
+            <a:avLst/>
+          </a:prstGeom>
+          <a:noFill/>
+          <a:extLst>
+            <a:ext uri="{909E8E84-426E-40DD-AFC4-6F175D3DCCD1}">
+              <a14:hiddenFill xmlns:a14="http://schemas.microsoft.com/office/drawing/2010/main">
+                <a:solidFill>
+                  <a:srgbClr val="FFFFFF"/>
+                </a:solidFill>
+              </a14:hiddenFill>
+            </a:ext>
+          </a:extLst>
+        </p:spPr>
+      </p:pic>
+      <p:pic>
+        <p:nvPicPr>
+          <p:cNvPr id="8" name="Picture 7">
+            <a:extLst>
+              <a:ext uri="{FF2B5EF4-FFF2-40B4-BE49-F238E27FC236}">
+                <a16:creationId xmlns:a16="http://schemas.microsoft.com/office/drawing/2014/main" id="{CA77ED14-2969-C491-3256-D6B08F474ADD}"/>
+              </a:ext>
+            </a:extLst>
+          </p:cNvPr>
+          <p:cNvPicPr>
+            <a:picLocks noChangeAspect="1"/>
+          </p:cNvPicPr>
+          <p:nvPr/>
+        </p:nvPicPr>
+        <p:blipFill>
+          <a:blip r:embed="rId4"/>
+          <a:stretch>
+            <a:fillRect/>
+          </a:stretch>
+        </p:blipFill>
+        <p:spPr>
+          <a:xfrm>
+            <a:off x="1214437" y="904979"/>
+            <a:ext cx="6105525" cy="2486025"/>
+          </a:xfrm>
+          <a:prstGeom prst="rect">
+            <a:avLst/>
+          </a:prstGeom>
+        </p:spPr>
+      </p:pic>
+      <p:pic>
+        <p:nvPicPr>
+          <p:cNvPr id="10" name="Picture 9">
+            <a:extLst>
+              <a:ext uri="{FF2B5EF4-FFF2-40B4-BE49-F238E27FC236}">
+                <a16:creationId xmlns:a16="http://schemas.microsoft.com/office/drawing/2014/main" id="{6E9334D6-7F0D-7AF6-8746-3E61E2D5C14F}"/>
+              </a:ext>
+            </a:extLst>
+          </p:cNvPr>
+          <p:cNvPicPr>
+            <a:picLocks noChangeAspect="1"/>
+          </p:cNvPicPr>
+          <p:nvPr/>
+        </p:nvPicPr>
+        <p:blipFill>
+          <a:blip r:embed="rId5"/>
+          <a:stretch>
+            <a:fillRect/>
+          </a:stretch>
+        </p:blipFill>
+        <p:spPr>
+          <a:xfrm>
+            <a:off x="1214437" y="3605326"/>
+            <a:ext cx="6105524" cy="2047875"/>
+          </a:xfrm>
+          <a:prstGeom prst="rect">
+            <a:avLst/>
+          </a:prstGeom>
+        </p:spPr>
+      </p:pic>
+    </p:spTree>
+    <p:extLst>
+      <p:ext uri="{BB962C8B-B14F-4D97-AF65-F5344CB8AC3E}">
+        <p14:creationId xmlns:p14="http://schemas.microsoft.com/office/powerpoint/2010/main" val="3641283934"/>
+      </p:ext>
+    </p:extLst>
+  </p:cSld>
+  <p:clrMapOvr>
+    <a:masterClrMapping/>
+  </p:clrMapOvr>
+</p:sld>
+</file>
+
+<file path=ppt/slides/slide43.xml><?xml version="1.0" encoding="utf-8"?>
+<p:sld xmlns:a="http://schemas.openxmlformats.org/drawingml/2006/main" xmlns:r="http://schemas.openxmlformats.org/officeDocument/2006/relationships" xmlns:p="http://schemas.openxmlformats.org/presentationml/2006/main">
+  <p:cSld>
+    <p:spTree>
+      <p:nvGrpSpPr>
+        <p:cNvPr id="1" name=""/>
+        <p:cNvGrpSpPr/>
+        <p:nvPr/>
+      </p:nvGrpSpPr>
+      <p:grpSpPr>
+        <a:xfrm>
+          <a:off x="0" y="0"/>
+          <a:ext cx="0" cy="0"/>
+          <a:chOff x="0" y="0"/>
+          <a:chExt cx="0" cy="0"/>
+        </a:xfrm>
+      </p:grpSpPr>
+      <p:sp>
+        <p:nvSpPr>
+          <p:cNvPr id="4" name="Title 1">
+            <a:extLst>
+              <a:ext uri="{FF2B5EF4-FFF2-40B4-BE49-F238E27FC236}">
+                <a16:creationId xmlns:a16="http://schemas.microsoft.com/office/drawing/2014/main" id="{B561301F-0753-890D-D0F0-D00A1C8BA5C6}"/>
+              </a:ext>
+            </a:extLst>
+          </p:cNvPr>
+          <p:cNvSpPr>
+            <a:spLocks noGrp="1"/>
+          </p:cNvSpPr>
+          <p:nvPr>
+            <p:ph type="title"/>
+          </p:nvPr>
+        </p:nvSpPr>
+        <p:spPr>
+          <a:xfrm>
+            <a:off x="710978" y="318053"/>
+            <a:ext cx="7566329" cy="1173853"/>
+          </a:xfrm>
+        </p:spPr>
+        <p:txBody>
+          <a:bodyPr>
+            <a:normAutofit/>
+          </a:bodyPr>
+          <a:lstStyle/>
+          <a:p>
+            <a:r>
+              <a:rPr lang="en-US" b="1" i="0" u="sng" dirty="0">
+                <a:solidFill>
+                  <a:schemeClr val="accent1">
+                    <a:lumMod val="50000"/>
+                  </a:schemeClr>
+                </a:solidFill>
+                <a:effectLst/>
+                <a:latin typeface="Times New Roman" panose="02020603050405020304" pitchFamily="18" charset="0"/>
+                <a:cs typeface="Times New Roman" panose="02020603050405020304" pitchFamily="18" charset="0"/>
+              </a:rPr>
+              <a:t>.</a:t>
+            </a:r>
+          </a:p>
+        </p:txBody>
+      </p:sp>
+      <p:pic>
+        <p:nvPicPr>
+          <p:cNvPr id="5" name="Picture 4">
+            <a:extLst>
+              <a:ext uri="{FF2B5EF4-FFF2-40B4-BE49-F238E27FC236}">
+                <a16:creationId xmlns:a16="http://schemas.microsoft.com/office/drawing/2014/main" id="{DDDB8DC8-74FC-18F2-9AF8-96AFB04D4490}"/>
+              </a:ext>
+            </a:extLst>
+          </p:cNvPr>
+          <p:cNvPicPr>
+            <a:picLocks noChangeAspect="1"/>
+          </p:cNvPicPr>
+          <p:nvPr/>
+        </p:nvPicPr>
+        <p:blipFill>
+          <a:blip r:embed="rId2">
+            <a:extLst>
+              <a:ext uri="{28A0092B-C50C-407E-A947-70E740481C1C}">
+                <a14:useLocalDpi xmlns:a14="http://schemas.microsoft.com/office/drawing/2010/main" val="0"/>
+              </a:ext>
+            </a:extLst>
+          </a:blip>
+          <a:stretch>
+            <a:fillRect/>
+          </a:stretch>
+        </p:blipFill>
+        <p:spPr>
+          <a:xfrm>
+            <a:off x="10969210" y="718478"/>
+            <a:ext cx="769180" cy="618855"/>
+          </a:xfrm>
+          <a:prstGeom prst="rect">
+            <a:avLst/>
+          </a:prstGeom>
+        </p:spPr>
+      </p:pic>
+      <p:pic>
+        <p:nvPicPr>
+          <p:cNvPr id="6" name="Picture 2" descr="What is JavaScript?">
+            <a:extLst>
+              <a:ext uri="{FF2B5EF4-FFF2-40B4-BE49-F238E27FC236}">
+                <a16:creationId xmlns:a16="http://schemas.microsoft.com/office/drawing/2014/main" id="{3429A0A3-0F76-B295-AA9C-0D27AEFF061F}"/>
+              </a:ext>
+            </a:extLst>
+          </p:cNvPr>
+          <p:cNvPicPr>
+            <a:picLocks noGrp="1" noChangeAspect="1" noChangeArrowheads="1"/>
+          </p:cNvPicPr>
+          <p:nvPr>
+            <p:ph idx="1"/>
+          </p:nvPr>
+        </p:nvPicPr>
+        <p:blipFill>
+          <a:blip r:embed="rId3">
+            <a:extLst>
+              <a:ext uri="{28A0092B-C50C-407E-A947-70E740481C1C}">
+                <a14:useLocalDpi xmlns:a14="http://schemas.microsoft.com/office/drawing/2010/main" val="0"/>
+              </a:ext>
+            </a:extLst>
+          </a:blip>
+          <a:srcRect/>
+          <a:stretch>
+            <a:fillRect/>
+          </a:stretch>
+        </p:blipFill>
+        <p:spPr bwMode="auto">
+          <a:xfrm>
+            <a:off x="10763494" y="5653201"/>
+            <a:ext cx="857627" cy="857627"/>
+          </a:xfrm>
+          <a:prstGeom prst="rect">
+            <a:avLst/>
+          </a:prstGeom>
+          <a:noFill/>
+          <a:extLst>
+            <a:ext uri="{909E8E84-426E-40DD-AFC4-6F175D3DCCD1}">
+              <a14:hiddenFill xmlns:a14="http://schemas.microsoft.com/office/drawing/2010/main">
+                <a:solidFill>
+                  <a:srgbClr val="FFFFFF"/>
+                </a:solidFill>
+              </a14:hiddenFill>
+            </a:ext>
+          </a:extLst>
+        </p:spPr>
+      </p:pic>
+      <p:pic>
+        <p:nvPicPr>
+          <p:cNvPr id="8" name="Picture 7">
+            <a:extLst>
+              <a:ext uri="{FF2B5EF4-FFF2-40B4-BE49-F238E27FC236}">
+                <a16:creationId xmlns:a16="http://schemas.microsoft.com/office/drawing/2014/main" id="{C87FCAE7-FB81-B786-D5A5-814115BE8EA2}"/>
+              </a:ext>
+            </a:extLst>
+          </p:cNvPr>
+          <p:cNvPicPr>
+            <a:picLocks noChangeAspect="1"/>
+          </p:cNvPicPr>
+          <p:nvPr/>
+        </p:nvPicPr>
+        <p:blipFill>
+          <a:blip r:embed="rId4"/>
+          <a:stretch>
+            <a:fillRect/>
+          </a:stretch>
+        </p:blipFill>
+        <p:spPr>
+          <a:xfrm>
+            <a:off x="1130128" y="933450"/>
+            <a:ext cx="7658100" cy="2495550"/>
+          </a:xfrm>
+          <a:prstGeom prst="rect">
+            <a:avLst/>
+          </a:prstGeom>
+        </p:spPr>
+      </p:pic>
+      <p:pic>
+        <p:nvPicPr>
+          <p:cNvPr id="10" name="Picture 9">
+            <a:extLst>
+              <a:ext uri="{FF2B5EF4-FFF2-40B4-BE49-F238E27FC236}">
+                <a16:creationId xmlns:a16="http://schemas.microsoft.com/office/drawing/2014/main" id="{D0791C3E-F29E-BD05-A442-F2EE1294D09F}"/>
+              </a:ext>
+            </a:extLst>
+          </p:cNvPr>
+          <p:cNvPicPr>
+            <a:picLocks noChangeAspect="1"/>
+          </p:cNvPicPr>
+          <p:nvPr/>
+        </p:nvPicPr>
+        <p:blipFill>
+          <a:blip r:embed="rId5"/>
+          <a:stretch>
+            <a:fillRect/>
+          </a:stretch>
+        </p:blipFill>
+        <p:spPr>
+          <a:xfrm>
+            <a:off x="1130128" y="3768811"/>
+            <a:ext cx="7771631" cy="2313203"/>
+          </a:xfrm>
+          <a:prstGeom prst="rect">
+            <a:avLst/>
+          </a:prstGeom>
+        </p:spPr>
+      </p:pic>
+    </p:spTree>
+    <p:extLst>
+      <p:ext uri="{BB962C8B-B14F-4D97-AF65-F5344CB8AC3E}">
+        <p14:creationId xmlns:p14="http://schemas.microsoft.com/office/powerpoint/2010/main" val="301264884"/>
+      </p:ext>
+    </p:extLst>
+  </p:cSld>
+  <p:clrMapOvr>
+    <a:masterClrMapping/>
+  </p:clrMapOvr>
+</p:sld>
+</file>
+
+<file path=ppt/slides/slide44.xml><?xml version="1.0" encoding="utf-8"?>
+<p:sld xmlns:a="http://schemas.openxmlformats.org/drawingml/2006/main" xmlns:r="http://schemas.openxmlformats.org/officeDocument/2006/relationships" xmlns:p="http://schemas.openxmlformats.org/presentationml/2006/main">
+  <p:cSld>
+    <p:spTree>
+      <p:nvGrpSpPr>
+        <p:cNvPr id="1" name=""/>
+        <p:cNvGrpSpPr/>
+        <p:nvPr/>
+      </p:nvGrpSpPr>
+      <p:grpSpPr>
+        <a:xfrm>
+          <a:off x="0" y="0"/>
+          <a:ext cx="0" cy="0"/>
+          <a:chOff x="0" y="0"/>
+          <a:chExt cx="0" cy="0"/>
+        </a:xfrm>
+      </p:grpSpPr>
+      <p:pic>
+        <p:nvPicPr>
+          <p:cNvPr id="5" name="Picture 4">
+            <a:extLst>
+              <a:ext uri="{FF2B5EF4-FFF2-40B4-BE49-F238E27FC236}">
+                <a16:creationId xmlns:a16="http://schemas.microsoft.com/office/drawing/2014/main" id="{1BAD51B5-5756-9C4F-F0CC-66FD5150FC0E}"/>
+              </a:ext>
+            </a:extLst>
+          </p:cNvPr>
+          <p:cNvPicPr>
+            <a:picLocks noChangeAspect="1"/>
+          </p:cNvPicPr>
+          <p:nvPr/>
+        </p:nvPicPr>
+        <p:blipFill>
+          <a:blip r:embed="rId2"/>
+          <a:stretch>
+            <a:fillRect/>
+          </a:stretch>
+        </p:blipFill>
+        <p:spPr>
+          <a:xfrm>
+            <a:off x="486160" y="523875"/>
+            <a:ext cx="7191375" cy="2905125"/>
+          </a:xfrm>
+          <a:prstGeom prst="rect">
+            <a:avLst/>
+          </a:prstGeom>
+        </p:spPr>
+      </p:pic>
+      <p:pic>
+        <p:nvPicPr>
+          <p:cNvPr id="7" name="Picture 6">
+            <a:extLst>
+              <a:ext uri="{FF2B5EF4-FFF2-40B4-BE49-F238E27FC236}">
+                <a16:creationId xmlns:a16="http://schemas.microsoft.com/office/drawing/2014/main" id="{C6A94543-ED09-1E1C-270A-DF28EDD3863B}"/>
+              </a:ext>
+            </a:extLst>
+          </p:cNvPr>
+          <p:cNvPicPr>
+            <a:picLocks noChangeAspect="1"/>
+          </p:cNvPicPr>
+          <p:nvPr/>
+        </p:nvPicPr>
+        <p:blipFill>
+          <a:blip r:embed="rId3"/>
+          <a:stretch>
+            <a:fillRect/>
+          </a:stretch>
+        </p:blipFill>
+        <p:spPr>
+          <a:xfrm>
+            <a:off x="6384450" y="1976437"/>
+            <a:ext cx="5695950" cy="942975"/>
+          </a:xfrm>
+          <a:prstGeom prst="rect">
+            <a:avLst/>
+          </a:prstGeom>
+        </p:spPr>
+      </p:pic>
+      <p:pic>
+        <p:nvPicPr>
+          <p:cNvPr id="9" name="Picture 8">
+            <a:extLst>
+              <a:ext uri="{FF2B5EF4-FFF2-40B4-BE49-F238E27FC236}">
+                <a16:creationId xmlns:a16="http://schemas.microsoft.com/office/drawing/2014/main" id="{71F79BD3-4CF4-1945-1010-DF829E236564}"/>
+              </a:ext>
+            </a:extLst>
+          </p:cNvPr>
+          <p:cNvPicPr>
+            <a:picLocks noChangeAspect="1"/>
+          </p:cNvPicPr>
+          <p:nvPr/>
+        </p:nvPicPr>
+        <p:blipFill>
+          <a:blip r:embed="rId4"/>
+          <a:stretch>
+            <a:fillRect/>
+          </a:stretch>
+        </p:blipFill>
+        <p:spPr>
+          <a:xfrm>
+            <a:off x="2825964" y="3683044"/>
+            <a:ext cx="6738165" cy="2651081"/>
+          </a:xfrm>
+          <a:prstGeom prst="rect">
+            <a:avLst/>
+          </a:prstGeom>
+        </p:spPr>
+      </p:pic>
+    </p:spTree>
+    <p:extLst>
+      <p:ext uri="{BB962C8B-B14F-4D97-AF65-F5344CB8AC3E}">
+        <p14:creationId xmlns:p14="http://schemas.microsoft.com/office/powerpoint/2010/main" val="2330088811"/>
+      </p:ext>
+    </p:extLst>
+  </p:cSld>
+  <p:clrMapOvr>
+    <a:masterClrMapping/>
+  </p:clrMapOvr>
+</p:sld>
+</file>
+
+<file path=ppt/slides/slide45.xml><?xml version="1.0" encoding="utf-8"?>
+<p:sld xmlns:a="http://schemas.openxmlformats.org/drawingml/2006/main" xmlns:r="http://schemas.openxmlformats.org/officeDocument/2006/relationships" xmlns:p="http://schemas.openxmlformats.org/presentationml/2006/main">
+  <p:cSld>
+    <p:spTree>
+      <p:nvGrpSpPr>
+        <p:cNvPr id="1" name=""/>
+        <p:cNvGrpSpPr/>
+        <p:nvPr/>
+      </p:nvGrpSpPr>
+      <p:grpSpPr>
+        <a:xfrm>
+          <a:off x="0" y="0"/>
+          <a:ext cx="0" cy="0"/>
+          <a:chOff x="0" y="0"/>
+          <a:chExt cx="0" cy="0"/>
+        </a:xfrm>
+      </p:grpSpPr>
+      <p:pic>
+        <p:nvPicPr>
+          <p:cNvPr id="5" name="Picture 4">
+            <a:extLst>
+              <a:ext uri="{FF2B5EF4-FFF2-40B4-BE49-F238E27FC236}">
+                <a16:creationId xmlns:a16="http://schemas.microsoft.com/office/drawing/2014/main" id="{60D7B078-2FE8-4D27-3E6B-D6DD4A50BE19}"/>
+              </a:ext>
+            </a:extLst>
+          </p:cNvPr>
+          <p:cNvPicPr>
+            <a:picLocks noChangeAspect="1"/>
+          </p:cNvPicPr>
+          <p:nvPr/>
+        </p:nvPicPr>
+        <p:blipFill>
+          <a:blip r:embed="rId2"/>
+          <a:stretch>
+            <a:fillRect/>
+          </a:stretch>
+        </p:blipFill>
+        <p:spPr>
+          <a:xfrm>
+            <a:off x="641650" y="796496"/>
+            <a:ext cx="7847442" cy="5674104"/>
+          </a:xfrm>
+          <a:prstGeom prst="rect">
+            <a:avLst/>
+          </a:prstGeom>
+        </p:spPr>
+      </p:pic>
+    </p:spTree>
+    <p:extLst>
+      <p:ext uri="{BB962C8B-B14F-4D97-AF65-F5344CB8AC3E}">
+        <p14:creationId xmlns:p14="http://schemas.microsoft.com/office/powerpoint/2010/main" val="2421143061"/>
       </p:ext>
     </p:extLst>
   </p:cSld>

</xml_diff>

<commit_message>
js day 12 first update
</commit_message>
<xml_diff>
--- a/js 1st class slide - part 01 .pptx
+++ b/js 1st class slide - part 01 .pptx
@@ -49,7 +49,22 @@
     <p:sldId id="296" r:id="rId43"/>
     <p:sldId id="297" r:id="rId44"/>
     <p:sldId id="298" r:id="rId45"/>
-    <p:sldId id="299" r:id="rId46"/>
+    <p:sldId id="301" r:id="rId46"/>
+    <p:sldId id="302" r:id="rId47"/>
+    <p:sldId id="303" r:id="rId48"/>
+    <p:sldId id="304" r:id="rId49"/>
+    <p:sldId id="305" r:id="rId50"/>
+    <p:sldId id="306" r:id="rId51"/>
+    <p:sldId id="307" r:id="rId52"/>
+    <p:sldId id="308" r:id="rId53"/>
+    <p:sldId id="309" r:id="rId54"/>
+    <p:sldId id="310" r:id="rId55"/>
+    <p:sldId id="311" r:id="rId56"/>
+    <p:sldId id="312" r:id="rId57"/>
+    <p:sldId id="313" r:id="rId58"/>
+    <p:sldId id="314" r:id="rId59"/>
+    <p:sldId id="315" r:id="rId60"/>
+    <p:sldId id="316" r:id="rId61"/>
   </p:sldIdLst>
   <p:sldSz cx="12192000" cy="6858000"/>
   <p:notesSz cx="6858000" cy="9144000"/>
@@ -201,8 +216,26 @@
             <p14:sldId id="296"/>
             <p14:sldId id="297"/>
             <p14:sldId id="298"/>
-            <p14:sldId id="299"/>
+            <p14:sldId id="301"/>
+            <p14:sldId id="302"/>
+            <p14:sldId id="303"/>
+            <p14:sldId id="304"/>
+            <p14:sldId id="305"/>
+            <p14:sldId id="306"/>
+            <p14:sldId id="307"/>
+            <p14:sldId id="308"/>
+            <p14:sldId id="309"/>
+            <p14:sldId id="310"/>
+            <p14:sldId id="311"/>
+            <p14:sldId id="312"/>
+            <p14:sldId id="313"/>
+            <p14:sldId id="314"/>
+            <p14:sldId id="315"/>
+            <p14:sldId id="316"/>
           </p14:sldIdLst>
+        </p14:section>
+        <p14:section name="Untitled Section" id="{4D700F67-1371-4011-86A7-9A30B806E997}">
+          <p14:sldIdLst/>
         </p14:section>
       </p14:sectionLst>
     </p:ext>
@@ -386,7 +419,7 @@
           <a:p>
             <a:fld id="{76439928-7ED9-495B-BAD6-CC71D17435BF}" type="datetimeFigureOut">
               <a:rPr lang="en-US" smtClean="0"/>
-              <a:t>1/12/2023</a:t>
+              <a:t>1/24/2023</a:t>
             </a:fld>
             <a:endParaRPr lang="en-US"/>
           </a:p>
@@ -584,7 +617,7 @@
           <a:p>
             <a:fld id="{76439928-7ED9-495B-BAD6-CC71D17435BF}" type="datetimeFigureOut">
               <a:rPr lang="en-US" smtClean="0"/>
-              <a:t>1/12/2023</a:t>
+              <a:t>1/24/2023</a:t>
             </a:fld>
             <a:endParaRPr lang="en-US"/>
           </a:p>
@@ -792,7 +825,7 @@
           <a:p>
             <a:fld id="{76439928-7ED9-495B-BAD6-CC71D17435BF}" type="datetimeFigureOut">
               <a:rPr lang="en-US" smtClean="0"/>
-              <a:t>1/12/2023</a:t>
+              <a:t>1/24/2023</a:t>
             </a:fld>
             <a:endParaRPr lang="en-US"/>
           </a:p>
@@ -990,7 +1023,7 @@
           <a:p>
             <a:fld id="{76439928-7ED9-495B-BAD6-CC71D17435BF}" type="datetimeFigureOut">
               <a:rPr lang="en-US" smtClean="0"/>
-              <a:t>1/12/2023</a:t>
+              <a:t>1/24/2023</a:t>
             </a:fld>
             <a:endParaRPr lang="en-US"/>
           </a:p>
@@ -1265,7 +1298,7 @@
           <a:p>
             <a:fld id="{76439928-7ED9-495B-BAD6-CC71D17435BF}" type="datetimeFigureOut">
               <a:rPr lang="en-US" smtClean="0"/>
-              <a:t>1/12/2023</a:t>
+              <a:t>1/24/2023</a:t>
             </a:fld>
             <a:endParaRPr lang="en-US"/>
           </a:p>
@@ -1530,7 +1563,7 @@
           <a:p>
             <a:fld id="{76439928-7ED9-495B-BAD6-CC71D17435BF}" type="datetimeFigureOut">
               <a:rPr lang="en-US" smtClean="0"/>
-              <a:t>1/12/2023</a:t>
+              <a:t>1/24/2023</a:t>
             </a:fld>
             <a:endParaRPr lang="en-US"/>
           </a:p>
@@ -1942,7 +1975,7 @@
           <a:p>
             <a:fld id="{76439928-7ED9-495B-BAD6-CC71D17435BF}" type="datetimeFigureOut">
               <a:rPr lang="en-US" smtClean="0"/>
-              <a:t>1/12/2023</a:t>
+              <a:t>1/24/2023</a:t>
             </a:fld>
             <a:endParaRPr lang="en-US"/>
           </a:p>
@@ -2083,7 +2116,7 @@
           <a:p>
             <a:fld id="{76439928-7ED9-495B-BAD6-CC71D17435BF}" type="datetimeFigureOut">
               <a:rPr lang="en-US" smtClean="0"/>
-              <a:t>1/12/2023</a:t>
+              <a:t>1/24/2023</a:t>
             </a:fld>
             <a:endParaRPr lang="en-US"/>
           </a:p>
@@ -2196,7 +2229,7 @@
           <a:p>
             <a:fld id="{76439928-7ED9-495B-BAD6-CC71D17435BF}" type="datetimeFigureOut">
               <a:rPr lang="en-US" smtClean="0"/>
-              <a:t>1/12/2023</a:t>
+              <a:t>1/24/2023</a:t>
             </a:fld>
             <a:endParaRPr lang="en-US"/>
           </a:p>
@@ -2507,7 +2540,7 @@
           <a:p>
             <a:fld id="{76439928-7ED9-495B-BAD6-CC71D17435BF}" type="datetimeFigureOut">
               <a:rPr lang="en-US" smtClean="0"/>
-              <a:t>1/12/2023</a:t>
+              <a:t>1/24/2023</a:t>
             </a:fld>
             <a:endParaRPr lang="en-US"/>
           </a:p>
@@ -2795,7 +2828,7 @@
           <a:p>
             <a:fld id="{76439928-7ED9-495B-BAD6-CC71D17435BF}" type="datetimeFigureOut">
               <a:rPr lang="en-US" smtClean="0"/>
-              <a:t>1/12/2023</a:t>
+              <a:t>1/24/2023</a:t>
             </a:fld>
             <a:endParaRPr lang="en-US"/>
           </a:p>
@@ -3036,7 +3069,7 @@
           <a:p>
             <a:fld id="{76439928-7ED9-495B-BAD6-CC71D17435BF}" type="datetimeFigureOut">
               <a:rPr lang="en-US" smtClean="0"/>
-              <a:t>1/12/2023</a:t>
+              <a:t>1/24/2023</a:t>
             </a:fld>
             <a:endParaRPr lang="en-US"/>
           </a:p>
@@ -11283,7 +11316,7 @@
           <p:cNvPr id="5" name="Picture 4">
             <a:extLst>
               <a:ext uri="{FF2B5EF4-FFF2-40B4-BE49-F238E27FC236}">
-                <a16:creationId xmlns:a16="http://schemas.microsoft.com/office/drawing/2014/main" id="{60D7B078-2FE8-4D27-3E6B-D6DD4A50BE19}"/>
+                <a16:creationId xmlns:a16="http://schemas.microsoft.com/office/drawing/2014/main" id="{A90F2624-6E0E-603D-B6E6-3A48A94FE05F}"/>
               </a:ext>
             </a:extLst>
           </p:cNvPr>
@@ -11293,15 +11326,100 @@
           <p:nvPr/>
         </p:nvPicPr>
         <p:blipFill>
-          <a:blip r:embed="rId2"/>
-          <a:stretch>
-            <a:fillRect/>
-          </a:stretch>
-        </p:blipFill>
-        <p:spPr>
-          <a:xfrm>
-            <a:off x="641650" y="796496"/>
-            <a:ext cx="7847442" cy="5674104"/>
+          <a:blip r:embed="rId2">
+            <a:extLst>
+              <a:ext uri="{28A0092B-C50C-407E-A947-70E740481C1C}">
+                <a14:useLocalDpi xmlns:a14="http://schemas.microsoft.com/office/drawing/2010/main" val="0"/>
+              </a:ext>
+            </a:extLst>
+          </a:blip>
+          <a:stretch>
+            <a:fillRect/>
+          </a:stretch>
+        </p:blipFill>
+        <p:spPr>
+          <a:xfrm>
+            <a:off x="10969210" y="718478"/>
+            <a:ext cx="769180" cy="618855"/>
+          </a:xfrm>
+          <a:prstGeom prst="rect">
+            <a:avLst/>
+          </a:prstGeom>
+        </p:spPr>
+      </p:pic>
+      <p:pic>
+        <p:nvPicPr>
+          <p:cNvPr id="6" name="Picture 2" descr="What is JavaScript?">
+            <a:extLst>
+              <a:ext uri="{FF2B5EF4-FFF2-40B4-BE49-F238E27FC236}">
+                <a16:creationId xmlns:a16="http://schemas.microsoft.com/office/drawing/2014/main" id="{0FC7827A-AA9A-67B4-D85E-FF715FA273F5}"/>
+              </a:ext>
+            </a:extLst>
+          </p:cNvPr>
+          <p:cNvPicPr>
+            <a:picLocks noGrp="1" noChangeAspect="1" noChangeArrowheads="1"/>
+          </p:cNvPicPr>
+          <p:nvPr>
+            <p:ph idx="1"/>
+          </p:nvPr>
+        </p:nvPicPr>
+        <p:blipFill>
+          <a:blip r:embed="rId3">
+            <a:extLst>
+              <a:ext uri="{28A0092B-C50C-407E-A947-70E740481C1C}">
+                <a14:useLocalDpi xmlns:a14="http://schemas.microsoft.com/office/drawing/2010/main" val="0"/>
+              </a:ext>
+            </a:extLst>
+          </a:blip>
+          <a:srcRect/>
+          <a:stretch>
+            <a:fillRect/>
+          </a:stretch>
+        </p:blipFill>
+        <p:spPr bwMode="auto">
+          <a:xfrm>
+            <a:off x="10763494" y="5653201"/>
+            <a:ext cx="857627" cy="857627"/>
+          </a:xfrm>
+          <a:prstGeom prst="rect">
+            <a:avLst/>
+          </a:prstGeom>
+          <a:noFill/>
+          <a:extLst>
+            <a:ext uri="{909E8E84-426E-40DD-AFC4-6F175D3DCCD1}">
+              <a14:hiddenFill xmlns:a14="http://schemas.microsoft.com/office/drawing/2010/main">
+                <a:solidFill>
+                  <a:srgbClr val="FFFFFF"/>
+                </a:solidFill>
+              </a14:hiddenFill>
+            </a:ext>
+          </a:extLst>
+        </p:spPr>
+      </p:pic>
+      <p:pic>
+        <p:nvPicPr>
+          <p:cNvPr id="12" name="Picture 11">
+            <a:extLst>
+              <a:ext uri="{FF2B5EF4-FFF2-40B4-BE49-F238E27FC236}">
+                <a16:creationId xmlns:a16="http://schemas.microsoft.com/office/drawing/2014/main" id="{BFD0A608-7F90-25BA-AD46-0194A4D3E9C4}"/>
+              </a:ext>
+            </a:extLst>
+          </p:cNvPr>
+          <p:cNvPicPr>
+            <a:picLocks noChangeAspect="1"/>
+          </p:cNvPicPr>
+          <p:nvPr/>
+        </p:nvPicPr>
+        <p:blipFill>
+          <a:blip r:embed="rId4"/>
+          <a:stretch>
+            <a:fillRect/>
+          </a:stretch>
+        </p:blipFill>
+        <p:spPr>
+          <a:xfrm>
+            <a:off x="766117" y="1474150"/>
+            <a:ext cx="10116065" cy="3644297"/>
           </a:xfrm>
           <a:prstGeom prst="rect">
             <a:avLst/>
@@ -11311,7 +11429,587 @@
     </p:spTree>
     <p:extLst>
       <p:ext uri="{BB962C8B-B14F-4D97-AF65-F5344CB8AC3E}">
-        <p14:creationId xmlns:p14="http://schemas.microsoft.com/office/powerpoint/2010/main" val="2421143061"/>
+        <p14:creationId xmlns:p14="http://schemas.microsoft.com/office/powerpoint/2010/main" val="4111862"/>
+      </p:ext>
+    </p:extLst>
+  </p:cSld>
+  <p:clrMapOvr>
+    <a:masterClrMapping/>
+  </p:clrMapOvr>
+</p:sld>
+</file>
+
+<file path=ppt/slides/slide46.xml><?xml version="1.0" encoding="utf-8"?>
+<p:sld xmlns:a="http://schemas.openxmlformats.org/drawingml/2006/main" xmlns:r="http://schemas.openxmlformats.org/officeDocument/2006/relationships" xmlns:p="http://schemas.openxmlformats.org/presentationml/2006/main">
+  <p:cSld>
+    <p:spTree>
+      <p:nvGrpSpPr>
+        <p:cNvPr id="1" name=""/>
+        <p:cNvGrpSpPr/>
+        <p:nvPr/>
+      </p:nvGrpSpPr>
+      <p:grpSpPr>
+        <a:xfrm>
+          <a:off x="0" y="0"/>
+          <a:ext cx="0" cy="0"/>
+          <a:chOff x="0" y="0"/>
+          <a:chExt cx="0" cy="0"/>
+        </a:xfrm>
+      </p:grpSpPr>
+      <p:pic>
+        <p:nvPicPr>
+          <p:cNvPr id="4" name="Picture 3">
+            <a:extLst>
+              <a:ext uri="{FF2B5EF4-FFF2-40B4-BE49-F238E27FC236}">
+                <a16:creationId xmlns:a16="http://schemas.microsoft.com/office/drawing/2014/main" id="{EBAB7D90-75FD-540C-A020-7611A3584994}"/>
+              </a:ext>
+            </a:extLst>
+          </p:cNvPr>
+          <p:cNvPicPr>
+            <a:picLocks noChangeAspect="1"/>
+          </p:cNvPicPr>
+          <p:nvPr/>
+        </p:nvPicPr>
+        <p:blipFill>
+          <a:blip r:embed="rId2">
+            <a:extLst>
+              <a:ext uri="{28A0092B-C50C-407E-A947-70E740481C1C}">
+                <a14:useLocalDpi xmlns:a14="http://schemas.microsoft.com/office/drawing/2010/main" val="0"/>
+              </a:ext>
+            </a:extLst>
+          </a:blip>
+          <a:stretch>
+            <a:fillRect/>
+          </a:stretch>
+        </p:blipFill>
+        <p:spPr>
+          <a:xfrm>
+            <a:off x="10969210" y="718478"/>
+            <a:ext cx="769180" cy="618855"/>
+          </a:xfrm>
+          <a:prstGeom prst="rect">
+            <a:avLst/>
+          </a:prstGeom>
+        </p:spPr>
+      </p:pic>
+      <p:pic>
+        <p:nvPicPr>
+          <p:cNvPr id="5" name="Picture 2" descr="What is JavaScript?">
+            <a:extLst>
+              <a:ext uri="{FF2B5EF4-FFF2-40B4-BE49-F238E27FC236}">
+                <a16:creationId xmlns:a16="http://schemas.microsoft.com/office/drawing/2014/main" id="{DD135FE2-89AD-8522-72A9-83A758636FCE}"/>
+              </a:ext>
+            </a:extLst>
+          </p:cNvPr>
+          <p:cNvPicPr>
+            <a:picLocks noGrp="1" noChangeAspect="1" noChangeArrowheads="1"/>
+          </p:cNvPicPr>
+          <p:nvPr>
+            <p:ph idx="1"/>
+          </p:nvPr>
+        </p:nvPicPr>
+        <p:blipFill>
+          <a:blip r:embed="rId3">
+            <a:extLst>
+              <a:ext uri="{28A0092B-C50C-407E-A947-70E740481C1C}">
+                <a14:useLocalDpi xmlns:a14="http://schemas.microsoft.com/office/drawing/2010/main" val="0"/>
+              </a:ext>
+            </a:extLst>
+          </a:blip>
+          <a:srcRect/>
+          <a:stretch>
+            <a:fillRect/>
+          </a:stretch>
+        </p:blipFill>
+        <p:spPr bwMode="auto">
+          <a:xfrm>
+            <a:off x="10763494" y="5653201"/>
+            <a:ext cx="857627" cy="857627"/>
+          </a:xfrm>
+          <a:prstGeom prst="rect">
+            <a:avLst/>
+          </a:prstGeom>
+          <a:noFill/>
+          <a:extLst>
+            <a:ext uri="{909E8E84-426E-40DD-AFC4-6F175D3DCCD1}">
+              <a14:hiddenFill xmlns:a14="http://schemas.microsoft.com/office/drawing/2010/main">
+                <a:solidFill>
+                  <a:srgbClr val="FFFFFF"/>
+                </a:solidFill>
+              </a14:hiddenFill>
+            </a:ext>
+          </a:extLst>
+        </p:spPr>
+      </p:pic>
+      <p:pic>
+        <p:nvPicPr>
+          <p:cNvPr id="7" name="Picture 6">
+            <a:extLst>
+              <a:ext uri="{FF2B5EF4-FFF2-40B4-BE49-F238E27FC236}">
+                <a16:creationId xmlns:a16="http://schemas.microsoft.com/office/drawing/2014/main" id="{22F3BF4F-7B1E-C295-6588-2EC17A705E39}"/>
+              </a:ext>
+            </a:extLst>
+          </p:cNvPr>
+          <p:cNvPicPr>
+            <a:picLocks noChangeAspect="1"/>
+          </p:cNvPicPr>
+          <p:nvPr/>
+        </p:nvPicPr>
+        <p:blipFill>
+          <a:blip r:embed="rId4"/>
+          <a:stretch>
+            <a:fillRect/>
+          </a:stretch>
+        </p:blipFill>
+        <p:spPr>
+          <a:xfrm>
+            <a:off x="1433383" y="1337333"/>
+            <a:ext cx="8971005" cy="4600516"/>
+          </a:xfrm>
+          <a:prstGeom prst="rect">
+            <a:avLst/>
+          </a:prstGeom>
+        </p:spPr>
+      </p:pic>
+    </p:spTree>
+    <p:extLst>
+      <p:ext uri="{BB962C8B-B14F-4D97-AF65-F5344CB8AC3E}">
+        <p14:creationId xmlns:p14="http://schemas.microsoft.com/office/powerpoint/2010/main" val="4285560747"/>
+      </p:ext>
+    </p:extLst>
+  </p:cSld>
+  <p:clrMapOvr>
+    <a:masterClrMapping/>
+  </p:clrMapOvr>
+</p:sld>
+</file>
+
+<file path=ppt/slides/slide47.xml><?xml version="1.0" encoding="utf-8"?>
+<p:sld xmlns:a="http://schemas.openxmlformats.org/drawingml/2006/main" xmlns:r="http://schemas.openxmlformats.org/officeDocument/2006/relationships" xmlns:p="http://schemas.openxmlformats.org/presentationml/2006/main">
+  <p:cSld>
+    <p:spTree>
+      <p:nvGrpSpPr>
+        <p:cNvPr id="1" name=""/>
+        <p:cNvGrpSpPr/>
+        <p:nvPr/>
+      </p:nvGrpSpPr>
+      <p:grpSpPr>
+        <a:xfrm>
+          <a:off x="0" y="0"/>
+          <a:ext cx="0" cy="0"/>
+          <a:chOff x="0" y="0"/>
+          <a:chExt cx="0" cy="0"/>
+        </a:xfrm>
+      </p:grpSpPr>
+      <p:pic>
+        <p:nvPicPr>
+          <p:cNvPr id="4" name="Picture 3">
+            <a:extLst>
+              <a:ext uri="{FF2B5EF4-FFF2-40B4-BE49-F238E27FC236}">
+                <a16:creationId xmlns:a16="http://schemas.microsoft.com/office/drawing/2014/main" id="{CABC7BFB-D94F-AFE4-2D27-F49080D38CFA}"/>
+              </a:ext>
+            </a:extLst>
+          </p:cNvPr>
+          <p:cNvPicPr>
+            <a:picLocks noChangeAspect="1"/>
+          </p:cNvPicPr>
+          <p:nvPr/>
+        </p:nvPicPr>
+        <p:blipFill>
+          <a:blip r:embed="rId2">
+            <a:extLst>
+              <a:ext uri="{28A0092B-C50C-407E-A947-70E740481C1C}">
+                <a14:useLocalDpi xmlns:a14="http://schemas.microsoft.com/office/drawing/2010/main" val="0"/>
+              </a:ext>
+            </a:extLst>
+          </a:blip>
+          <a:stretch>
+            <a:fillRect/>
+          </a:stretch>
+        </p:blipFill>
+        <p:spPr>
+          <a:xfrm>
+            <a:off x="10969210" y="718478"/>
+            <a:ext cx="769180" cy="618855"/>
+          </a:xfrm>
+          <a:prstGeom prst="rect">
+            <a:avLst/>
+          </a:prstGeom>
+        </p:spPr>
+      </p:pic>
+      <p:pic>
+        <p:nvPicPr>
+          <p:cNvPr id="5" name="Picture 2" descr="What is JavaScript?">
+            <a:extLst>
+              <a:ext uri="{FF2B5EF4-FFF2-40B4-BE49-F238E27FC236}">
+                <a16:creationId xmlns:a16="http://schemas.microsoft.com/office/drawing/2014/main" id="{15973773-5F0B-6437-54CF-B149CA0CBB57}"/>
+              </a:ext>
+            </a:extLst>
+          </p:cNvPr>
+          <p:cNvPicPr>
+            <a:picLocks noGrp="1" noChangeAspect="1" noChangeArrowheads="1"/>
+          </p:cNvPicPr>
+          <p:nvPr>
+            <p:ph idx="1"/>
+          </p:nvPr>
+        </p:nvPicPr>
+        <p:blipFill>
+          <a:blip r:embed="rId3">
+            <a:extLst>
+              <a:ext uri="{28A0092B-C50C-407E-A947-70E740481C1C}">
+                <a14:useLocalDpi xmlns:a14="http://schemas.microsoft.com/office/drawing/2010/main" val="0"/>
+              </a:ext>
+            </a:extLst>
+          </a:blip>
+          <a:srcRect/>
+          <a:stretch>
+            <a:fillRect/>
+          </a:stretch>
+        </p:blipFill>
+        <p:spPr bwMode="auto">
+          <a:xfrm>
+            <a:off x="10763494" y="5653201"/>
+            <a:ext cx="857627" cy="857627"/>
+          </a:xfrm>
+          <a:prstGeom prst="rect">
+            <a:avLst/>
+          </a:prstGeom>
+          <a:noFill/>
+          <a:extLst>
+            <a:ext uri="{909E8E84-426E-40DD-AFC4-6F175D3DCCD1}">
+              <a14:hiddenFill xmlns:a14="http://schemas.microsoft.com/office/drawing/2010/main">
+                <a:solidFill>
+                  <a:srgbClr val="FFFFFF"/>
+                </a:solidFill>
+              </a14:hiddenFill>
+            </a:ext>
+          </a:extLst>
+        </p:spPr>
+      </p:pic>
+      <p:pic>
+        <p:nvPicPr>
+          <p:cNvPr id="7" name="Picture 6">
+            <a:extLst>
+              <a:ext uri="{FF2B5EF4-FFF2-40B4-BE49-F238E27FC236}">
+                <a16:creationId xmlns:a16="http://schemas.microsoft.com/office/drawing/2014/main" id="{8ED38A1D-2A3C-A684-3168-FB99E458C308}"/>
+              </a:ext>
+            </a:extLst>
+          </p:cNvPr>
+          <p:cNvPicPr>
+            <a:picLocks noChangeAspect="1"/>
+          </p:cNvPicPr>
+          <p:nvPr/>
+        </p:nvPicPr>
+        <p:blipFill>
+          <a:blip r:embed="rId4"/>
+          <a:stretch>
+            <a:fillRect/>
+          </a:stretch>
+        </p:blipFill>
+        <p:spPr>
+          <a:xfrm>
+            <a:off x="714253" y="2696446"/>
+            <a:ext cx="10763494" cy="1597642"/>
+          </a:xfrm>
+          <a:prstGeom prst="rect">
+            <a:avLst/>
+          </a:prstGeom>
+        </p:spPr>
+      </p:pic>
+    </p:spTree>
+    <p:extLst>
+      <p:ext uri="{BB962C8B-B14F-4D97-AF65-F5344CB8AC3E}">
+        <p14:creationId xmlns:p14="http://schemas.microsoft.com/office/powerpoint/2010/main" val="2741207931"/>
+      </p:ext>
+    </p:extLst>
+  </p:cSld>
+  <p:clrMapOvr>
+    <a:masterClrMapping/>
+  </p:clrMapOvr>
+</p:sld>
+</file>
+
+<file path=ppt/slides/slide48.xml><?xml version="1.0" encoding="utf-8"?>
+<p:sld xmlns:a="http://schemas.openxmlformats.org/drawingml/2006/main" xmlns:r="http://schemas.openxmlformats.org/officeDocument/2006/relationships" xmlns:p="http://schemas.openxmlformats.org/presentationml/2006/main">
+  <p:cSld>
+    <p:spTree>
+      <p:nvGrpSpPr>
+        <p:cNvPr id="1" name=""/>
+        <p:cNvGrpSpPr/>
+        <p:nvPr/>
+      </p:nvGrpSpPr>
+      <p:grpSpPr>
+        <a:xfrm>
+          <a:off x="0" y="0"/>
+          <a:ext cx="0" cy="0"/>
+          <a:chOff x="0" y="0"/>
+          <a:chExt cx="0" cy="0"/>
+        </a:xfrm>
+      </p:grpSpPr>
+      <p:pic>
+        <p:nvPicPr>
+          <p:cNvPr id="4" name="Picture 3">
+            <a:extLst>
+              <a:ext uri="{FF2B5EF4-FFF2-40B4-BE49-F238E27FC236}">
+                <a16:creationId xmlns:a16="http://schemas.microsoft.com/office/drawing/2014/main" id="{3BF4DFEE-02E1-AD9B-D2EF-9D2B3926D28F}"/>
+              </a:ext>
+            </a:extLst>
+          </p:cNvPr>
+          <p:cNvPicPr>
+            <a:picLocks noChangeAspect="1"/>
+          </p:cNvPicPr>
+          <p:nvPr/>
+        </p:nvPicPr>
+        <p:blipFill>
+          <a:blip r:embed="rId2">
+            <a:extLst>
+              <a:ext uri="{28A0092B-C50C-407E-A947-70E740481C1C}">
+                <a14:useLocalDpi xmlns:a14="http://schemas.microsoft.com/office/drawing/2010/main" val="0"/>
+              </a:ext>
+            </a:extLst>
+          </a:blip>
+          <a:stretch>
+            <a:fillRect/>
+          </a:stretch>
+        </p:blipFill>
+        <p:spPr>
+          <a:xfrm>
+            <a:off x="10969210" y="718478"/>
+            <a:ext cx="769180" cy="618855"/>
+          </a:xfrm>
+          <a:prstGeom prst="rect">
+            <a:avLst/>
+          </a:prstGeom>
+        </p:spPr>
+      </p:pic>
+      <p:pic>
+        <p:nvPicPr>
+          <p:cNvPr id="5" name="Picture 2" descr="What is JavaScript?">
+            <a:extLst>
+              <a:ext uri="{FF2B5EF4-FFF2-40B4-BE49-F238E27FC236}">
+                <a16:creationId xmlns:a16="http://schemas.microsoft.com/office/drawing/2014/main" id="{8C6D6AA9-E42D-F5EA-6E5B-298C9FF0C079}"/>
+              </a:ext>
+            </a:extLst>
+          </p:cNvPr>
+          <p:cNvPicPr>
+            <a:picLocks noGrp="1" noChangeAspect="1" noChangeArrowheads="1"/>
+          </p:cNvPicPr>
+          <p:nvPr>
+            <p:ph idx="1"/>
+          </p:nvPr>
+        </p:nvPicPr>
+        <p:blipFill>
+          <a:blip r:embed="rId3">
+            <a:extLst>
+              <a:ext uri="{28A0092B-C50C-407E-A947-70E740481C1C}">
+                <a14:useLocalDpi xmlns:a14="http://schemas.microsoft.com/office/drawing/2010/main" val="0"/>
+              </a:ext>
+            </a:extLst>
+          </a:blip>
+          <a:srcRect/>
+          <a:stretch>
+            <a:fillRect/>
+          </a:stretch>
+        </p:blipFill>
+        <p:spPr bwMode="auto">
+          <a:xfrm>
+            <a:off x="10763494" y="5653201"/>
+            <a:ext cx="857627" cy="857627"/>
+          </a:xfrm>
+          <a:prstGeom prst="rect">
+            <a:avLst/>
+          </a:prstGeom>
+          <a:noFill/>
+          <a:extLst>
+            <a:ext uri="{909E8E84-426E-40DD-AFC4-6F175D3DCCD1}">
+              <a14:hiddenFill xmlns:a14="http://schemas.microsoft.com/office/drawing/2010/main">
+                <a:solidFill>
+                  <a:srgbClr val="FFFFFF"/>
+                </a:solidFill>
+              </a14:hiddenFill>
+            </a:ext>
+          </a:extLst>
+        </p:spPr>
+      </p:pic>
+      <p:pic>
+        <p:nvPicPr>
+          <p:cNvPr id="7" name="Picture 6">
+            <a:extLst>
+              <a:ext uri="{FF2B5EF4-FFF2-40B4-BE49-F238E27FC236}">
+                <a16:creationId xmlns:a16="http://schemas.microsoft.com/office/drawing/2014/main" id="{FD26BD08-4A9F-0162-BA30-427493E44D34}"/>
+              </a:ext>
+            </a:extLst>
+          </p:cNvPr>
+          <p:cNvPicPr>
+            <a:picLocks noChangeAspect="1"/>
+          </p:cNvPicPr>
+          <p:nvPr/>
+        </p:nvPicPr>
+        <p:blipFill>
+          <a:blip r:embed="rId4"/>
+          <a:stretch>
+            <a:fillRect/>
+          </a:stretch>
+        </p:blipFill>
+        <p:spPr>
+          <a:xfrm>
+            <a:off x="963827" y="1027905"/>
+            <a:ext cx="9638270" cy="5249750"/>
+          </a:xfrm>
+          <a:prstGeom prst="rect">
+            <a:avLst/>
+          </a:prstGeom>
+        </p:spPr>
+      </p:pic>
+    </p:spTree>
+    <p:extLst>
+      <p:ext uri="{BB962C8B-B14F-4D97-AF65-F5344CB8AC3E}">
+        <p14:creationId xmlns:p14="http://schemas.microsoft.com/office/powerpoint/2010/main" val="470947198"/>
+      </p:ext>
+    </p:extLst>
+  </p:cSld>
+  <p:clrMapOvr>
+    <a:masterClrMapping/>
+  </p:clrMapOvr>
+</p:sld>
+</file>
+
+<file path=ppt/slides/slide49.xml><?xml version="1.0" encoding="utf-8"?>
+<p:sld xmlns:a="http://schemas.openxmlformats.org/drawingml/2006/main" xmlns:r="http://schemas.openxmlformats.org/officeDocument/2006/relationships" xmlns:p="http://schemas.openxmlformats.org/presentationml/2006/main">
+  <p:cSld>
+    <p:spTree>
+      <p:nvGrpSpPr>
+        <p:cNvPr id="1" name=""/>
+        <p:cNvGrpSpPr/>
+        <p:nvPr/>
+      </p:nvGrpSpPr>
+      <p:grpSpPr>
+        <a:xfrm>
+          <a:off x="0" y="0"/>
+          <a:ext cx="0" cy="0"/>
+          <a:chOff x="0" y="0"/>
+          <a:chExt cx="0" cy="0"/>
+        </a:xfrm>
+      </p:grpSpPr>
+      <p:pic>
+        <p:nvPicPr>
+          <p:cNvPr id="4" name="Picture 3">
+            <a:extLst>
+              <a:ext uri="{FF2B5EF4-FFF2-40B4-BE49-F238E27FC236}">
+                <a16:creationId xmlns:a16="http://schemas.microsoft.com/office/drawing/2014/main" id="{901CF2DC-E19C-9B87-7AA3-6ADF7B052B82}"/>
+              </a:ext>
+            </a:extLst>
+          </p:cNvPr>
+          <p:cNvPicPr>
+            <a:picLocks noChangeAspect="1"/>
+          </p:cNvPicPr>
+          <p:nvPr/>
+        </p:nvPicPr>
+        <p:blipFill>
+          <a:blip r:embed="rId2">
+            <a:extLst>
+              <a:ext uri="{28A0092B-C50C-407E-A947-70E740481C1C}">
+                <a14:useLocalDpi xmlns:a14="http://schemas.microsoft.com/office/drawing/2010/main" val="0"/>
+              </a:ext>
+            </a:extLst>
+          </a:blip>
+          <a:stretch>
+            <a:fillRect/>
+          </a:stretch>
+        </p:blipFill>
+        <p:spPr>
+          <a:xfrm>
+            <a:off x="10969210" y="718478"/>
+            <a:ext cx="769180" cy="618855"/>
+          </a:xfrm>
+          <a:prstGeom prst="rect">
+            <a:avLst/>
+          </a:prstGeom>
+        </p:spPr>
+      </p:pic>
+      <p:pic>
+        <p:nvPicPr>
+          <p:cNvPr id="5" name="Picture 2" descr="What is JavaScript?">
+            <a:extLst>
+              <a:ext uri="{FF2B5EF4-FFF2-40B4-BE49-F238E27FC236}">
+                <a16:creationId xmlns:a16="http://schemas.microsoft.com/office/drawing/2014/main" id="{7DE057EF-99D1-43AD-8622-A4126B9D4773}"/>
+              </a:ext>
+            </a:extLst>
+          </p:cNvPr>
+          <p:cNvPicPr>
+            <a:picLocks noGrp="1" noChangeAspect="1" noChangeArrowheads="1"/>
+          </p:cNvPicPr>
+          <p:nvPr>
+            <p:ph idx="1"/>
+          </p:nvPr>
+        </p:nvPicPr>
+        <p:blipFill>
+          <a:blip r:embed="rId3">
+            <a:extLst>
+              <a:ext uri="{28A0092B-C50C-407E-A947-70E740481C1C}">
+                <a14:useLocalDpi xmlns:a14="http://schemas.microsoft.com/office/drawing/2010/main" val="0"/>
+              </a:ext>
+            </a:extLst>
+          </a:blip>
+          <a:srcRect/>
+          <a:stretch>
+            <a:fillRect/>
+          </a:stretch>
+        </p:blipFill>
+        <p:spPr bwMode="auto">
+          <a:xfrm>
+            <a:off x="10763494" y="5653201"/>
+            <a:ext cx="857627" cy="857627"/>
+          </a:xfrm>
+          <a:prstGeom prst="rect">
+            <a:avLst/>
+          </a:prstGeom>
+          <a:noFill/>
+          <a:extLst>
+            <a:ext uri="{909E8E84-426E-40DD-AFC4-6F175D3DCCD1}">
+              <a14:hiddenFill xmlns:a14="http://schemas.microsoft.com/office/drawing/2010/main">
+                <a:solidFill>
+                  <a:srgbClr val="FFFFFF"/>
+                </a:solidFill>
+              </a14:hiddenFill>
+            </a:ext>
+          </a:extLst>
+        </p:spPr>
+      </p:pic>
+      <p:pic>
+        <p:nvPicPr>
+          <p:cNvPr id="7" name="Picture 6">
+            <a:extLst>
+              <a:ext uri="{FF2B5EF4-FFF2-40B4-BE49-F238E27FC236}">
+                <a16:creationId xmlns:a16="http://schemas.microsoft.com/office/drawing/2014/main" id="{91C476F5-59EC-BF03-2B88-E59D50EAACFD}"/>
+              </a:ext>
+            </a:extLst>
+          </p:cNvPr>
+          <p:cNvPicPr>
+            <a:picLocks noChangeAspect="1"/>
+          </p:cNvPicPr>
+          <p:nvPr/>
+        </p:nvPicPr>
+        <p:blipFill>
+          <a:blip r:embed="rId4"/>
+          <a:stretch>
+            <a:fillRect/>
+          </a:stretch>
+        </p:blipFill>
+        <p:spPr>
+          <a:xfrm>
+            <a:off x="1300291" y="1698561"/>
+            <a:ext cx="9202952" cy="3460878"/>
+          </a:xfrm>
+          <a:prstGeom prst="rect">
+            <a:avLst/>
+          </a:prstGeom>
+        </p:spPr>
+      </p:pic>
+    </p:spTree>
+    <p:extLst>
+      <p:ext uri="{BB962C8B-B14F-4D97-AF65-F5344CB8AC3E}">
+        <p14:creationId xmlns:p14="http://schemas.microsoft.com/office/powerpoint/2010/main" val="2990714688"/>
       </p:ext>
     </p:extLst>
   </p:cSld>
@@ -11437,6 +12135,1196 @@
 </p:sld>
 </file>
 
+<file path=ppt/slides/slide50.xml><?xml version="1.0" encoding="utf-8"?>
+<p:sld xmlns:a="http://schemas.openxmlformats.org/drawingml/2006/main" xmlns:r="http://schemas.openxmlformats.org/officeDocument/2006/relationships" xmlns:p="http://schemas.openxmlformats.org/presentationml/2006/main">
+  <p:cSld>
+    <p:spTree>
+      <p:nvGrpSpPr>
+        <p:cNvPr id="1" name=""/>
+        <p:cNvGrpSpPr/>
+        <p:nvPr/>
+      </p:nvGrpSpPr>
+      <p:grpSpPr>
+        <a:xfrm>
+          <a:off x="0" y="0"/>
+          <a:ext cx="0" cy="0"/>
+          <a:chOff x="0" y="0"/>
+          <a:chExt cx="0" cy="0"/>
+        </a:xfrm>
+      </p:grpSpPr>
+      <p:pic>
+        <p:nvPicPr>
+          <p:cNvPr id="4" name="Picture 3">
+            <a:extLst>
+              <a:ext uri="{FF2B5EF4-FFF2-40B4-BE49-F238E27FC236}">
+                <a16:creationId xmlns:a16="http://schemas.microsoft.com/office/drawing/2014/main" id="{A0B21EE6-75FB-0887-D47D-B7CB4E2C328F}"/>
+              </a:ext>
+            </a:extLst>
+          </p:cNvPr>
+          <p:cNvPicPr>
+            <a:picLocks noChangeAspect="1"/>
+          </p:cNvPicPr>
+          <p:nvPr/>
+        </p:nvPicPr>
+        <p:blipFill>
+          <a:blip r:embed="rId2">
+            <a:extLst>
+              <a:ext uri="{28A0092B-C50C-407E-A947-70E740481C1C}">
+                <a14:useLocalDpi xmlns:a14="http://schemas.microsoft.com/office/drawing/2010/main" val="0"/>
+              </a:ext>
+            </a:extLst>
+          </a:blip>
+          <a:stretch>
+            <a:fillRect/>
+          </a:stretch>
+        </p:blipFill>
+        <p:spPr>
+          <a:xfrm>
+            <a:off x="10969210" y="718478"/>
+            <a:ext cx="769180" cy="618855"/>
+          </a:xfrm>
+          <a:prstGeom prst="rect">
+            <a:avLst/>
+          </a:prstGeom>
+        </p:spPr>
+      </p:pic>
+      <p:pic>
+        <p:nvPicPr>
+          <p:cNvPr id="5" name="Picture 2" descr="What is JavaScript?">
+            <a:extLst>
+              <a:ext uri="{FF2B5EF4-FFF2-40B4-BE49-F238E27FC236}">
+                <a16:creationId xmlns:a16="http://schemas.microsoft.com/office/drawing/2014/main" id="{488AB62B-CAB5-3252-F379-9A713DFFACED}"/>
+              </a:ext>
+            </a:extLst>
+          </p:cNvPr>
+          <p:cNvPicPr>
+            <a:picLocks noGrp="1" noChangeAspect="1" noChangeArrowheads="1"/>
+          </p:cNvPicPr>
+          <p:nvPr>
+            <p:ph idx="1"/>
+          </p:nvPr>
+        </p:nvPicPr>
+        <p:blipFill>
+          <a:blip r:embed="rId3">
+            <a:extLst>
+              <a:ext uri="{28A0092B-C50C-407E-A947-70E740481C1C}">
+                <a14:useLocalDpi xmlns:a14="http://schemas.microsoft.com/office/drawing/2010/main" val="0"/>
+              </a:ext>
+            </a:extLst>
+          </a:blip>
+          <a:srcRect/>
+          <a:stretch>
+            <a:fillRect/>
+          </a:stretch>
+        </p:blipFill>
+        <p:spPr bwMode="auto">
+          <a:xfrm>
+            <a:off x="10763494" y="5653201"/>
+            <a:ext cx="857627" cy="857627"/>
+          </a:xfrm>
+          <a:prstGeom prst="rect">
+            <a:avLst/>
+          </a:prstGeom>
+          <a:noFill/>
+          <a:extLst>
+            <a:ext uri="{909E8E84-426E-40DD-AFC4-6F175D3DCCD1}">
+              <a14:hiddenFill xmlns:a14="http://schemas.microsoft.com/office/drawing/2010/main">
+                <a:solidFill>
+                  <a:srgbClr val="FFFFFF"/>
+                </a:solidFill>
+              </a14:hiddenFill>
+            </a:ext>
+          </a:extLst>
+        </p:spPr>
+      </p:pic>
+      <p:pic>
+        <p:nvPicPr>
+          <p:cNvPr id="7" name="Picture 6">
+            <a:extLst>
+              <a:ext uri="{FF2B5EF4-FFF2-40B4-BE49-F238E27FC236}">
+                <a16:creationId xmlns:a16="http://schemas.microsoft.com/office/drawing/2014/main" id="{40EA8FBD-2BE2-FBBD-CDD8-F68B5B498B94}"/>
+              </a:ext>
+            </a:extLst>
+          </p:cNvPr>
+          <p:cNvPicPr>
+            <a:picLocks noChangeAspect="1"/>
+          </p:cNvPicPr>
+          <p:nvPr/>
+        </p:nvPicPr>
+        <p:blipFill>
+          <a:blip r:embed="rId4"/>
+          <a:stretch>
+            <a:fillRect/>
+          </a:stretch>
+        </p:blipFill>
+        <p:spPr>
+          <a:xfrm>
+            <a:off x="1387947" y="1138012"/>
+            <a:ext cx="8633383" cy="4847292"/>
+          </a:xfrm>
+          <a:prstGeom prst="rect">
+            <a:avLst/>
+          </a:prstGeom>
+        </p:spPr>
+      </p:pic>
+    </p:spTree>
+    <p:extLst>
+      <p:ext uri="{BB962C8B-B14F-4D97-AF65-F5344CB8AC3E}">
+        <p14:creationId xmlns:p14="http://schemas.microsoft.com/office/powerpoint/2010/main" val="2611135637"/>
+      </p:ext>
+    </p:extLst>
+  </p:cSld>
+  <p:clrMapOvr>
+    <a:masterClrMapping/>
+  </p:clrMapOvr>
+</p:sld>
+</file>
+
+<file path=ppt/slides/slide51.xml><?xml version="1.0" encoding="utf-8"?>
+<p:sld xmlns:a="http://schemas.openxmlformats.org/drawingml/2006/main" xmlns:r="http://schemas.openxmlformats.org/officeDocument/2006/relationships" xmlns:p="http://schemas.openxmlformats.org/presentationml/2006/main">
+  <p:cSld>
+    <p:spTree>
+      <p:nvGrpSpPr>
+        <p:cNvPr id="1" name=""/>
+        <p:cNvGrpSpPr/>
+        <p:nvPr/>
+      </p:nvGrpSpPr>
+      <p:grpSpPr>
+        <a:xfrm>
+          <a:off x="0" y="0"/>
+          <a:ext cx="0" cy="0"/>
+          <a:chOff x="0" y="0"/>
+          <a:chExt cx="0" cy="0"/>
+        </a:xfrm>
+      </p:grpSpPr>
+      <p:pic>
+        <p:nvPicPr>
+          <p:cNvPr id="4" name="Picture 3">
+            <a:extLst>
+              <a:ext uri="{FF2B5EF4-FFF2-40B4-BE49-F238E27FC236}">
+                <a16:creationId xmlns:a16="http://schemas.microsoft.com/office/drawing/2014/main" id="{E1B4643C-708B-0962-3901-5FFB0B8842C3}"/>
+              </a:ext>
+            </a:extLst>
+          </p:cNvPr>
+          <p:cNvPicPr>
+            <a:picLocks noChangeAspect="1"/>
+          </p:cNvPicPr>
+          <p:nvPr/>
+        </p:nvPicPr>
+        <p:blipFill>
+          <a:blip r:embed="rId2">
+            <a:extLst>
+              <a:ext uri="{28A0092B-C50C-407E-A947-70E740481C1C}">
+                <a14:useLocalDpi xmlns:a14="http://schemas.microsoft.com/office/drawing/2010/main" val="0"/>
+              </a:ext>
+            </a:extLst>
+          </a:blip>
+          <a:stretch>
+            <a:fillRect/>
+          </a:stretch>
+        </p:blipFill>
+        <p:spPr>
+          <a:xfrm>
+            <a:off x="10969210" y="718478"/>
+            <a:ext cx="769180" cy="618855"/>
+          </a:xfrm>
+          <a:prstGeom prst="rect">
+            <a:avLst/>
+          </a:prstGeom>
+        </p:spPr>
+      </p:pic>
+      <p:pic>
+        <p:nvPicPr>
+          <p:cNvPr id="5" name="Picture 2" descr="What is JavaScript?">
+            <a:extLst>
+              <a:ext uri="{FF2B5EF4-FFF2-40B4-BE49-F238E27FC236}">
+                <a16:creationId xmlns:a16="http://schemas.microsoft.com/office/drawing/2014/main" id="{1DA6F14E-BF85-AD64-9CF6-4DD7D1034321}"/>
+              </a:ext>
+            </a:extLst>
+          </p:cNvPr>
+          <p:cNvPicPr>
+            <a:picLocks noGrp="1" noChangeAspect="1" noChangeArrowheads="1"/>
+          </p:cNvPicPr>
+          <p:nvPr>
+            <p:ph idx="1"/>
+          </p:nvPr>
+        </p:nvPicPr>
+        <p:blipFill>
+          <a:blip r:embed="rId3">
+            <a:extLst>
+              <a:ext uri="{28A0092B-C50C-407E-A947-70E740481C1C}">
+                <a14:useLocalDpi xmlns:a14="http://schemas.microsoft.com/office/drawing/2010/main" val="0"/>
+              </a:ext>
+            </a:extLst>
+          </a:blip>
+          <a:srcRect/>
+          <a:stretch>
+            <a:fillRect/>
+          </a:stretch>
+        </p:blipFill>
+        <p:spPr bwMode="auto">
+          <a:xfrm>
+            <a:off x="10763494" y="5653201"/>
+            <a:ext cx="857627" cy="857627"/>
+          </a:xfrm>
+          <a:prstGeom prst="rect">
+            <a:avLst/>
+          </a:prstGeom>
+          <a:noFill/>
+          <a:extLst>
+            <a:ext uri="{909E8E84-426E-40DD-AFC4-6F175D3DCCD1}">
+              <a14:hiddenFill xmlns:a14="http://schemas.microsoft.com/office/drawing/2010/main">
+                <a:solidFill>
+                  <a:srgbClr val="FFFFFF"/>
+                </a:solidFill>
+              </a14:hiddenFill>
+            </a:ext>
+          </a:extLst>
+        </p:spPr>
+      </p:pic>
+      <p:pic>
+        <p:nvPicPr>
+          <p:cNvPr id="7" name="Picture 6">
+            <a:extLst>
+              <a:ext uri="{FF2B5EF4-FFF2-40B4-BE49-F238E27FC236}">
+                <a16:creationId xmlns:a16="http://schemas.microsoft.com/office/drawing/2014/main" id="{60E42138-1A26-FE4D-61A9-0C85E1D04097}"/>
+              </a:ext>
+            </a:extLst>
+          </p:cNvPr>
+          <p:cNvPicPr>
+            <a:picLocks noChangeAspect="1"/>
+          </p:cNvPicPr>
+          <p:nvPr/>
+        </p:nvPicPr>
+        <p:blipFill>
+          <a:blip r:embed="rId4"/>
+          <a:stretch>
+            <a:fillRect/>
+          </a:stretch>
+        </p:blipFill>
+        <p:spPr>
+          <a:xfrm>
+            <a:off x="1133719" y="1704975"/>
+            <a:ext cx="9629775" cy="3448050"/>
+          </a:xfrm>
+          <a:prstGeom prst="rect">
+            <a:avLst/>
+          </a:prstGeom>
+        </p:spPr>
+      </p:pic>
+    </p:spTree>
+    <p:extLst>
+      <p:ext uri="{BB962C8B-B14F-4D97-AF65-F5344CB8AC3E}">
+        <p14:creationId xmlns:p14="http://schemas.microsoft.com/office/powerpoint/2010/main" val="339974946"/>
+      </p:ext>
+    </p:extLst>
+  </p:cSld>
+  <p:clrMapOvr>
+    <a:masterClrMapping/>
+  </p:clrMapOvr>
+</p:sld>
+</file>
+
+<file path=ppt/slides/slide52.xml><?xml version="1.0" encoding="utf-8"?>
+<p:sld xmlns:a="http://schemas.openxmlformats.org/drawingml/2006/main" xmlns:r="http://schemas.openxmlformats.org/officeDocument/2006/relationships" xmlns:p="http://schemas.openxmlformats.org/presentationml/2006/main">
+  <p:cSld>
+    <p:spTree>
+      <p:nvGrpSpPr>
+        <p:cNvPr id="1" name=""/>
+        <p:cNvGrpSpPr/>
+        <p:nvPr/>
+      </p:nvGrpSpPr>
+      <p:grpSpPr>
+        <a:xfrm>
+          <a:off x="0" y="0"/>
+          <a:ext cx="0" cy="0"/>
+          <a:chOff x="0" y="0"/>
+          <a:chExt cx="0" cy="0"/>
+        </a:xfrm>
+      </p:grpSpPr>
+      <p:pic>
+        <p:nvPicPr>
+          <p:cNvPr id="4" name="Picture 3">
+            <a:extLst>
+              <a:ext uri="{FF2B5EF4-FFF2-40B4-BE49-F238E27FC236}">
+                <a16:creationId xmlns:a16="http://schemas.microsoft.com/office/drawing/2014/main" id="{785FEB4B-B164-3D06-2B9B-86B675423564}"/>
+              </a:ext>
+            </a:extLst>
+          </p:cNvPr>
+          <p:cNvPicPr>
+            <a:picLocks noChangeAspect="1"/>
+          </p:cNvPicPr>
+          <p:nvPr/>
+        </p:nvPicPr>
+        <p:blipFill>
+          <a:blip r:embed="rId2">
+            <a:extLst>
+              <a:ext uri="{28A0092B-C50C-407E-A947-70E740481C1C}">
+                <a14:useLocalDpi xmlns:a14="http://schemas.microsoft.com/office/drawing/2010/main" val="0"/>
+              </a:ext>
+            </a:extLst>
+          </a:blip>
+          <a:stretch>
+            <a:fillRect/>
+          </a:stretch>
+        </p:blipFill>
+        <p:spPr>
+          <a:xfrm>
+            <a:off x="10969210" y="718478"/>
+            <a:ext cx="769180" cy="618855"/>
+          </a:xfrm>
+          <a:prstGeom prst="rect">
+            <a:avLst/>
+          </a:prstGeom>
+        </p:spPr>
+      </p:pic>
+      <p:pic>
+        <p:nvPicPr>
+          <p:cNvPr id="5" name="Picture 2" descr="What is JavaScript?">
+            <a:extLst>
+              <a:ext uri="{FF2B5EF4-FFF2-40B4-BE49-F238E27FC236}">
+                <a16:creationId xmlns:a16="http://schemas.microsoft.com/office/drawing/2014/main" id="{EE8DC21C-2D94-5B5B-1D28-94025536E011}"/>
+              </a:ext>
+            </a:extLst>
+          </p:cNvPr>
+          <p:cNvPicPr>
+            <a:picLocks noGrp="1" noChangeAspect="1" noChangeArrowheads="1"/>
+          </p:cNvPicPr>
+          <p:nvPr>
+            <p:ph idx="1"/>
+          </p:nvPr>
+        </p:nvPicPr>
+        <p:blipFill>
+          <a:blip r:embed="rId3">
+            <a:extLst>
+              <a:ext uri="{28A0092B-C50C-407E-A947-70E740481C1C}">
+                <a14:useLocalDpi xmlns:a14="http://schemas.microsoft.com/office/drawing/2010/main" val="0"/>
+              </a:ext>
+            </a:extLst>
+          </a:blip>
+          <a:srcRect/>
+          <a:stretch>
+            <a:fillRect/>
+          </a:stretch>
+        </p:blipFill>
+        <p:spPr bwMode="auto">
+          <a:xfrm>
+            <a:off x="10763494" y="5653201"/>
+            <a:ext cx="857627" cy="857627"/>
+          </a:xfrm>
+          <a:prstGeom prst="rect">
+            <a:avLst/>
+          </a:prstGeom>
+          <a:noFill/>
+          <a:extLst>
+            <a:ext uri="{909E8E84-426E-40DD-AFC4-6F175D3DCCD1}">
+              <a14:hiddenFill xmlns:a14="http://schemas.microsoft.com/office/drawing/2010/main">
+                <a:solidFill>
+                  <a:srgbClr val="FFFFFF"/>
+                </a:solidFill>
+              </a14:hiddenFill>
+            </a:ext>
+          </a:extLst>
+        </p:spPr>
+      </p:pic>
+      <p:pic>
+        <p:nvPicPr>
+          <p:cNvPr id="7" name="Picture 6">
+            <a:extLst>
+              <a:ext uri="{FF2B5EF4-FFF2-40B4-BE49-F238E27FC236}">
+                <a16:creationId xmlns:a16="http://schemas.microsoft.com/office/drawing/2014/main" id="{7CC19B3C-A235-7A48-481B-EB87A530DA12}"/>
+              </a:ext>
+            </a:extLst>
+          </p:cNvPr>
+          <p:cNvPicPr>
+            <a:picLocks noChangeAspect="1"/>
+          </p:cNvPicPr>
+          <p:nvPr/>
+        </p:nvPicPr>
+        <p:blipFill>
+          <a:blip r:embed="rId4"/>
+          <a:stretch>
+            <a:fillRect/>
+          </a:stretch>
+        </p:blipFill>
+        <p:spPr>
+          <a:xfrm>
+            <a:off x="2090287" y="831009"/>
+            <a:ext cx="7461486" cy="5574308"/>
+          </a:xfrm>
+          <a:prstGeom prst="rect">
+            <a:avLst/>
+          </a:prstGeom>
+        </p:spPr>
+      </p:pic>
+    </p:spTree>
+    <p:extLst>
+      <p:ext uri="{BB962C8B-B14F-4D97-AF65-F5344CB8AC3E}">
+        <p14:creationId xmlns:p14="http://schemas.microsoft.com/office/powerpoint/2010/main" val="419497619"/>
+      </p:ext>
+    </p:extLst>
+  </p:cSld>
+  <p:clrMapOvr>
+    <a:masterClrMapping/>
+  </p:clrMapOvr>
+</p:sld>
+</file>
+
+<file path=ppt/slides/slide53.xml><?xml version="1.0" encoding="utf-8"?>
+<p:sld xmlns:a="http://schemas.openxmlformats.org/drawingml/2006/main" xmlns:r="http://schemas.openxmlformats.org/officeDocument/2006/relationships" xmlns:p="http://schemas.openxmlformats.org/presentationml/2006/main">
+  <p:cSld>
+    <p:spTree>
+      <p:nvGrpSpPr>
+        <p:cNvPr id="1" name=""/>
+        <p:cNvGrpSpPr/>
+        <p:nvPr/>
+      </p:nvGrpSpPr>
+      <p:grpSpPr>
+        <a:xfrm>
+          <a:off x="0" y="0"/>
+          <a:ext cx="0" cy="0"/>
+          <a:chOff x="0" y="0"/>
+          <a:chExt cx="0" cy="0"/>
+        </a:xfrm>
+      </p:grpSpPr>
+      <p:pic>
+        <p:nvPicPr>
+          <p:cNvPr id="4" name="Picture 3">
+            <a:extLst>
+              <a:ext uri="{FF2B5EF4-FFF2-40B4-BE49-F238E27FC236}">
+                <a16:creationId xmlns:a16="http://schemas.microsoft.com/office/drawing/2014/main" id="{E06DA7B0-F38E-9A87-AEBC-E8AD6E82FE38}"/>
+              </a:ext>
+            </a:extLst>
+          </p:cNvPr>
+          <p:cNvPicPr>
+            <a:picLocks noChangeAspect="1"/>
+          </p:cNvPicPr>
+          <p:nvPr/>
+        </p:nvPicPr>
+        <p:blipFill>
+          <a:blip r:embed="rId2">
+            <a:extLst>
+              <a:ext uri="{28A0092B-C50C-407E-A947-70E740481C1C}">
+                <a14:useLocalDpi xmlns:a14="http://schemas.microsoft.com/office/drawing/2010/main" val="0"/>
+              </a:ext>
+            </a:extLst>
+          </a:blip>
+          <a:stretch>
+            <a:fillRect/>
+          </a:stretch>
+        </p:blipFill>
+        <p:spPr>
+          <a:xfrm>
+            <a:off x="10969210" y="718478"/>
+            <a:ext cx="769180" cy="618855"/>
+          </a:xfrm>
+          <a:prstGeom prst="rect">
+            <a:avLst/>
+          </a:prstGeom>
+        </p:spPr>
+      </p:pic>
+      <p:pic>
+        <p:nvPicPr>
+          <p:cNvPr id="5" name="Picture 2" descr="What is JavaScript?">
+            <a:extLst>
+              <a:ext uri="{FF2B5EF4-FFF2-40B4-BE49-F238E27FC236}">
+                <a16:creationId xmlns:a16="http://schemas.microsoft.com/office/drawing/2014/main" id="{D634D26A-8FA1-A0D6-D18D-766DF64F7DA0}"/>
+              </a:ext>
+            </a:extLst>
+          </p:cNvPr>
+          <p:cNvPicPr>
+            <a:picLocks noGrp="1" noChangeAspect="1" noChangeArrowheads="1"/>
+          </p:cNvPicPr>
+          <p:nvPr>
+            <p:ph idx="1"/>
+          </p:nvPr>
+        </p:nvPicPr>
+        <p:blipFill>
+          <a:blip r:embed="rId3">
+            <a:extLst>
+              <a:ext uri="{28A0092B-C50C-407E-A947-70E740481C1C}">
+                <a14:useLocalDpi xmlns:a14="http://schemas.microsoft.com/office/drawing/2010/main" val="0"/>
+              </a:ext>
+            </a:extLst>
+          </a:blip>
+          <a:srcRect/>
+          <a:stretch>
+            <a:fillRect/>
+          </a:stretch>
+        </p:blipFill>
+        <p:spPr bwMode="auto">
+          <a:xfrm>
+            <a:off x="10763494" y="5653201"/>
+            <a:ext cx="857627" cy="857627"/>
+          </a:xfrm>
+          <a:prstGeom prst="rect">
+            <a:avLst/>
+          </a:prstGeom>
+          <a:noFill/>
+          <a:extLst>
+            <a:ext uri="{909E8E84-426E-40DD-AFC4-6F175D3DCCD1}">
+              <a14:hiddenFill xmlns:a14="http://schemas.microsoft.com/office/drawing/2010/main">
+                <a:solidFill>
+                  <a:srgbClr val="FFFFFF"/>
+                </a:solidFill>
+              </a14:hiddenFill>
+            </a:ext>
+          </a:extLst>
+        </p:spPr>
+      </p:pic>
+      <p:pic>
+        <p:nvPicPr>
+          <p:cNvPr id="7" name="Picture 6">
+            <a:extLst>
+              <a:ext uri="{FF2B5EF4-FFF2-40B4-BE49-F238E27FC236}">
+                <a16:creationId xmlns:a16="http://schemas.microsoft.com/office/drawing/2014/main" id="{0A7E38FA-1E02-BEE6-772B-F62E938F0041}"/>
+              </a:ext>
+            </a:extLst>
+          </p:cNvPr>
+          <p:cNvPicPr>
+            <a:picLocks noChangeAspect="1"/>
+          </p:cNvPicPr>
+          <p:nvPr/>
+        </p:nvPicPr>
+        <p:blipFill>
+          <a:blip r:embed="rId4"/>
+          <a:stretch>
+            <a:fillRect/>
+          </a:stretch>
+        </p:blipFill>
+        <p:spPr>
+          <a:xfrm>
+            <a:off x="1417037" y="718478"/>
+            <a:ext cx="8406585" cy="5504609"/>
+          </a:xfrm>
+          <a:prstGeom prst="rect">
+            <a:avLst/>
+          </a:prstGeom>
+        </p:spPr>
+      </p:pic>
+    </p:spTree>
+    <p:extLst>
+      <p:ext uri="{BB962C8B-B14F-4D97-AF65-F5344CB8AC3E}">
+        <p14:creationId xmlns:p14="http://schemas.microsoft.com/office/powerpoint/2010/main" val="1289326450"/>
+      </p:ext>
+    </p:extLst>
+  </p:cSld>
+  <p:clrMapOvr>
+    <a:masterClrMapping/>
+  </p:clrMapOvr>
+</p:sld>
+</file>
+
+<file path=ppt/slides/slide54.xml><?xml version="1.0" encoding="utf-8"?>
+<p:sld xmlns:a="http://schemas.openxmlformats.org/drawingml/2006/main" xmlns:r="http://schemas.openxmlformats.org/officeDocument/2006/relationships" xmlns:p="http://schemas.openxmlformats.org/presentationml/2006/main">
+  <p:cSld>
+    <p:spTree>
+      <p:nvGrpSpPr>
+        <p:cNvPr id="1" name=""/>
+        <p:cNvGrpSpPr/>
+        <p:nvPr/>
+      </p:nvGrpSpPr>
+      <p:grpSpPr>
+        <a:xfrm>
+          <a:off x="0" y="0"/>
+          <a:ext cx="0" cy="0"/>
+          <a:chOff x="0" y="0"/>
+          <a:chExt cx="0" cy="0"/>
+        </a:xfrm>
+      </p:grpSpPr>
+      <p:pic>
+        <p:nvPicPr>
+          <p:cNvPr id="4" name="Picture 3">
+            <a:extLst>
+              <a:ext uri="{FF2B5EF4-FFF2-40B4-BE49-F238E27FC236}">
+                <a16:creationId xmlns:a16="http://schemas.microsoft.com/office/drawing/2014/main" id="{B15EBFBA-7E96-F03D-09FA-ED165E2513F7}"/>
+              </a:ext>
+            </a:extLst>
+          </p:cNvPr>
+          <p:cNvPicPr>
+            <a:picLocks noChangeAspect="1"/>
+          </p:cNvPicPr>
+          <p:nvPr/>
+        </p:nvPicPr>
+        <p:blipFill>
+          <a:blip r:embed="rId2">
+            <a:extLst>
+              <a:ext uri="{28A0092B-C50C-407E-A947-70E740481C1C}">
+                <a14:useLocalDpi xmlns:a14="http://schemas.microsoft.com/office/drawing/2010/main" val="0"/>
+              </a:ext>
+            </a:extLst>
+          </a:blip>
+          <a:stretch>
+            <a:fillRect/>
+          </a:stretch>
+        </p:blipFill>
+        <p:spPr>
+          <a:xfrm>
+            <a:off x="10969210" y="718478"/>
+            <a:ext cx="769180" cy="618855"/>
+          </a:xfrm>
+          <a:prstGeom prst="rect">
+            <a:avLst/>
+          </a:prstGeom>
+        </p:spPr>
+      </p:pic>
+      <p:pic>
+        <p:nvPicPr>
+          <p:cNvPr id="5" name="Picture 2" descr="What is JavaScript?">
+            <a:extLst>
+              <a:ext uri="{FF2B5EF4-FFF2-40B4-BE49-F238E27FC236}">
+                <a16:creationId xmlns:a16="http://schemas.microsoft.com/office/drawing/2014/main" id="{F300EE34-A05D-AD4C-1C65-1660C620A9C7}"/>
+              </a:ext>
+            </a:extLst>
+          </p:cNvPr>
+          <p:cNvPicPr>
+            <a:picLocks noGrp="1" noChangeAspect="1" noChangeArrowheads="1"/>
+          </p:cNvPicPr>
+          <p:nvPr>
+            <p:ph idx="1"/>
+          </p:nvPr>
+        </p:nvPicPr>
+        <p:blipFill>
+          <a:blip r:embed="rId3">
+            <a:extLst>
+              <a:ext uri="{28A0092B-C50C-407E-A947-70E740481C1C}">
+                <a14:useLocalDpi xmlns:a14="http://schemas.microsoft.com/office/drawing/2010/main" val="0"/>
+              </a:ext>
+            </a:extLst>
+          </a:blip>
+          <a:srcRect/>
+          <a:stretch>
+            <a:fillRect/>
+          </a:stretch>
+        </p:blipFill>
+        <p:spPr bwMode="auto">
+          <a:xfrm>
+            <a:off x="10763494" y="5653201"/>
+            <a:ext cx="857627" cy="857627"/>
+          </a:xfrm>
+          <a:prstGeom prst="rect">
+            <a:avLst/>
+          </a:prstGeom>
+          <a:noFill/>
+          <a:extLst>
+            <a:ext uri="{909E8E84-426E-40DD-AFC4-6F175D3DCCD1}">
+              <a14:hiddenFill xmlns:a14="http://schemas.microsoft.com/office/drawing/2010/main">
+                <a:solidFill>
+                  <a:srgbClr val="FFFFFF"/>
+                </a:solidFill>
+              </a14:hiddenFill>
+            </a:ext>
+          </a:extLst>
+        </p:spPr>
+      </p:pic>
+      <p:pic>
+        <p:nvPicPr>
+          <p:cNvPr id="7" name="Picture 6">
+            <a:extLst>
+              <a:ext uri="{FF2B5EF4-FFF2-40B4-BE49-F238E27FC236}">
+                <a16:creationId xmlns:a16="http://schemas.microsoft.com/office/drawing/2014/main" id="{C9191D32-108F-8987-D9A9-1656FA833317}"/>
+              </a:ext>
+            </a:extLst>
+          </p:cNvPr>
+          <p:cNvPicPr>
+            <a:picLocks noChangeAspect="1"/>
+          </p:cNvPicPr>
+          <p:nvPr/>
+        </p:nvPicPr>
+        <p:blipFill>
+          <a:blip r:embed="rId4"/>
+          <a:stretch>
+            <a:fillRect/>
+          </a:stretch>
+        </p:blipFill>
+        <p:spPr>
+          <a:xfrm>
+            <a:off x="1403334" y="1027905"/>
+            <a:ext cx="8692137" cy="5156578"/>
+          </a:xfrm>
+          <a:prstGeom prst="rect">
+            <a:avLst/>
+          </a:prstGeom>
+        </p:spPr>
+      </p:pic>
+    </p:spTree>
+    <p:extLst>
+      <p:ext uri="{BB962C8B-B14F-4D97-AF65-F5344CB8AC3E}">
+        <p14:creationId xmlns:p14="http://schemas.microsoft.com/office/powerpoint/2010/main" val="3635607284"/>
+      </p:ext>
+    </p:extLst>
+  </p:cSld>
+  <p:clrMapOvr>
+    <a:masterClrMapping/>
+  </p:clrMapOvr>
+</p:sld>
+</file>
+
+<file path=ppt/slides/slide55.xml><?xml version="1.0" encoding="utf-8"?>
+<p:sld xmlns:a="http://schemas.openxmlformats.org/drawingml/2006/main" xmlns:r="http://schemas.openxmlformats.org/officeDocument/2006/relationships" xmlns:p="http://schemas.openxmlformats.org/presentationml/2006/main">
+  <p:cSld>
+    <p:spTree>
+      <p:nvGrpSpPr>
+        <p:cNvPr id="1" name=""/>
+        <p:cNvGrpSpPr/>
+        <p:nvPr/>
+      </p:nvGrpSpPr>
+      <p:grpSpPr>
+        <a:xfrm>
+          <a:off x="0" y="0"/>
+          <a:ext cx="0" cy="0"/>
+          <a:chOff x="0" y="0"/>
+          <a:chExt cx="0" cy="0"/>
+        </a:xfrm>
+      </p:grpSpPr>
+      <p:pic>
+        <p:nvPicPr>
+          <p:cNvPr id="4" name="Picture 3">
+            <a:extLst>
+              <a:ext uri="{FF2B5EF4-FFF2-40B4-BE49-F238E27FC236}">
+                <a16:creationId xmlns:a16="http://schemas.microsoft.com/office/drawing/2014/main" id="{F1389F5F-D9FB-94E5-B1C0-EA51B725B18F}"/>
+              </a:ext>
+            </a:extLst>
+          </p:cNvPr>
+          <p:cNvPicPr>
+            <a:picLocks noChangeAspect="1"/>
+          </p:cNvPicPr>
+          <p:nvPr/>
+        </p:nvPicPr>
+        <p:blipFill>
+          <a:blip r:embed="rId2">
+            <a:extLst>
+              <a:ext uri="{28A0092B-C50C-407E-A947-70E740481C1C}">
+                <a14:useLocalDpi xmlns:a14="http://schemas.microsoft.com/office/drawing/2010/main" val="0"/>
+              </a:ext>
+            </a:extLst>
+          </a:blip>
+          <a:stretch>
+            <a:fillRect/>
+          </a:stretch>
+        </p:blipFill>
+        <p:spPr>
+          <a:xfrm>
+            <a:off x="10969210" y="718478"/>
+            <a:ext cx="769180" cy="618855"/>
+          </a:xfrm>
+          <a:prstGeom prst="rect">
+            <a:avLst/>
+          </a:prstGeom>
+        </p:spPr>
+      </p:pic>
+      <p:pic>
+        <p:nvPicPr>
+          <p:cNvPr id="5" name="Picture 2" descr="What is JavaScript?">
+            <a:extLst>
+              <a:ext uri="{FF2B5EF4-FFF2-40B4-BE49-F238E27FC236}">
+                <a16:creationId xmlns:a16="http://schemas.microsoft.com/office/drawing/2014/main" id="{0C383436-4371-8DF9-A677-01FEEDBA1184}"/>
+              </a:ext>
+            </a:extLst>
+          </p:cNvPr>
+          <p:cNvPicPr>
+            <a:picLocks noGrp="1" noChangeAspect="1" noChangeArrowheads="1"/>
+          </p:cNvPicPr>
+          <p:nvPr>
+            <p:ph idx="1"/>
+          </p:nvPr>
+        </p:nvPicPr>
+        <p:blipFill>
+          <a:blip r:embed="rId3">
+            <a:extLst>
+              <a:ext uri="{28A0092B-C50C-407E-A947-70E740481C1C}">
+                <a14:useLocalDpi xmlns:a14="http://schemas.microsoft.com/office/drawing/2010/main" val="0"/>
+              </a:ext>
+            </a:extLst>
+          </a:blip>
+          <a:srcRect/>
+          <a:stretch>
+            <a:fillRect/>
+          </a:stretch>
+        </p:blipFill>
+        <p:spPr bwMode="auto">
+          <a:xfrm>
+            <a:off x="10763494" y="5653201"/>
+            <a:ext cx="857627" cy="857627"/>
+          </a:xfrm>
+          <a:prstGeom prst="rect">
+            <a:avLst/>
+          </a:prstGeom>
+          <a:noFill/>
+          <a:extLst>
+            <a:ext uri="{909E8E84-426E-40DD-AFC4-6F175D3DCCD1}">
+              <a14:hiddenFill xmlns:a14="http://schemas.microsoft.com/office/drawing/2010/main">
+                <a:solidFill>
+                  <a:srgbClr val="FFFFFF"/>
+                </a:solidFill>
+              </a14:hiddenFill>
+            </a:ext>
+          </a:extLst>
+        </p:spPr>
+      </p:pic>
+      <p:pic>
+        <p:nvPicPr>
+          <p:cNvPr id="7" name="Picture 6">
+            <a:extLst>
+              <a:ext uri="{FF2B5EF4-FFF2-40B4-BE49-F238E27FC236}">
+                <a16:creationId xmlns:a16="http://schemas.microsoft.com/office/drawing/2014/main" id="{BFD3F263-A75D-80EA-5907-C91474A7F60D}"/>
+              </a:ext>
+            </a:extLst>
+          </p:cNvPr>
+          <p:cNvPicPr>
+            <a:picLocks noChangeAspect="1"/>
+          </p:cNvPicPr>
+          <p:nvPr/>
+        </p:nvPicPr>
+        <p:blipFill>
+          <a:blip r:embed="rId4"/>
+          <a:stretch>
+            <a:fillRect/>
+          </a:stretch>
+        </p:blipFill>
+        <p:spPr>
+          <a:xfrm>
+            <a:off x="1420125" y="830348"/>
+            <a:ext cx="8486775" cy="5419725"/>
+          </a:xfrm>
+          <a:prstGeom prst="rect">
+            <a:avLst/>
+          </a:prstGeom>
+        </p:spPr>
+      </p:pic>
+    </p:spTree>
+    <p:extLst>
+      <p:ext uri="{BB962C8B-B14F-4D97-AF65-F5344CB8AC3E}">
+        <p14:creationId xmlns:p14="http://schemas.microsoft.com/office/powerpoint/2010/main" val="1414437188"/>
+      </p:ext>
+    </p:extLst>
+  </p:cSld>
+  <p:clrMapOvr>
+    <a:masterClrMapping/>
+  </p:clrMapOvr>
+</p:sld>
+</file>
+
+<file path=ppt/slides/slide56.xml><?xml version="1.0" encoding="utf-8"?>
+<p:sld xmlns:a="http://schemas.openxmlformats.org/drawingml/2006/main" xmlns:r="http://schemas.openxmlformats.org/officeDocument/2006/relationships" xmlns:p="http://schemas.openxmlformats.org/presentationml/2006/main">
+  <p:cSld>
+    <p:spTree>
+      <p:nvGrpSpPr>
+        <p:cNvPr id="1" name=""/>
+        <p:cNvGrpSpPr/>
+        <p:nvPr/>
+      </p:nvGrpSpPr>
+      <p:grpSpPr>
+        <a:xfrm>
+          <a:off x="0" y="0"/>
+          <a:ext cx="0" cy="0"/>
+          <a:chOff x="0" y="0"/>
+          <a:chExt cx="0" cy="0"/>
+        </a:xfrm>
+      </p:grpSpPr>
+      <p:sp>
+        <p:nvSpPr>
+          <p:cNvPr id="2" name="Title 1">
+            <a:extLst>
+              <a:ext uri="{FF2B5EF4-FFF2-40B4-BE49-F238E27FC236}">
+                <a16:creationId xmlns:a16="http://schemas.microsoft.com/office/drawing/2014/main" id="{E7C7FA82-77BC-E779-C4F0-8F5FEADAAE8E}"/>
+              </a:ext>
+            </a:extLst>
+          </p:cNvPr>
+          <p:cNvSpPr>
+            <a:spLocks noGrp="1"/>
+          </p:cNvSpPr>
+          <p:nvPr>
+            <p:ph type="title"/>
+          </p:nvPr>
+        </p:nvSpPr>
+        <p:spPr/>
+        <p:txBody>
+          <a:bodyPr/>
+          <a:lstStyle/>
+          <a:p>
+            <a:endParaRPr lang="en-US"/>
+          </a:p>
+        </p:txBody>
+      </p:sp>
+      <p:sp>
+        <p:nvSpPr>
+          <p:cNvPr id="3" name="Content Placeholder 2">
+            <a:extLst>
+              <a:ext uri="{FF2B5EF4-FFF2-40B4-BE49-F238E27FC236}">
+                <a16:creationId xmlns:a16="http://schemas.microsoft.com/office/drawing/2014/main" id="{28AC0590-2E7D-FCE2-E5A8-EC86018899A1}"/>
+              </a:ext>
+            </a:extLst>
+          </p:cNvPr>
+          <p:cNvSpPr>
+            <a:spLocks noGrp="1"/>
+          </p:cNvSpPr>
+          <p:nvPr>
+            <p:ph idx="1"/>
+          </p:nvPr>
+        </p:nvSpPr>
+        <p:spPr/>
+        <p:txBody>
+          <a:bodyPr/>
+          <a:lstStyle/>
+          <a:p>
+            <a:endParaRPr lang="en-US"/>
+          </a:p>
+        </p:txBody>
+      </p:sp>
+    </p:spTree>
+    <p:extLst>
+      <p:ext uri="{BB962C8B-B14F-4D97-AF65-F5344CB8AC3E}">
+        <p14:creationId xmlns:p14="http://schemas.microsoft.com/office/powerpoint/2010/main" val="3501440482"/>
+      </p:ext>
+    </p:extLst>
+  </p:cSld>
+  <p:clrMapOvr>
+    <a:masterClrMapping/>
+  </p:clrMapOvr>
+</p:sld>
+</file>
+
+<file path=ppt/slides/slide57.xml><?xml version="1.0" encoding="utf-8"?>
+<p:sld xmlns:a="http://schemas.openxmlformats.org/drawingml/2006/main" xmlns:r="http://schemas.openxmlformats.org/officeDocument/2006/relationships" xmlns:p="http://schemas.openxmlformats.org/presentationml/2006/main">
+  <p:cSld>
+    <p:spTree>
+      <p:nvGrpSpPr>
+        <p:cNvPr id="1" name=""/>
+        <p:cNvGrpSpPr/>
+        <p:nvPr/>
+      </p:nvGrpSpPr>
+      <p:grpSpPr>
+        <a:xfrm>
+          <a:off x="0" y="0"/>
+          <a:ext cx="0" cy="0"/>
+          <a:chOff x="0" y="0"/>
+          <a:chExt cx="0" cy="0"/>
+        </a:xfrm>
+      </p:grpSpPr>
+      <p:sp>
+        <p:nvSpPr>
+          <p:cNvPr id="2" name="Title 1">
+            <a:extLst>
+              <a:ext uri="{FF2B5EF4-FFF2-40B4-BE49-F238E27FC236}">
+                <a16:creationId xmlns:a16="http://schemas.microsoft.com/office/drawing/2014/main" id="{7095C955-F08A-4118-4C1F-A4CA74E3AC65}"/>
+              </a:ext>
+            </a:extLst>
+          </p:cNvPr>
+          <p:cNvSpPr>
+            <a:spLocks noGrp="1"/>
+          </p:cNvSpPr>
+          <p:nvPr>
+            <p:ph type="title"/>
+          </p:nvPr>
+        </p:nvSpPr>
+        <p:spPr/>
+        <p:txBody>
+          <a:bodyPr/>
+          <a:lstStyle/>
+          <a:p>
+            <a:endParaRPr lang="en-US"/>
+          </a:p>
+        </p:txBody>
+      </p:sp>
+      <p:sp>
+        <p:nvSpPr>
+          <p:cNvPr id="3" name="Content Placeholder 2">
+            <a:extLst>
+              <a:ext uri="{FF2B5EF4-FFF2-40B4-BE49-F238E27FC236}">
+                <a16:creationId xmlns:a16="http://schemas.microsoft.com/office/drawing/2014/main" id="{B6C274BC-85B1-FE19-6335-400A16B3ED80}"/>
+              </a:ext>
+            </a:extLst>
+          </p:cNvPr>
+          <p:cNvSpPr>
+            <a:spLocks noGrp="1"/>
+          </p:cNvSpPr>
+          <p:nvPr>
+            <p:ph idx="1"/>
+          </p:nvPr>
+        </p:nvSpPr>
+        <p:spPr/>
+        <p:txBody>
+          <a:bodyPr/>
+          <a:lstStyle/>
+          <a:p>
+            <a:endParaRPr lang="en-US"/>
+          </a:p>
+        </p:txBody>
+      </p:sp>
+    </p:spTree>
+    <p:extLst>
+      <p:ext uri="{BB962C8B-B14F-4D97-AF65-F5344CB8AC3E}">
+        <p14:creationId xmlns:p14="http://schemas.microsoft.com/office/powerpoint/2010/main" val="1987646771"/>
+      </p:ext>
+    </p:extLst>
+  </p:cSld>
+  <p:clrMapOvr>
+    <a:masterClrMapping/>
+  </p:clrMapOvr>
+</p:sld>
+</file>
+
+<file path=ppt/slides/slide58.xml><?xml version="1.0" encoding="utf-8"?>
+<p:sld xmlns:a="http://schemas.openxmlformats.org/drawingml/2006/main" xmlns:r="http://schemas.openxmlformats.org/officeDocument/2006/relationships" xmlns:p="http://schemas.openxmlformats.org/presentationml/2006/main">
+  <p:cSld>
+    <p:spTree>
+      <p:nvGrpSpPr>
+        <p:cNvPr id="1" name=""/>
+        <p:cNvGrpSpPr/>
+        <p:nvPr/>
+      </p:nvGrpSpPr>
+      <p:grpSpPr>
+        <a:xfrm>
+          <a:off x="0" y="0"/>
+          <a:ext cx="0" cy="0"/>
+          <a:chOff x="0" y="0"/>
+          <a:chExt cx="0" cy="0"/>
+        </a:xfrm>
+      </p:grpSpPr>
+      <p:sp>
+        <p:nvSpPr>
+          <p:cNvPr id="2" name="Title 1">
+            <a:extLst>
+              <a:ext uri="{FF2B5EF4-FFF2-40B4-BE49-F238E27FC236}">
+                <a16:creationId xmlns:a16="http://schemas.microsoft.com/office/drawing/2014/main" id="{8B8DC951-6F9D-B7C5-B522-4D9D781EC02B}"/>
+              </a:ext>
+            </a:extLst>
+          </p:cNvPr>
+          <p:cNvSpPr>
+            <a:spLocks noGrp="1"/>
+          </p:cNvSpPr>
+          <p:nvPr>
+            <p:ph type="title"/>
+          </p:nvPr>
+        </p:nvSpPr>
+        <p:spPr/>
+        <p:txBody>
+          <a:bodyPr/>
+          <a:lstStyle/>
+          <a:p>
+            <a:endParaRPr lang="en-US"/>
+          </a:p>
+        </p:txBody>
+      </p:sp>
+      <p:sp>
+        <p:nvSpPr>
+          <p:cNvPr id="3" name="Content Placeholder 2">
+            <a:extLst>
+              <a:ext uri="{FF2B5EF4-FFF2-40B4-BE49-F238E27FC236}">
+                <a16:creationId xmlns:a16="http://schemas.microsoft.com/office/drawing/2014/main" id="{A2304D56-0379-8BCF-6D49-3E6C549FD53E}"/>
+              </a:ext>
+            </a:extLst>
+          </p:cNvPr>
+          <p:cNvSpPr>
+            <a:spLocks noGrp="1"/>
+          </p:cNvSpPr>
+          <p:nvPr>
+            <p:ph idx="1"/>
+          </p:nvPr>
+        </p:nvSpPr>
+        <p:spPr/>
+        <p:txBody>
+          <a:bodyPr/>
+          <a:lstStyle/>
+          <a:p>
+            <a:endParaRPr lang="en-US"/>
+          </a:p>
+        </p:txBody>
+      </p:sp>
+    </p:spTree>
+    <p:extLst>
+      <p:ext uri="{BB962C8B-B14F-4D97-AF65-F5344CB8AC3E}">
+        <p14:creationId xmlns:p14="http://schemas.microsoft.com/office/powerpoint/2010/main" val="1201286803"/>
+      </p:ext>
+    </p:extLst>
+  </p:cSld>
+  <p:clrMapOvr>
+    <a:masterClrMapping/>
+  </p:clrMapOvr>
+</p:sld>
+</file>
+
+<file path=ppt/slides/slide59.xml><?xml version="1.0" encoding="utf-8"?>
+<p:sld xmlns:a="http://schemas.openxmlformats.org/drawingml/2006/main" xmlns:r="http://schemas.openxmlformats.org/officeDocument/2006/relationships" xmlns:p="http://schemas.openxmlformats.org/presentationml/2006/main">
+  <p:cSld>
+    <p:spTree>
+      <p:nvGrpSpPr>
+        <p:cNvPr id="1" name=""/>
+        <p:cNvGrpSpPr/>
+        <p:nvPr/>
+      </p:nvGrpSpPr>
+      <p:grpSpPr>
+        <a:xfrm>
+          <a:off x="0" y="0"/>
+          <a:ext cx="0" cy="0"/>
+          <a:chOff x="0" y="0"/>
+          <a:chExt cx="0" cy="0"/>
+        </a:xfrm>
+      </p:grpSpPr>
+      <p:sp>
+        <p:nvSpPr>
+          <p:cNvPr id="2" name="Title 1">
+            <a:extLst>
+              <a:ext uri="{FF2B5EF4-FFF2-40B4-BE49-F238E27FC236}">
+                <a16:creationId xmlns:a16="http://schemas.microsoft.com/office/drawing/2014/main" id="{C4BAE9CE-0502-04A2-A803-EA279182787E}"/>
+              </a:ext>
+            </a:extLst>
+          </p:cNvPr>
+          <p:cNvSpPr>
+            <a:spLocks noGrp="1"/>
+          </p:cNvSpPr>
+          <p:nvPr>
+            <p:ph type="title"/>
+          </p:nvPr>
+        </p:nvSpPr>
+        <p:spPr/>
+        <p:txBody>
+          <a:bodyPr/>
+          <a:lstStyle/>
+          <a:p>
+            <a:endParaRPr lang="en-US"/>
+          </a:p>
+        </p:txBody>
+      </p:sp>
+      <p:sp>
+        <p:nvSpPr>
+          <p:cNvPr id="3" name="Content Placeholder 2">
+            <a:extLst>
+              <a:ext uri="{FF2B5EF4-FFF2-40B4-BE49-F238E27FC236}">
+                <a16:creationId xmlns:a16="http://schemas.microsoft.com/office/drawing/2014/main" id="{CF9E8CC3-9E79-3F89-44C8-2FEC89114F62}"/>
+              </a:ext>
+            </a:extLst>
+          </p:cNvPr>
+          <p:cNvSpPr>
+            <a:spLocks noGrp="1"/>
+          </p:cNvSpPr>
+          <p:nvPr>
+            <p:ph idx="1"/>
+          </p:nvPr>
+        </p:nvSpPr>
+        <p:spPr/>
+        <p:txBody>
+          <a:bodyPr/>
+          <a:lstStyle/>
+          <a:p>
+            <a:endParaRPr lang="en-US"/>
+          </a:p>
+        </p:txBody>
+      </p:sp>
+    </p:spTree>
+    <p:extLst>
+      <p:ext uri="{BB962C8B-B14F-4D97-AF65-F5344CB8AC3E}">
+        <p14:creationId xmlns:p14="http://schemas.microsoft.com/office/powerpoint/2010/main" val="741915424"/>
+      </p:ext>
+    </p:extLst>
+  </p:cSld>
+  <p:clrMapOvr>
+    <a:masterClrMapping/>
+  </p:clrMapOvr>
+</p:sld>
+</file>
+
 <file path=ppt/slides/slide6.xml><?xml version="1.0" encoding="utf-8"?>
 <p:sld xmlns:a="http://schemas.openxmlformats.org/drawingml/2006/main" xmlns:r="http://schemas.openxmlformats.org/officeDocument/2006/relationships" xmlns:p="http://schemas.openxmlformats.org/presentationml/2006/main">
   <p:cSld>
@@ -11590,6 +13478,86 @@
     <p:extLst>
       <p:ext uri="{BB962C8B-B14F-4D97-AF65-F5344CB8AC3E}">
         <p14:creationId xmlns:p14="http://schemas.microsoft.com/office/powerpoint/2010/main" val="769183452"/>
+      </p:ext>
+    </p:extLst>
+  </p:cSld>
+  <p:clrMapOvr>
+    <a:masterClrMapping/>
+  </p:clrMapOvr>
+</p:sld>
+</file>
+
+<file path=ppt/slides/slide60.xml><?xml version="1.0" encoding="utf-8"?>
+<p:sld xmlns:a="http://schemas.openxmlformats.org/drawingml/2006/main" xmlns:r="http://schemas.openxmlformats.org/officeDocument/2006/relationships" xmlns:p="http://schemas.openxmlformats.org/presentationml/2006/main">
+  <p:cSld>
+    <p:spTree>
+      <p:nvGrpSpPr>
+        <p:cNvPr id="1" name=""/>
+        <p:cNvGrpSpPr/>
+        <p:nvPr/>
+      </p:nvGrpSpPr>
+      <p:grpSpPr>
+        <a:xfrm>
+          <a:off x="0" y="0"/>
+          <a:ext cx="0" cy="0"/>
+          <a:chOff x="0" y="0"/>
+          <a:chExt cx="0" cy="0"/>
+        </a:xfrm>
+      </p:grpSpPr>
+      <p:sp>
+        <p:nvSpPr>
+          <p:cNvPr id="2" name="Title 1">
+            <a:extLst>
+              <a:ext uri="{FF2B5EF4-FFF2-40B4-BE49-F238E27FC236}">
+                <a16:creationId xmlns:a16="http://schemas.microsoft.com/office/drawing/2014/main" id="{5AD0D970-3C2C-8DCE-AA5D-8C073AAD9872}"/>
+              </a:ext>
+            </a:extLst>
+          </p:cNvPr>
+          <p:cNvSpPr>
+            <a:spLocks noGrp="1"/>
+          </p:cNvSpPr>
+          <p:nvPr>
+            <p:ph type="title"/>
+          </p:nvPr>
+        </p:nvSpPr>
+        <p:spPr/>
+        <p:txBody>
+          <a:bodyPr/>
+          <a:lstStyle/>
+          <a:p>
+            <a:endParaRPr lang="en-US"/>
+          </a:p>
+        </p:txBody>
+      </p:sp>
+      <p:sp>
+        <p:nvSpPr>
+          <p:cNvPr id="3" name="Content Placeholder 2">
+            <a:extLst>
+              <a:ext uri="{FF2B5EF4-FFF2-40B4-BE49-F238E27FC236}">
+                <a16:creationId xmlns:a16="http://schemas.microsoft.com/office/drawing/2014/main" id="{FF21E2A4-58BF-7341-4A22-FB5F3DA6A41C}"/>
+              </a:ext>
+            </a:extLst>
+          </p:cNvPr>
+          <p:cNvSpPr>
+            <a:spLocks noGrp="1"/>
+          </p:cNvSpPr>
+          <p:nvPr>
+            <p:ph idx="1"/>
+          </p:nvPr>
+        </p:nvSpPr>
+        <p:spPr/>
+        <p:txBody>
+          <a:bodyPr/>
+          <a:lstStyle/>
+          <a:p>
+            <a:endParaRPr lang="en-US"/>
+          </a:p>
+        </p:txBody>
+      </p:sp>
+    </p:spTree>
+    <p:extLst>
+      <p:ext uri="{BB962C8B-B14F-4D97-AF65-F5344CB8AC3E}">
+        <p14:creationId xmlns:p14="http://schemas.microsoft.com/office/powerpoint/2010/main" val="2579019719"/>
       </p:ext>
     </p:extLst>
   </p:cSld>

</xml_diff>

<commit_message>
js day 12 last update
</commit_message>
<xml_diff>
--- a/js 1st class slide - part 01 .pptx
+++ b/js 1st class slide - part 01 .pptx
@@ -62,9 +62,17 @@
     <p:sldId id="311" r:id="rId56"/>
     <p:sldId id="312" r:id="rId57"/>
     <p:sldId id="313" r:id="rId58"/>
-    <p:sldId id="314" r:id="rId59"/>
-    <p:sldId id="315" r:id="rId60"/>
-    <p:sldId id="316" r:id="rId61"/>
+    <p:sldId id="317" r:id="rId59"/>
+    <p:sldId id="318" r:id="rId60"/>
+    <p:sldId id="319" r:id="rId61"/>
+    <p:sldId id="320" r:id="rId62"/>
+    <p:sldId id="321" r:id="rId63"/>
+    <p:sldId id="322" r:id="rId64"/>
+    <p:sldId id="323" r:id="rId65"/>
+    <p:sldId id="324" r:id="rId66"/>
+    <p:sldId id="314" r:id="rId67"/>
+    <p:sldId id="315" r:id="rId68"/>
+    <p:sldId id="316" r:id="rId69"/>
   </p:sldIdLst>
   <p:sldSz cx="12192000" cy="6858000"/>
   <p:notesSz cx="6858000" cy="9144000"/>
@@ -229,6 +237,14 @@
             <p14:sldId id="311"/>
             <p14:sldId id="312"/>
             <p14:sldId id="313"/>
+            <p14:sldId id="317"/>
+            <p14:sldId id="318"/>
+            <p14:sldId id="319"/>
+            <p14:sldId id="320"/>
+            <p14:sldId id="321"/>
+            <p14:sldId id="322"/>
+            <p14:sldId id="323"/>
+            <p14:sldId id="324"/>
             <p14:sldId id="314"/>
             <p14:sldId id="315"/>
             <p14:sldId id="316"/>
@@ -419,7 +435,7 @@
           <a:p>
             <a:fld id="{76439928-7ED9-495B-BAD6-CC71D17435BF}" type="datetimeFigureOut">
               <a:rPr lang="en-US" smtClean="0"/>
-              <a:t>1/24/2023</a:t>
+              <a:t>3/12/2023</a:t>
             </a:fld>
             <a:endParaRPr lang="en-US"/>
           </a:p>
@@ -617,7 +633,7 @@
           <a:p>
             <a:fld id="{76439928-7ED9-495B-BAD6-CC71D17435BF}" type="datetimeFigureOut">
               <a:rPr lang="en-US" smtClean="0"/>
-              <a:t>1/24/2023</a:t>
+              <a:t>3/12/2023</a:t>
             </a:fld>
             <a:endParaRPr lang="en-US"/>
           </a:p>
@@ -825,7 +841,7 @@
           <a:p>
             <a:fld id="{76439928-7ED9-495B-BAD6-CC71D17435BF}" type="datetimeFigureOut">
               <a:rPr lang="en-US" smtClean="0"/>
-              <a:t>1/24/2023</a:t>
+              <a:t>3/12/2023</a:t>
             </a:fld>
             <a:endParaRPr lang="en-US"/>
           </a:p>
@@ -1023,7 +1039,7 @@
           <a:p>
             <a:fld id="{76439928-7ED9-495B-BAD6-CC71D17435BF}" type="datetimeFigureOut">
               <a:rPr lang="en-US" smtClean="0"/>
-              <a:t>1/24/2023</a:t>
+              <a:t>3/12/2023</a:t>
             </a:fld>
             <a:endParaRPr lang="en-US"/>
           </a:p>
@@ -1298,7 +1314,7 @@
           <a:p>
             <a:fld id="{76439928-7ED9-495B-BAD6-CC71D17435BF}" type="datetimeFigureOut">
               <a:rPr lang="en-US" smtClean="0"/>
-              <a:t>1/24/2023</a:t>
+              <a:t>3/12/2023</a:t>
             </a:fld>
             <a:endParaRPr lang="en-US"/>
           </a:p>
@@ -1563,7 +1579,7 @@
           <a:p>
             <a:fld id="{76439928-7ED9-495B-BAD6-CC71D17435BF}" type="datetimeFigureOut">
               <a:rPr lang="en-US" smtClean="0"/>
-              <a:t>1/24/2023</a:t>
+              <a:t>3/12/2023</a:t>
             </a:fld>
             <a:endParaRPr lang="en-US"/>
           </a:p>
@@ -1975,7 +1991,7 @@
           <a:p>
             <a:fld id="{76439928-7ED9-495B-BAD6-CC71D17435BF}" type="datetimeFigureOut">
               <a:rPr lang="en-US" smtClean="0"/>
-              <a:t>1/24/2023</a:t>
+              <a:t>3/12/2023</a:t>
             </a:fld>
             <a:endParaRPr lang="en-US"/>
           </a:p>
@@ -2116,7 +2132,7 @@
           <a:p>
             <a:fld id="{76439928-7ED9-495B-BAD6-CC71D17435BF}" type="datetimeFigureOut">
               <a:rPr lang="en-US" smtClean="0"/>
-              <a:t>1/24/2023</a:t>
+              <a:t>3/12/2023</a:t>
             </a:fld>
             <a:endParaRPr lang="en-US"/>
           </a:p>
@@ -2229,7 +2245,7 @@
           <a:p>
             <a:fld id="{76439928-7ED9-495B-BAD6-CC71D17435BF}" type="datetimeFigureOut">
               <a:rPr lang="en-US" smtClean="0"/>
-              <a:t>1/24/2023</a:t>
+              <a:t>3/12/2023</a:t>
             </a:fld>
             <a:endParaRPr lang="en-US"/>
           </a:p>
@@ -2540,7 +2556,7 @@
           <a:p>
             <a:fld id="{76439928-7ED9-495B-BAD6-CC71D17435BF}" type="datetimeFigureOut">
               <a:rPr lang="en-US" smtClean="0"/>
-              <a:t>1/24/2023</a:t>
+              <a:t>3/12/2023</a:t>
             </a:fld>
             <a:endParaRPr lang="en-US"/>
           </a:p>
@@ -2828,7 +2844,7 @@
           <a:p>
             <a:fld id="{76439928-7ED9-495B-BAD6-CC71D17435BF}" type="datetimeFigureOut">
               <a:rPr lang="en-US" smtClean="0"/>
-              <a:t>1/24/2023</a:t>
+              <a:t>3/12/2023</a:t>
             </a:fld>
             <a:endParaRPr lang="en-US"/>
           </a:p>
@@ -3069,7 +3085,7 @@
           <a:p>
             <a:fld id="{76439928-7ED9-495B-BAD6-CC71D17435BF}" type="datetimeFigureOut">
               <a:rPr lang="en-US" smtClean="0"/>
-              <a:t>1/24/2023</a:t>
+              <a:t>3/12/2023</a:t>
             </a:fld>
             <a:endParaRPr lang="en-US"/>
           </a:p>
@@ -13024,10 +13040,10 @@
       </p:grpSpPr>
       <p:sp>
         <p:nvSpPr>
-          <p:cNvPr id="2" name="Title 1">
-            <a:extLst>
-              <a:ext uri="{FF2B5EF4-FFF2-40B4-BE49-F238E27FC236}">
-                <a16:creationId xmlns:a16="http://schemas.microsoft.com/office/drawing/2014/main" id="{E7C7FA82-77BC-E779-C4F0-8F5FEADAAE8E}"/>
+          <p:cNvPr id="4" name="Title 1">
+            <a:extLst>
+              <a:ext uri="{FF2B5EF4-FFF2-40B4-BE49-F238E27FC236}">
+                <a16:creationId xmlns:a16="http://schemas.microsoft.com/office/drawing/2014/main" id="{21CB8BD2-EF01-EC11-F407-23F86034C94D}"/>
               </a:ext>
             </a:extLst>
           </p:cNvPr>
@@ -13038,37 +13054,233 @@
             <p:ph type="title"/>
           </p:nvPr>
         </p:nvSpPr>
-        <p:spPr/>
+        <p:spPr>
+          <a:xfrm>
+            <a:off x="1948069" y="1164941"/>
+            <a:ext cx="5326712" cy="1325563"/>
+          </a:xfrm>
+        </p:spPr>
         <p:txBody>
-          <a:bodyPr/>
+          <a:bodyPr>
+            <a:normAutofit/>
+          </a:bodyPr>
           <a:lstStyle/>
           <a:p>
-            <a:endParaRPr lang="en-US"/>
+            <a:pPr algn="ctr"/>
+            <a:r>
+              <a:rPr lang="en-US" sz="8000" b="1" dirty="0">
+                <a:latin typeface="+mn-lt"/>
+              </a:rPr>
+              <a:t>Java</a:t>
+            </a:r>
+            <a:r>
+              <a:rPr lang="en-US" sz="8000" b="1" dirty="0">
+                <a:solidFill>
+                  <a:srgbClr val="F7DF1E"/>
+                </a:solidFill>
+                <a:latin typeface="+mn-lt"/>
+              </a:rPr>
+              <a:t>Script</a:t>
+            </a:r>
           </a:p>
         </p:txBody>
       </p:sp>
+      <p:pic>
+        <p:nvPicPr>
+          <p:cNvPr id="5" name="Content Placeholder 2" descr="What is JavaScript?">
+            <a:extLst>
+              <a:ext uri="{FF2B5EF4-FFF2-40B4-BE49-F238E27FC236}">
+                <a16:creationId xmlns:a16="http://schemas.microsoft.com/office/drawing/2014/main" id="{3BDCF26D-44E1-9E13-9E7E-9369EB64D558}"/>
+              </a:ext>
+            </a:extLst>
+          </p:cNvPr>
+          <p:cNvPicPr>
+            <a:picLocks noGrp="1" noChangeAspect="1" noChangeArrowheads="1"/>
+          </p:cNvPicPr>
+          <p:nvPr>
+            <p:ph idx="1"/>
+          </p:nvPr>
+        </p:nvPicPr>
+        <p:blipFill>
+          <a:blip r:embed="rId2">
+            <a:extLst>
+              <a:ext uri="{28A0092B-C50C-407E-A947-70E740481C1C}">
+                <a14:useLocalDpi xmlns:a14="http://schemas.microsoft.com/office/drawing/2010/main" val="0"/>
+              </a:ext>
+            </a:extLst>
+          </a:blip>
+          <a:srcRect/>
+          <a:stretch>
+            <a:fillRect/>
+          </a:stretch>
+        </p:blipFill>
+        <p:spPr bwMode="auto">
+          <a:xfrm>
+            <a:off x="9477996" y="2081722"/>
+            <a:ext cx="2143125" cy="2143125"/>
+          </a:xfrm>
+          <a:prstGeom prst="rect">
+            <a:avLst/>
+          </a:prstGeom>
+          <a:noFill/>
+          <a:extLst>
+            <a:ext uri="{909E8E84-426E-40DD-AFC4-6F175D3DCCD1}">
+              <a14:hiddenFill xmlns:a14="http://schemas.microsoft.com/office/drawing/2010/main">
+                <a:solidFill>
+                  <a:srgbClr val="FFFFFF"/>
+                </a:solidFill>
+              </a14:hiddenFill>
+            </a:ext>
+          </a:extLst>
+        </p:spPr>
+      </p:pic>
       <p:sp>
         <p:nvSpPr>
-          <p:cNvPr id="3" name="Content Placeholder 2">
-            <a:extLst>
-              <a:ext uri="{FF2B5EF4-FFF2-40B4-BE49-F238E27FC236}">
-                <a16:creationId xmlns:a16="http://schemas.microsoft.com/office/drawing/2014/main" id="{28AC0590-2E7D-FCE2-E5A8-EC86018899A1}"/>
-              </a:ext>
-            </a:extLst>
-          </p:cNvPr>
-          <p:cNvSpPr>
-            <a:spLocks noGrp="1"/>
+          <p:cNvPr id="6" name="Title 1">
+            <a:extLst>
+              <a:ext uri="{FF2B5EF4-FFF2-40B4-BE49-F238E27FC236}">
+                <a16:creationId xmlns:a16="http://schemas.microsoft.com/office/drawing/2014/main" id="{AA41F8C5-1CAC-47F0-A31B-62ACB53E8647}"/>
+              </a:ext>
+            </a:extLst>
+          </p:cNvPr>
+          <p:cNvSpPr txBox="1">
+            <a:spLocks/>
           </p:cNvSpPr>
-          <p:nvPr>
-            <p:ph idx="1"/>
-          </p:nvPr>
+          <p:nvPr/>
         </p:nvSpPr>
-        <p:spPr/>
+        <p:spPr>
+          <a:xfrm>
+            <a:off x="2145777" y="3562065"/>
+            <a:ext cx="5326712" cy="1325563"/>
+          </a:xfrm>
+          <a:prstGeom prst="rect">
+            <a:avLst/>
+          </a:prstGeom>
+        </p:spPr>
         <p:txBody>
-          <a:bodyPr/>
-          <a:lstStyle/>
+          <a:bodyPr vert="horz" lIns="91440" tIns="45720" rIns="91440" bIns="45720" rtlCol="0" anchor="ctr">
+            <a:normAutofit/>
+          </a:bodyPr>
+          <a:lstStyle>
+            <a:lvl1pPr algn="l" defTabSz="914400" rtl="0" eaLnBrk="1" latinLnBrk="0" hangingPunct="1">
+              <a:lnSpc>
+                <a:spcPct val="90000"/>
+              </a:lnSpc>
+              <a:spcBef>
+                <a:spcPct val="0"/>
+              </a:spcBef>
+              <a:buNone/>
+              <a:defRPr sz="4400" kern="1200">
+                <a:solidFill>
+                  <a:schemeClr val="tx1"/>
+                </a:solidFill>
+                <a:latin typeface="+mj-lt"/>
+                <a:ea typeface="+mj-ea"/>
+                <a:cs typeface="+mj-cs"/>
+              </a:defRPr>
+            </a:lvl1pPr>
+          </a:lstStyle>
           <a:p>
-            <a:endParaRPr lang="en-US"/>
+            <a:pPr algn="ctr"/>
+            <a:r>
+              <a:rPr lang="en-US" b="1" dirty="0">
+                <a:latin typeface="+mn-lt"/>
+              </a:rPr>
+              <a:t>Day 13 </a:t>
+            </a:r>
+          </a:p>
+        </p:txBody>
+      </p:sp>
+      <p:pic>
+        <p:nvPicPr>
+          <p:cNvPr id="7" name="Picture 6">
+            <a:extLst>
+              <a:ext uri="{FF2B5EF4-FFF2-40B4-BE49-F238E27FC236}">
+                <a16:creationId xmlns:a16="http://schemas.microsoft.com/office/drawing/2014/main" id="{E4A1E8D5-7037-D901-BCC6-622F12D40363}"/>
+              </a:ext>
+            </a:extLst>
+          </p:cNvPr>
+          <p:cNvPicPr>
+            <a:picLocks noChangeAspect="1"/>
+          </p:cNvPicPr>
+          <p:nvPr/>
+        </p:nvPicPr>
+        <p:blipFill>
+          <a:blip r:embed="rId3">
+            <a:extLst>
+              <a:ext uri="{28A0092B-C50C-407E-A947-70E740481C1C}">
+                <a14:useLocalDpi xmlns:a14="http://schemas.microsoft.com/office/drawing/2010/main" val="0"/>
+              </a:ext>
+            </a:extLst>
+          </a:blip>
+          <a:stretch>
+            <a:fillRect/>
+          </a:stretch>
+        </p:blipFill>
+        <p:spPr>
+          <a:xfrm>
+            <a:off x="10851941" y="257115"/>
+            <a:ext cx="769180" cy="618855"/>
+          </a:xfrm>
+          <a:prstGeom prst="rect">
+            <a:avLst/>
+          </a:prstGeom>
+        </p:spPr>
+      </p:pic>
+      <p:sp>
+        <p:nvSpPr>
+          <p:cNvPr id="12" name="Title 1">
+            <a:extLst>
+              <a:ext uri="{FF2B5EF4-FFF2-40B4-BE49-F238E27FC236}">
+                <a16:creationId xmlns:a16="http://schemas.microsoft.com/office/drawing/2014/main" id="{70039B2A-3501-8191-D019-BF142CE83E52}"/>
+              </a:ext>
+            </a:extLst>
+          </p:cNvPr>
+          <p:cNvSpPr txBox="1">
+            <a:spLocks/>
+          </p:cNvSpPr>
+          <p:nvPr/>
+        </p:nvSpPr>
+        <p:spPr>
+          <a:xfrm>
+            <a:off x="1948069" y="2490504"/>
+            <a:ext cx="5326712" cy="1325563"/>
+          </a:xfrm>
+          <a:prstGeom prst="rect">
+            <a:avLst/>
+          </a:prstGeom>
+        </p:spPr>
+        <p:txBody>
+          <a:bodyPr vert="horz" lIns="91440" tIns="45720" rIns="91440" bIns="45720" rtlCol="0" anchor="ctr">
+            <a:normAutofit/>
+          </a:bodyPr>
+          <a:lstStyle>
+            <a:lvl1pPr algn="l" defTabSz="914400" rtl="0" eaLnBrk="1" latinLnBrk="0" hangingPunct="1">
+              <a:lnSpc>
+                <a:spcPct val="90000"/>
+              </a:lnSpc>
+              <a:spcBef>
+                <a:spcPct val="0"/>
+              </a:spcBef>
+              <a:buNone/>
+              <a:defRPr sz="4400" kern="1200">
+                <a:solidFill>
+                  <a:schemeClr val="tx1"/>
+                </a:solidFill>
+                <a:latin typeface="+mj-lt"/>
+                <a:ea typeface="+mj-ea"/>
+                <a:cs typeface="+mj-cs"/>
+              </a:defRPr>
+            </a:lvl1pPr>
+          </a:lstStyle>
+          <a:p>
+            <a:pPr algn="ctr"/>
+            <a:r>
+              <a:rPr lang="en-US" b="1" dirty="0">
+                <a:latin typeface="+mn-lt"/>
+              </a:rPr>
+              <a:t>Regular Expression</a:t>
+            </a:r>
           </a:p>
         </p:txBody>
       </p:sp>
@@ -13102,56 +13314,121 @@
           <a:chExt cx="0" cy="0"/>
         </a:xfrm>
       </p:grpSpPr>
-      <p:sp>
-        <p:nvSpPr>
-          <p:cNvPr id="2" name="Title 1">
-            <a:extLst>
-              <a:ext uri="{FF2B5EF4-FFF2-40B4-BE49-F238E27FC236}">
-                <a16:creationId xmlns:a16="http://schemas.microsoft.com/office/drawing/2014/main" id="{7095C955-F08A-4118-4C1F-A4CA74E3AC65}"/>
-              </a:ext>
-            </a:extLst>
-          </p:cNvPr>
-          <p:cNvSpPr>
-            <a:spLocks noGrp="1"/>
-          </p:cNvSpPr>
-          <p:nvPr>
-            <p:ph type="title"/>
-          </p:nvPr>
-        </p:nvSpPr>
-        <p:spPr/>
-        <p:txBody>
-          <a:bodyPr/>
-          <a:lstStyle/>
-          <a:p>
-            <a:endParaRPr lang="en-US"/>
-          </a:p>
-        </p:txBody>
-      </p:sp>
-      <p:sp>
-        <p:nvSpPr>
-          <p:cNvPr id="3" name="Content Placeholder 2">
-            <a:extLst>
-              <a:ext uri="{FF2B5EF4-FFF2-40B4-BE49-F238E27FC236}">
-                <a16:creationId xmlns:a16="http://schemas.microsoft.com/office/drawing/2014/main" id="{B6C274BC-85B1-FE19-6335-400A16B3ED80}"/>
-              </a:ext>
-            </a:extLst>
-          </p:cNvPr>
-          <p:cNvSpPr>
-            <a:spLocks noGrp="1"/>
-          </p:cNvSpPr>
+      <p:pic>
+        <p:nvPicPr>
+          <p:cNvPr id="6" name="Picture 5">
+            <a:extLst>
+              <a:ext uri="{FF2B5EF4-FFF2-40B4-BE49-F238E27FC236}">
+                <a16:creationId xmlns:a16="http://schemas.microsoft.com/office/drawing/2014/main" id="{C991D655-ED5A-7795-06E0-7DD9FF7A3A59}"/>
+              </a:ext>
+            </a:extLst>
+          </p:cNvPr>
+          <p:cNvPicPr>
+            <a:picLocks noChangeAspect="1"/>
+          </p:cNvPicPr>
+          <p:nvPr/>
+        </p:nvPicPr>
+        <p:blipFill>
+          <a:blip r:embed="rId2">
+            <a:extLst>
+              <a:ext uri="{28A0092B-C50C-407E-A947-70E740481C1C}">
+                <a14:useLocalDpi xmlns:a14="http://schemas.microsoft.com/office/drawing/2010/main" val="0"/>
+              </a:ext>
+            </a:extLst>
+          </a:blip>
+          <a:stretch>
+            <a:fillRect/>
+          </a:stretch>
+        </p:blipFill>
+        <p:spPr>
+          <a:xfrm>
+            <a:off x="11080421" y="347172"/>
+            <a:ext cx="769180" cy="618855"/>
+          </a:xfrm>
+          <a:prstGeom prst="rect">
+            <a:avLst/>
+          </a:prstGeom>
+        </p:spPr>
+      </p:pic>
+      <p:pic>
+        <p:nvPicPr>
+          <p:cNvPr id="7" name="Picture 2" descr="What is JavaScript?">
+            <a:extLst>
+              <a:ext uri="{FF2B5EF4-FFF2-40B4-BE49-F238E27FC236}">
+                <a16:creationId xmlns:a16="http://schemas.microsoft.com/office/drawing/2014/main" id="{B64EECA8-23E8-0BF4-B73B-A560CBD8CFA0}"/>
+              </a:ext>
+            </a:extLst>
+          </p:cNvPr>
+          <p:cNvPicPr>
+            <a:picLocks noGrp="1" noChangeAspect="1" noChangeArrowheads="1"/>
+          </p:cNvPicPr>
           <p:nvPr>
             <p:ph idx="1"/>
           </p:nvPr>
-        </p:nvSpPr>
-        <p:spPr/>
-        <p:txBody>
-          <a:bodyPr/>
-          <a:lstStyle/>
-          <a:p>
-            <a:endParaRPr lang="en-US"/>
-          </a:p>
-        </p:txBody>
-      </p:sp>
+        </p:nvPicPr>
+        <p:blipFill>
+          <a:blip r:embed="rId3">
+            <a:extLst>
+              <a:ext uri="{28A0092B-C50C-407E-A947-70E740481C1C}">
+                <a14:useLocalDpi xmlns:a14="http://schemas.microsoft.com/office/drawing/2010/main" val="0"/>
+              </a:ext>
+            </a:extLst>
+          </a:blip>
+          <a:srcRect/>
+          <a:stretch>
+            <a:fillRect/>
+          </a:stretch>
+        </p:blipFill>
+        <p:spPr bwMode="auto">
+          <a:xfrm>
+            <a:off x="10991974" y="5653201"/>
+            <a:ext cx="857627" cy="857627"/>
+          </a:xfrm>
+          <a:prstGeom prst="rect">
+            <a:avLst/>
+          </a:prstGeom>
+          <a:noFill/>
+          <a:extLst>
+            <a:ext uri="{909E8E84-426E-40DD-AFC4-6F175D3DCCD1}">
+              <a14:hiddenFill xmlns:a14="http://schemas.microsoft.com/office/drawing/2010/main">
+                <a:solidFill>
+                  <a:srgbClr val="FFFFFF"/>
+                </a:solidFill>
+              </a14:hiddenFill>
+            </a:ext>
+          </a:extLst>
+        </p:spPr>
+      </p:pic>
+      <p:pic>
+        <p:nvPicPr>
+          <p:cNvPr id="11" name="Picture 10">
+            <a:extLst>
+              <a:ext uri="{FF2B5EF4-FFF2-40B4-BE49-F238E27FC236}">
+                <a16:creationId xmlns:a16="http://schemas.microsoft.com/office/drawing/2014/main" id="{6AFFFEA5-2267-F150-AA00-99CAEFD35963}"/>
+              </a:ext>
+            </a:extLst>
+          </p:cNvPr>
+          <p:cNvPicPr>
+            <a:picLocks noChangeAspect="1"/>
+          </p:cNvPicPr>
+          <p:nvPr/>
+        </p:nvPicPr>
+        <p:blipFill>
+          <a:blip r:embed="rId4"/>
+          <a:stretch>
+            <a:fillRect/>
+          </a:stretch>
+        </p:blipFill>
+        <p:spPr>
+          <a:xfrm>
+            <a:off x="1776412" y="1047750"/>
+            <a:ext cx="8639175" cy="4762500"/>
+          </a:xfrm>
+          <a:prstGeom prst="rect">
+            <a:avLst/>
+          </a:prstGeom>
+        </p:spPr>
+      </p:pic>
     </p:spTree>
     <p:extLst>
       <p:ext uri="{BB962C8B-B14F-4D97-AF65-F5344CB8AC3E}">
@@ -13182,60 +13459,125 @@
           <a:chExt cx="0" cy="0"/>
         </a:xfrm>
       </p:grpSpPr>
-      <p:sp>
-        <p:nvSpPr>
-          <p:cNvPr id="2" name="Title 1">
-            <a:extLst>
-              <a:ext uri="{FF2B5EF4-FFF2-40B4-BE49-F238E27FC236}">
-                <a16:creationId xmlns:a16="http://schemas.microsoft.com/office/drawing/2014/main" id="{8B8DC951-6F9D-B7C5-B522-4D9D781EC02B}"/>
-              </a:ext>
-            </a:extLst>
-          </p:cNvPr>
-          <p:cNvSpPr>
-            <a:spLocks noGrp="1"/>
-          </p:cNvSpPr>
-          <p:nvPr>
-            <p:ph type="title"/>
-          </p:nvPr>
-        </p:nvSpPr>
-        <p:spPr/>
-        <p:txBody>
-          <a:bodyPr/>
-          <a:lstStyle/>
-          <a:p>
-            <a:endParaRPr lang="en-US"/>
-          </a:p>
-        </p:txBody>
-      </p:sp>
-      <p:sp>
-        <p:nvSpPr>
-          <p:cNvPr id="3" name="Content Placeholder 2">
-            <a:extLst>
-              <a:ext uri="{FF2B5EF4-FFF2-40B4-BE49-F238E27FC236}">
-                <a16:creationId xmlns:a16="http://schemas.microsoft.com/office/drawing/2014/main" id="{A2304D56-0379-8BCF-6D49-3E6C549FD53E}"/>
-              </a:ext>
-            </a:extLst>
-          </p:cNvPr>
-          <p:cNvSpPr>
-            <a:spLocks noGrp="1"/>
-          </p:cNvSpPr>
+      <p:pic>
+        <p:nvPicPr>
+          <p:cNvPr id="6" name="Picture 5">
+            <a:extLst>
+              <a:ext uri="{FF2B5EF4-FFF2-40B4-BE49-F238E27FC236}">
+                <a16:creationId xmlns:a16="http://schemas.microsoft.com/office/drawing/2014/main" id="{C991D655-ED5A-7795-06E0-7DD9FF7A3A59}"/>
+              </a:ext>
+            </a:extLst>
+          </p:cNvPr>
+          <p:cNvPicPr>
+            <a:picLocks noChangeAspect="1"/>
+          </p:cNvPicPr>
+          <p:nvPr/>
+        </p:nvPicPr>
+        <p:blipFill>
+          <a:blip r:embed="rId2">
+            <a:extLst>
+              <a:ext uri="{28A0092B-C50C-407E-A947-70E740481C1C}">
+                <a14:useLocalDpi xmlns:a14="http://schemas.microsoft.com/office/drawing/2010/main" val="0"/>
+              </a:ext>
+            </a:extLst>
+          </a:blip>
+          <a:stretch>
+            <a:fillRect/>
+          </a:stretch>
+        </p:blipFill>
+        <p:spPr>
+          <a:xfrm>
+            <a:off x="11080421" y="347172"/>
+            <a:ext cx="769180" cy="618855"/>
+          </a:xfrm>
+          <a:prstGeom prst="rect">
+            <a:avLst/>
+          </a:prstGeom>
+        </p:spPr>
+      </p:pic>
+      <p:pic>
+        <p:nvPicPr>
+          <p:cNvPr id="7" name="Picture 2" descr="What is JavaScript?">
+            <a:extLst>
+              <a:ext uri="{FF2B5EF4-FFF2-40B4-BE49-F238E27FC236}">
+                <a16:creationId xmlns:a16="http://schemas.microsoft.com/office/drawing/2014/main" id="{B64EECA8-23E8-0BF4-B73B-A560CBD8CFA0}"/>
+              </a:ext>
+            </a:extLst>
+          </p:cNvPr>
+          <p:cNvPicPr>
+            <a:picLocks noGrp="1" noChangeAspect="1" noChangeArrowheads="1"/>
+          </p:cNvPicPr>
           <p:nvPr>
             <p:ph idx="1"/>
           </p:nvPr>
-        </p:nvSpPr>
-        <p:spPr/>
-        <p:txBody>
-          <a:bodyPr/>
-          <a:lstStyle/>
-          <a:p>
-            <a:endParaRPr lang="en-US"/>
-          </a:p>
-        </p:txBody>
-      </p:sp>
+        </p:nvPicPr>
+        <p:blipFill>
+          <a:blip r:embed="rId3">
+            <a:extLst>
+              <a:ext uri="{28A0092B-C50C-407E-A947-70E740481C1C}">
+                <a14:useLocalDpi xmlns:a14="http://schemas.microsoft.com/office/drawing/2010/main" val="0"/>
+              </a:ext>
+            </a:extLst>
+          </a:blip>
+          <a:srcRect/>
+          <a:stretch>
+            <a:fillRect/>
+          </a:stretch>
+        </p:blipFill>
+        <p:spPr bwMode="auto">
+          <a:xfrm>
+            <a:off x="10991974" y="5653201"/>
+            <a:ext cx="857627" cy="857627"/>
+          </a:xfrm>
+          <a:prstGeom prst="rect">
+            <a:avLst/>
+          </a:prstGeom>
+          <a:noFill/>
+          <a:extLst>
+            <a:ext uri="{909E8E84-426E-40DD-AFC4-6F175D3DCCD1}">
+              <a14:hiddenFill xmlns:a14="http://schemas.microsoft.com/office/drawing/2010/main">
+                <a:solidFill>
+                  <a:srgbClr val="FFFFFF"/>
+                </a:solidFill>
+              </a14:hiddenFill>
+            </a:ext>
+          </a:extLst>
+        </p:spPr>
+      </p:pic>
+      <p:pic>
+        <p:nvPicPr>
+          <p:cNvPr id="3" name="Picture 2">
+            <a:extLst>
+              <a:ext uri="{FF2B5EF4-FFF2-40B4-BE49-F238E27FC236}">
+                <a16:creationId xmlns:a16="http://schemas.microsoft.com/office/drawing/2014/main" id="{70D8E997-4389-029C-1858-078907A3EFBF}"/>
+              </a:ext>
+            </a:extLst>
+          </p:cNvPr>
+          <p:cNvPicPr>
+            <a:picLocks noChangeAspect="1"/>
+          </p:cNvPicPr>
+          <p:nvPr/>
+        </p:nvPicPr>
+        <p:blipFill>
+          <a:blip r:embed="rId4"/>
+          <a:stretch>
+            <a:fillRect/>
+          </a:stretch>
+        </p:blipFill>
+        <p:spPr>
+          <a:xfrm>
+            <a:off x="1738312" y="1781818"/>
+            <a:ext cx="8715375" cy="2676525"/>
+          </a:xfrm>
+          <a:prstGeom prst="rect">
+            <a:avLst/>
+          </a:prstGeom>
+        </p:spPr>
+      </p:pic>
     </p:spTree>
     <p:extLst>
       <p:ext uri="{BB962C8B-B14F-4D97-AF65-F5344CB8AC3E}">
-        <p14:creationId xmlns:p14="http://schemas.microsoft.com/office/powerpoint/2010/main" val="1201286803"/>
+        <p14:creationId xmlns:p14="http://schemas.microsoft.com/office/powerpoint/2010/main" val="3429381856"/>
       </p:ext>
     </p:extLst>
   </p:cSld>
@@ -13262,60 +13604,125 @@
           <a:chExt cx="0" cy="0"/>
         </a:xfrm>
       </p:grpSpPr>
-      <p:sp>
-        <p:nvSpPr>
-          <p:cNvPr id="2" name="Title 1">
-            <a:extLst>
-              <a:ext uri="{FF2B5EF4-FFF2-40B4-BE49-F238E27FC236}">
-                <a16:creationId xmlns:a16="http://schemas.microsoft.com/office/drawing/2014/main" id="{C4BAE9CE-0502-04A2-A803-EA279182787E}"/>
-              </a:ext>
-            </a:extLst>
-          </p:cNvPr>
-          <p:cNvSpPr>
-            <a:spLocks noGrp="1"/>
-          </p:cNvSpPr>
-          <p:nvPr>
-            <p:ph type="title"/>
-          </p:nvPr>
-        </p:nvSpPr>
-        <p:spPr/>
-        <p:txBody>
-          <a:bodyPr/>
-          <a:lstStyle/>
-          <a:p>
-            <a:endParaRPr lang="en-US"/>
-          </a:p>
-        </p:txBody>
-      </p:sp>
-      <p:sp>
-        <p:nvSpPr>
-          <p:cNvPr id="3" name="Content Placeholder 2">
-            <a:extLst>
-              <a:ext uri="{FF2B5EF4-FFF2-40B4-BE49-F238E27FC236}">
-                <a16:creationId xmlns:a16="http://schemas.microsoft.com/office/drawing/2014/main" id="{CF9E8CC3-9E79-3F89-44C8-2FEC89114F62}"/>
-              </a:ext>
-            </a:extLst>
-          </p:cNvPr>
-          <p:cNvSpPr>
-            <a:spLocks noGrp="1"/>
-          </p:cNvSpPr>
+      <p:pic>
+        <p:nvPicPr>
+          <p:cNvPr id="6" name="Picture 5">
+            <a:extLst>
+              <a:ext uri="{FF2B5EF4-FFF2-40B4-BE49-F238E27FC236}">
+                <a16:creationId xmlns:a16="http://schemas.microsoft.com/office/drawing/2014/main" id="{C991D655-ED5A-7795-06E0-7DD9FF7A3A59}"/>
+              </a:ext>
+            </a:extLst>
+          </p:cNvPr>
+          <p:cNvPicPr>
+            <a:picLocks noChangeAspect="1"/>
+          </p:cNvPicPr>
+          <p:nvPr/>
+        </p:nvPicPr>
+        <p:blipFill>
+          <a:blip r:embed="rId2">
+            <a:extLst>
+              <a:ext uri="{28A0092B-C50C-407E-A947-70E740481C1C}">
+                <a14:useLocalDpi xmlns:a14="http://schemas.microsoft.com/office/drawing/2010/main" val="0"/>
+              </a:ext>
+            </a:extLst>
+          </a:blip>
+          <a:stretch>
+            <a:fillRect/>
+          </a:stretch>
+        </p:blipFill>
+        <p:spPr>
+          <a:xfrm>
+            <a:off x="11080421" y="347172"/>
+            <a:ext cx="769180" cy="618855"/>
+          </a:xfrm>
+          <a:prstGeom prst="rect">
+            <a:avLst/>
+          </a:prstGeom>
+        </p:spPr>
+      </p:pic>
+      <p:pic>
+        <p:nvPicPr>
+          <p:cNvPr id="7" name="Picture 2" descr="What is JavaScript?">
+            <a:extLst>
+              <a:ext uri="{FF2B5EF4-FFF2-40B4-BE49-F238E27FC236}">
+                <a16:creationId xmlns:a16="http://schemas.microsoft.com/office/drawing/2014/main" id="{B64EECA8-23E8-0BF4-B73B-A560CBD8CFA0}"/>
+              </a:ext>
+            </a:extLst>
+          </p:cNvPr>
+          <p:cNvPicPr>
+            <a:picLocks noGrp="1" noChangeAspect="1" noChangeArrowheads="1"/>
+          </p:cNvPicPr>
           <p:nvPr>
             <p:ph idx="1"/>
           </p:nvPr>
-        </p:nvSpPr>
-        <p:spPr/>
-        <p:txBody>
-          <a:bodyPr/>
-          <a:lstStyle/>
-          <a:p>
-            <a:endParaRPr lang="en-US"/>
-          </a:p>
-        </p:txBody>
-      </p:sp>
+        </p:nvPicPr>
+        <p:blipFill>
+          <a:blip r:embed="rId3">
+            <a:extLst>
+              <a:ext uri="{28A0092B-C50C-407E-A947-70E740481C1C}">
+                <a14:useLocalDpi xmlns:a14="http://schemas.microsoft.com/office/drawing/2010/main" val="0"/>
+              </a:ext>
+            </a:extLst>
+          </a:blip>
+          <a:srcRect/>
+          <a:stretch>
+            <a:fillRect/>
+          </a:stretch>
+        </p:blipFill>
+        <p:spPr bwMode="auto">
+          <a:xfrm>
+            <a:off x="10991974" y="5653201"/>
+            <a:ext cx="857627" cy="857627"/>
+          </a:xfrm>
+          <a:prstGeom prst="rect">
+            <a:avLst/>
+          </a:prstGeom>
+          <a:noFill/>
+          <a:extLst>
+            <a:ext uri="{909E8E84-426E-40DD-AFC4-6F175D3DCCD1}">
+              <a14:hiddenFill xmlns:a14="http://schemas.microsoft.com/office/drawing/2010/main">
+                <a:solidFill>
+                  <a:srgbClr val="FFFFFF"/>
+                </a:solidFill>
+              </a14:hiddenFill>
+            </a:ext>
+          </a:extLst>
+        </p:spPr>
+      </p:pic>
+      <p:pic>
+        <p:nvPicPr>
+          <p:cNvPr id="3" name="Picture 2">
+            <a:extLst>
+              <a:ext uri="{FF2B5EF4-FFF2-40B4-BE49-F238E27FC236}">
+                <a16:creationId xmlns:a16="http://schemas.microsoft.com/office/drawing/2014/main" id="{D0B8BBD8-DCCE-3743-59D6-C7CFA9CB8840}"/>
+              </a:ext>
+            </a:extLst>
+          </p:cNvPr>
+          <p:cNvPicPr>
+            <a:picLocks noChangeAspect="1"/>
+          </p:cNvPicPr>
+          <p:nvPr/>
+        </p:nvPicPr>
+        <p:blipFill>
+          <a:blip r:embed="rId4"/>
+          <a:stretch>
+            <a:fillRect/>
+          </a:stretch>
+        </p:blipFill>
+        <p:spPr>
+          <a:xfrm>
+            <a:off x="1109919" y="656598"/>
+            <a:ext cx="9578676" cy="5823465"/>
+          </a:xfrm>
+          <a:prstGeom prst="rect">
+            <a:avLst/>
+          </a:prstGeom>
+        </p:spPr>
+      </p:pic>
     </p:spTree>
     <p:extLst>
       <p:ext uri="{BB962C8B-B14F-4D97-AF65-F5344CB8AC3E}">
-        <p14:creationId xmlns:p14="http://schemas.microsoft.com/office/powerpoint/2010/main" val="741915424"/>
+        <p14:creationId xmlns:p14="http://schemas.microsoft.com/office/powerpoint/2010/main" val="3786865099"/>
       </p:ext>
     </p:extLst>
   </p:cSld>
@@ -13504,56 +13911,1371 @@
           <a:chExt cx="0" cy="0"/>
         </a:xfrm>
       </p:grpSpPr>
-      <p:sp>
-        <p:nvSpPr>
-          <p:cNvPr id="2" name="Title 1">
-            <a:extLst>
-              <a:ext uri="{FF2B5EF4-FFF2-40B4-BE49-F238E27FC236}">
-                <a16:creationId xmlns:a16="http://schemas.microsoft.com/office/drawing/2014/main" id="{5AD0D970-3C2C-8DCE-AA5D-8C073AAD9872}"/>
-              </a:ext>
-            </a:extLst>
-          </p:cNvPr>
-          <p:cNvSpPr>
-            <a:spLocks noGrp="1"/>
-          </p:cNvSpPr>
-          <p:nvPr>
-            <p:ph type="title"/>
-          </p:nvPr>
-        </p:nvSpPr>
-        <p:spPr/>
-        <p:txBody>
-          <a:bodyPr/>
-          <a:lstStyle/>
-          <a:p>
-            <a:endParaRPr lang="en-US"/>
-          </a:p>
-        </p:txBody>
-      </p:sp>
-      <p:sp>
-        <p:nvSpPr>
-          <p:cNvPr id="3" name="Content Placeholder 2">
-            <a:extLst>
-              <a:ext uri="{FF2B5EF4-FFF2-40B4-BE49-F238E27FC236}">
-                <a16:creationId xmlns:a16="http://schemas.microsoft.com/office/drawing/2014/main" id="{FF21E2A4-58BF-7341-4A22-FB5F3DA6A41C}"/>
-              </a:ext>
-            </a:extLst>
-          </p:cNvPr>
-          <p:cNvSpPr>
-            <a:spLocks noGrp="1"/>
-          </p:cNvSpPr>
+      <p:pic>
+        <p:nvPicPr>
+          <p:cNvPr id="6" name="Picture 5">
+            <a:extLst>
+              <a:ext uri="{FF2B5EF4-FFF2-40B4-BE49-F238E27FC236}">
+                <a16:creationId xmlns:a16="http://schemas.microsoft.com/office/drawing/2014/main" id="{C991D655-ED5A-7795-06E0-7DD9FF7A3A59}"/>
+              </a:ext>
+            </a:extLst>
+          </p:cNvPr>
+          <p:cNvPicPr>
+            <a:picLocks noChangeAspect="1"/>
+          </p:cNvPicPr>
+          <p:nvPr/>
+        </p:nvPicPr>
+        <p:blipFill>
+          <a:blip r:embed="rId2">
+            <a:extLst>
+              <a:ext uri="{28A0092B-C50C-407E-A947-70E740481C1C}">
+                <a14:useLocalDpi xmlns:a14="http://schemas.microsoft.com/office/drawing/2010/main" val="0"/>
+              </a:ext>
+            </a:extLst>
+          </a:blip>
+          <a:stretch>
+            <a:fillRect/>
+          </a:stretch>
+        </p:blipFill>
+        <p:spPr>
+          <a:xfrm>
+            <a:off x="11080421" y="347172"/>
+            <a:ext cx="769180" cy="618855"/>
+          </a:xfrm>
+          <a:prstGeom prst="rect">
+            <a:avLst/>
+          </a:prstGeom>
+        </p:spPr>
+      </p:pic>
+      <p:pic>
+        <p:nvPicPr>
+          <p:cNvPr id="7" name="Picture 2" descr="What is JavaScript?">
+            <a:extLst>
+              <a:ext uri="{FF2B5EF4-FFF2-40B4-BE49-F238E27FC236}">
+                <a16:creationId xmlns:a16="http://schemas.microsoft.com/office/drawing/2014/main" id="{B64EECA8-23E8-0BF4-B73B-A560CBD8CFA0}"/>
+              </a:ext>
+            </a:extLst>
+          </p:cNvPr>
+          <p:cNvPicPr>
+            <a:picLocks noGrp="1" noChangeAspect="1" noChangeArrowheads="1"/>
+          </p:cNvPicPr>
           <p:nvPr>
             <p:ph idx="1"/>
           </p:nvPr>
-        </p:nvSpPr>
-        <p:spPr/>
-        <p:txBody>
-          <a:bodyPr/>
-          <a:lstStyle/>
-          <a:p>
-            <a:endParaRPr lang="en-US"/>
-          </a:p>
-        </p:txBody>
-      </p:sp>
+        </p:nvPicPr>
+        <p:blipFill>
+          <a:blip r:embed="rId3">
+            <a:extLst>
+              <a:ext uri="{28A0092B-C50C-407E-A947-70E740481C1C}">
+                <a14:useLocalDpi xmlns:a14="http://schemas.microsoft.com/office/drawing/2010/main" val="0"/>
+              </a:ext>
+            </a:extLst>
+          </a:blip>
+          <a:srcRect/>
+          <a:stretch>
+            <a:fillRect/>
+          </a:stretch>
+        </p:blipFill>
+        <p:spPr bwMode="auto">
+          <a:xfrm>
+            <a:off x="10991974" y="5653201"/>
+            <a:ext cx="857627" cy="857627"/>
+          </a:xfrm>
+          <a:prstGeom prst="rect">
+            <a:avLst/>
+          </a:prstGeom>
+          <a:noFill/>
+          <a:extLst>
+            <a:ext uri="{909E8E84-426E-40DD-AFC4-6F175D3DCCD1}">
+              <a14:hiddenFill xmlns:a14="http://schemas.microsoft.com/office/drawing/2010/main">
+                <a:solidFill>
+                  <a:srgbClr val="FFFFFF"/>
+                </a:solidFill>
+              </a14:hiddenFill>
+            </a:ext>
+          </a:extLst>
+        </p:spPr>
+      </p:pic>
+      <p:pic>
+        <p:nvPicPr>
+          <p:cNvPr id="11" name="Picture 10">
+            <a:extLst>
+              <a:ext uri="{FF2B5EF4-FFF2-40B4-BE49-F238E27FC236}">
+                <a16:creationId xmlns:a16="http://schemas.microsoft.com/office/drawing/2014/main" id="{3DBC2BBA-8D27-6A7D-5886-6FB2CD3065E8}"/>
+              </a:ext>
+            </a:extLst>
+          </p:cNvPr>
+          <p:cNvPicPr>
+            <a:picLocks noChangeAspect="1"/>
+          </p:cNvPicPr>
+          <p:nvPr/>
+        </p:nvPicPr>
+        <p:blipFill>
+          <a:blip r:embed="rId4"/>
+          <a:stretch>
+            <a:fillRect/>
+          </a:stretch>
+        </p:blipFill>
+        <p:spPr>
+          <a:xfrm>
+            <a:off x="967674" y="848114"/>
+            <a:ext cx="10112747" cy="4805087"/>
+          </a:xfrm>
+          <a:prstGeom prst="rect">
+            <a:avLst/>
+          </a:prstGeom>
+        </p:spPr>
+      </p:pic>
+    </p:spTree>
+    <p:extLst>
+      <p:ext uri="{BB962C8B-B14F-4D97-AF65-F5344CB8AC3E}">
+        <p14:creationId xmlns:p14="http://schemas.microsoft.com/office/powerpoint/2010/main" val="3851956134"/>
+      </p:ext>
+    </p:extLst>
+  </p:cSld>
+  <p:clrMapOvr>
+    <a:masterClrMapping/>
+  </p:clrMapOvr>
+</p:sld>
+</file>
+
+<file path=ppt/slides/slide61.xml><?xml version="1.0" encoding="utf-8"?>
+<p:sld xmlns:a="http://schemas.openxmlformats.org/drawingml/2006/main" xmlns:r="http://schemas.openxmlformats.org/officeDocument/2006/relationships" xmlns:p="http://schemas.openxmlformats.org/presentationml/2006/main">
+  <p:cSld>
+    <p:spTree>
+      <p:nvGrpSpPr>
+        <p:cNvPr id="1" name=""/>
+        <p:cNvGrpSpPr/>
+        <p:nvPr/>
+      </p:nvGrpSpPr>
+      <p:grpSpPr>
+        <a:xfrm>
+          <a:off x="0" y="0"/>
+          <a:ext cx="0" cy="0"/>
+          <a:chOff x="0" y="0"/>
+          <a:chExt cx="0" cy="0"/>
+        </a:xfrm>
+      </p:grpSpPr>
+      <p:pic>
+        <p:nvPicPr>
+          <p:cNvPr id="6" name="Picture 5">
+            <a:extLst>
+              <a:ext uri="{FF2B5EF4-FFF2-40B4-BE49-F238E27FC236}">
+                <a16:creationId xmlns:a16="http://schemas.microsoft.com/office/drawing/2014/main" id="{C991D655-ED5A-7795-06E0-7DD9FF7A3A59}"/>
+              </a:ext>
+            </a:extLst>
+          </p:cNvPr>
+          <p:cNvPicPr>
+            <a:picLocks noChangeAspect="1"/>
+          </p:cNvPicPr>
+          <p:nvPr/>
+        </p:nvPicPr>
+        <p:blipFill>
+          <a:blip r:embed="rId2">
+            <a:extLst>
+              <a:ext uri="{28A0092B-C50C-407E-A947-70E740481C1C}">
+                <a14:useLocalDpi xmlns:a14="http://schemas.microsoft.com/office/drawing/2010/main" val="0"/>
+              </a:ext>
+            </a:extLst>
+          </a:blip>
+          <a:stretch>
+            <a:fillRect/>
+          </a:stretch>
+        </p:blipFill>
+        <p:spPr>
+          <a:xfrm>
+            <a:off x="11080421" y="347172"/>
+            <a:ext cx="769180" cy="618855"/>
+          </a:xfrm>
+          <a:prstGeom prst="rect">
+            <a:avLst/>
+          </a:prstGeom>
+        </p:spPr>
+      </p:pic>
+      <p:pic>
+        <p:nvPicPr>
+          <p:cNvPr id="7" name="Picture 2" descr="What is JavaScript?">
+            <a:extLst>
+              <a:ext uri="{FF2B5EF4-FFF2-40B4-BE49-F238E27FC236}">
+                <a16:creationId xmlns:a16="http://schemas.microsoft.com/office/drawing/2014/main" id="{B64EECA8-23E8-0BF4-B73B-A560CBD8CFA0}"/>
+              </a:ext>
+            </a:extLst>
+          </p:cNvPr>
+          <p:cNvPicPr>
+            <a:picLocks noGrp="1" noChangeAspect="1" noChangeArrowheads="1"/>
+          </p:cNvPicPr>
+          <p:nvPr>
+            <p:ph idx="1"/>
+          </p:nvPr>
+        </p:nvPicPr>
+        <p:blipFill>
+          <a:blip r:embed="rId3">
+            <a:extLst>
+              <a:ext uri="{28A0092B-C50C-407E-A947-70E740481C1C}">
+                <a14:useLocalDpi xmlns:a14="http://schemas.microsoft.com/office/drawing/2010/main" val="0"/>
+              </a:ext>
+            </a:extLst>
+          </a:blip>
+          <a:srcRect/>
+          <a:stretch>
+            <a:fillRect/>
+          </a:stretch>
+        </p:blipFill>
+        <p:spPr bwMode="auto">
+          <a:xfrm>
+            <a:off x="10991974" y="5653201"/>
+            <a:ext cx="857627" cy="857627"/>
+          </a:xfrm>
+          <a:prstGeom prst="rect">
+            <a:avLst/>
+          </a:prstGeom>
+          <a:noFill/>
+          <a:extLst>
+            <a:ext uri="{909E8E84-426E-40DD-AFC4-6F175D3DCCD1}">
+              <a14:hiddenFill xmlns:a14="http://schemas.microsoft.com/office/drawing/2010/main">
+                <a:solidFill>
+                  <a:srgbClr val="FFFFFF"/>
+                </a:solidFill>
+              </a14:hiddenFill>
+            </a:ext>
+          </a:extLst>
+        </p:spPr>
+      </p:pic>
+      <p:pic>
+        <p:nvPicPr>
+          <p:cNvPr id="2" name="Picture 1">
+            <a:extLst>
+              <a:ext uri="{FF2B5EF4-FFF2-40B4-BE49-F238E27FC236}">
+                <a16:creationId xmlns:a16="http://schemas.microsoft.com/office/drawing/2014/main" id="{DFFFE899-F8FF-8711-8C65-73D1030FD34C}"/>
+              </a:ext>
+            </a:extLst>
+          </p:cNvPr>
+          <p:cNvPicPr>
+            <a:picLocks noChangeAspect="1"/>
+          </p:cNvPicPr>
+          <p:nvPr/>
+        </p:nvPicPr>
+        <p:blipFill>
+          <a:blip r:embed="rId4"/>
+          <a:stretch>
+            <a:fillRect/>
+          </a:stretch>
+        </p:blipFill>
+        <p:spPr>
+          <a:xfrm>
+            <a:off x="759425" y="966027"/>
+            <a:ext cx="8572500" cy="2066925"/>
+          </a:xfrm>
+          <a:prstGeom prst="rect">
+            <a:avLst/>
+          </a:prstGeom>
+        </p:spPr>
+      </p:pic>
+      <p:pic>
+        <p:nvPicPr>
+          <p:cNvPr id="3" name="Picture 2">
+            <a:extLst>
+              <a:ext uri="{FF2B5EF4-FFF2-40B4-BE49-F238E27FC236}">
+                <a16:creationId xmlns:a16="http://schemas.microsoft.com/office/drawing/2014/main" id="{6CC93001-C90D-AC01-16FC-5C1798A957A3}"/>
+              </a:ext>
+            </a:extLst>
+          </p:cNvPr>
+          <p:cNvPicPr>
+            <a:picLocks noChangeAspect="1"/>
+          </p:cNvPicPr>
+          <p:nvPr/>
+        </p:nvPicPr>
+        <p:blipFill>
+          <a:blip r:embed="rId5"/>
+          <a:stretch>
+            <a:fillRect/>
+          </a:stretch>
+        </p:blipFill>
+        <p:spPr>
+          <a:xfrm>
+            <a:off x="759425" y="3032952"/>
+            <a:ext cx="4821218" cy="2175948"/>
+          </a:xfrm>
+          <a:prstGeom prst="rect">
+            <a:avLst/>
+          </a:prstGeom>
+        </p:spPr>
+      </p:pic>
+      <p:pic>
+        <p:nvPicPr>
+          <p:cNvPr id="4" name="Picture 3">
+            <a:extLst>
+              <a:ext uri="{FF2B5EF4-FFF2-40B4-BE49-F238E27FC236}">
+                <a16:creationId xmlns:a16="http://schemas.microsoft.com/office/drawing/2014/main" id="{9A9E0434-6C9E-0BC6-4680-87972752C92C}"/>
+              </a:ext>
+            </a:extLst>
+          </p:cNvPr>
+          <p:cNvPicPr>
+            <a:picLocks noChangeAspect="1"/>
+          </p:cNvPicPr>
+          <p:nvPr/>
+        </p:nvPicPr>
+        <p:blipFill>
+          <a:blip r:embed="rId6"/>
+          <a:stretch>
+            <a:fillRect/>
+          </a:stretch>
+        </p:blipFill>
+        <p:spPr>
+          <a:xfrm>
+            <a:off x="5857875" y="3534330"/>
+            <a:ext cx="5222546" cy="1672785"/>
+          </a:xfrm>
+          <a:prstGeom prst="rect">
+            <a:avLst/>
+          </a:prstGeom>
+        </p:spPr>
+      </p:pic>
+    </p:spTree>
+    <p:extLst>
+      <p:ext uri="{BB962C8B-B14F-4D97-AF65-F5344CB8AC3E}">
+        <p14:creationId xmlns:p14="http://schemas.microsoft.com/office/powerpoint/2010/main" val="3493421691"/>
+      </p:ext>
+    </p:extLst>
+  </p:cSld>
+  <p:clrMapOvr>
+    <a:masterClrMapping/>
+  </p:clrMapOvr>
+</p:sld>
+</file>
+
+<file path=ppt/slides/slide62.xml><?xml version="1.0" encoding="utf-8"?>
+<p:sld xmlns:a="http://schemas.openxmlformats.org/drawingml/2006/main" xmlns:r="http://schemas.openxmlformats.org/officeDocument/2006/relationships" xmlns:p="http://schemas.openxmlformats.org/presentationml/2006/main">
+  <p:cSld>
+    <p:spTree>
+      <p:nvGrpSpPr>
+        <p:cNvPr id="1" name=""/>
+        <p:cNvGrpSpPr/>
+        <p:nvPr/>
+      </p:nvGrpSpPr>
+      <p:grpSpPr>
+        <a:xfrm>
+          <a:off x="0" y="0"/>
+          <a:ext cx="0" cy="0"/>
+          <a:chOff x="0" y="0"/>
+          <a:chExt cx="0" cy="0"/>
+        </a:xfrm>
+      </p:grpSpPr>
+      <p:pic>
+        <p:nvPicPr>
+          <p:cNvPr id="6" name="Picture 5">
+            <a:extLst>
+              <a:ext uri="{FF2B5EF4-FFF2-40B4-BE49-F238E27FC236}">
+                <a16:creationId xmlns:a16="http://schemas.microsoft.com/office/drawing/2014/main" id="{C991D655-ED5A-7795-06E0-7DD9FF7A3A59}"/>
+              </a:ext>
+            </a:extLst>
+          </p:cNvPr>
+          <p:cNvPicPr>
+            <a:picLocks noChangeAspect="1"/>
+          </p:cNvPicPr>
+          <p:nvPr/>
+        </p:nvPicPr>
+        <p:blipFill>
+          <a:blip r:embed="rId2">
+            <a:extLst>
+              <a:ext uri="{28A0092B-C50C-407E-A947-70E740481C1C}">
+                <a14:useLocalDpi xmlns:a14="http://schemas.microsoft.com/office/drawing/2010/main" val="0"/>
+              </a:ext>
+            </a:extLst>
+          </a:blip>
+          <a:stretch>
+            <a:fillRect/>
+          </a:stretch>
+        </p:blipFill>
+        <p:spPr>
+          <a:xfrm>
+            <a:off x="11080421" y="347172"/>
+            <a:ext cx="769180" cy="618855"/>
+          </a:xfrm>
+          <a:prstGeom prst="rect">
+            <a:avLst/>
+          </a:prstGeom>
+        </p:spPr>
+      </p:pic>
+      <p:pic>
+        <p:nvPicPr>
+          <p:cNvPr id="7" name="Picture 2" descr="What is JavaScript?">
+            <a:extLst>
+              <a:ext uri="{FF2B5EF4-FFF2-40B4-BE49-F238E27FC236}">
+                <a16:creationId xmlns:a16="http://schemas.microsoft.com/office/drawing/2014/main" id="{B64EECA8-23E8-0BF4-B73B-A560CBD8CFA0}"/>
+              </a:ext>
+            </a:extLst>
+          </p:cNvPr>
+          <p:cNvPicPr>
+            <a:picLocks noGrp="1" noChangeAspect="1" noChangeArrowheads="1"/>
+          </p:cNvPicPr>
+          <p:nvPr>
+            <p:ph idx="1"/>
+          </p:nvPr>
+        </p:nvPicPr>
+        <p:blipFill>
+          <a:blip r:embed="rId3">
+            <a:extLst>
+              <a:ext uri="{28A0092B-C50C-407E-A947-70E740481C1C}">
+                <a14:useLocalDpi xmlns:a14="http://schemas.microsoft.com/office/drawing/2010/main" val="0"/>
+              </a:ext>
+            </a:extLst>
+          </a:blip>
+          <a:srcRect/>
+          <a:stretch>
+            <a:fillRect/>
+          </a:stretch>
+        </p:blipFill>
+        <p:spPr bwMode="auto">
+          <a:xfrm>
+            <a:off x="10991974" y="5653201"/>
+            <a:ext cx="857627" cy="857627"/>
+          </a:xfrm>
+          <a:prstGeom prst="rect">
+            <a:avLst/>
+          </a:prstGeom>
+          <a:noFill/>
+          <a:extLst>
+            <a:ext uri="{909E8E84-426E-40DD-AFC4-6F175D3DCCD1}">
+              <a14:hiddenFill xmlns:a14="http://schemas.microsoft.com/office/drawing/2010/main">
+                <a:solidFill>
+                  <a:srgbClr val="FFFFFF"/>
+                </a:solidFill>
+              </a14:hiddenFill>
+            </a:ext>
+          </a:extLst>
+        </p:spPr>
+      </p:pic>
+      <p:pic>
+        <p:nvPicPr>
+          <p:cNvPr id="3" name="Picture 2">
+            <a:extLst>
+              <a:ext uri="{FF2B5EF4-FFF2-40B4-BE49-F238E27FC236}">
+                <a16:creationId xmlns:a16="http://schemas.microsoft.com/office/drawing/2014/main" id="{8D32C12E-63A7-3905-72F8-F25ADA511CAC}"/>
+              </a:ext>
+            </a:extLst>
+          </p:cNvPr>
+          <p:cNvPicPr>
+            <a:picLocks noChangeAspect="1"/>
+          </p:cNvPicPr>
+          <p:nvPr/>
+        </p:nvPicPr>
+        <p:blipFill>
+          <a:blip r:embed="rId4"/>
+          <a:stretch>
+            <a:fillRect/>
+          </a:stretch>
+        </p:blipFill>
+        <p:spPr>
+          <a:xfrm>
+            <a:off x="816576" y="419100"/>
+            <a:ext cx="7543800" cy="3009900"/>
+          </a:xfrm>
+          <a:prstGeom prst="rect">
+            <a:avLst/>
+          </a:prstGeom>
+        </p:spPr>
+      </p:pic>
+      <p:pic>
+        <p:nvPicPr>
+          <p:cNvPr id="5" name="Picture 4">
+            <a:extLst>
+              <a:ext uri="{FF2B5EF4-FFF2-40B4-BE49-F238E27FC236}">
+                <a16:creationId xmlns:a16="http://schemas.microsoft.com/office/drawing/2014/main" id="{2D2C6210-A1BA-EA31-B461-959E0DF82E18}"/>
+              </a:ext>
+            </a:extLst>
+          </p:cNvPr>
+          <p:cNvPicPr>
+            <a:picLocks noChangeAspect="1"/>
+          </p:cNvPicPr>
+          <p:nvPr/>
+        </p:nvPicPr>
+        <p:blipFill>
+          <a:blip r:embed="rId5"/>
+          <a:stretch>
+            <a:fillRect/>
+          </a:stretch>
+        </p:blipFill>
+        <p:spPr>
+          <a:xfrm>
+            <a:off x="730851" y="3429000"/>
+            <a:ext cx="7715250" cy="3238500"/>
+          </a:xfrm>
+          <a:prstGeom prst="rect">
+            <a:avLst/>
+          </a:prstGeom>
+        </p:spPr>
+      </p:pic>
+    </p:spTree>
+    <p:extLst>
+      <p:ext uri="{BB962C8B-B14F-4D97-AF65-F5344CB8AC3E}">
+        <p14:creationId xmlns:p14="http://schemas.microsoft.com/office/powerpoint/2010/main" val="1586834978"/>
+      </p:ext>
+    </p:extLst>
+  </p:cSld>
+  <p:clrMapOvr>
+    <a:masterClrMapping/>
+  </p:clrMapOvr>
+</p:sld>
+</file>
+
+<file path=ppt/slides/slide63.xml><?xml version="1.0" encoding="utf-8"?>
+<p:sld xmlns:a="http://schemas.openxmlformats.org/drawingml/2006/main" xmlns:r="http://schemas.openxmlformats.org/officeDocument/2006/relationships" xmlns:p="http://schemas.openxmlformats.org/presentationml/2006/main">
+  <p:cSld>
+    <p:spTree>
+      <p:nvGrpSpPr>
+        <p:cNvPr id="1" name=""/>
+        <p:cNvGrpSpPr/>
+        <p:nvPr/>
+      </p:nvGrpSpPr>
+      <p:grpSpPr>
+        <a:xfrm>
+          <a:off x="0" y="0"/>
+          <a:ext cx="0" cy="0"/>
+          <a:chOff x="0" y="0"/>
+          <a:chExt cx="0" cy="0"/>
+        </a:xfrm>
+      </p:grpSpPr>
+      <p:pic>
+        <p:nvPicPr>
+          <p:cNvPr id="6" name="Picture 5">
+            <a:extLst>
+              <a:ext uri="{FF2B5EF4-FFF2-40B4-BE49-F238E27FC236}">
+                <a16:creationId xmlns:a16="http://schemas.microsoft.com/office/drawing/2014/main" id="{C991D655-ED5A-7795-06E0-7DD9FF7A3A59}"/>
+              </a:ext>
+            </a:extLst>
+          </p:cNvPr>
+          <p:cNvPicPr>
+            <a:picLocks noChangeAspect="1"/>
+          </p:cNvPicPr>
+          <p:nvPr/>
+        </p:nvPicPr>
+        <p:blipFill>
+          <a:blip r:embed="rId2">
+            <a:extLst>
+              <a:ext uri="{28A0092B-C50C-407E-A947-70E740481C1C}">
+                <a14:useLocalDpi xmlns:a14="http://schemas.microsoft.com/office/drawing/2010/main" val="0"/>
+              </a:ext>
+            </a:extLst>
+          </a:blip>
+          <a:stretch>
+            <a:fillRect/>
+          </a:stretch>
+        </p:blipFill>
+        <p:spPr>
+          <a:xfrm>
+            <a:off x="11080421" y="347172"/>
+            <a:ext cx="769180" cy="618855"/>
+          </a:xfrm>
+          <a:prstGeom prst="rect">
+            <a:avLst/>
+          </a:prstGeom>
+        </p:spPr>
+      </p:pic>
+      <p:pic>
+        <p:nvPicPr>
+          <p:cNvPr id="7" name="Picture 2" descr="What is JavaScript?">
+            <a:extLst>
+              <a:ext uri="{FF2B5EF4-FFF2-40B4-BE49-F238E27FC236}">
+                <a16:creationId xmlns:a16="http://schemas.microsoft.com/office/drawing/2014/main" id="{B64EECA8-23E8-0BF4-B73B-A560CBD8CFA0}"/>
+              </a:ext>
+            </a:extLst>
+          </p:cNvPr>
+          <p:cNvPicPr>
+            <a:picLocks noGrp="1" noChangeAspect="1" noChangeArrowheads="1"/>
+          </p:cNvPicPr>
+          <p:nvPr>
+            <p:ph idx="1"/>
+          </p:nvPr>
+        </p:nvPicPr>
+        <p:blipFill>
+          <a:blip r:embed="rId3">
+            <a:extLst>
+              <a:ext uri="{28A0092B-C50C-407E-A947-70E740481C1C}">
+                <a14:useLocalDpi xmlns:a14="http://schemas.microsoft.com/office/drawing/2010/main" val="0"/>
+              </a:ext>
+            </a:extLst>
+          </a:blip>
+          <a:srcRect/>
+          <a:stretch>
+            <a:fillRect/>
+          </a:stretch>
+        </p:blipFill>
+        <p:spPr bwMode="auto">
+          <a:xfrm>
+            <a:off x="10991974" y="5653201"/>
+            <a:ext cx="857627" cy="857627"/>
+          </a:xfrm>
+          <a:prstGeom prst="rect">
+            <a:avLst/>
+          </a:prstGeom>
+          <a:noFill/>
+          <a:extLst>
+            <a:ext uri="{909E8E84-426E-40DD-AFC4-6F175D3DCCD1}">
+              <a14:hiddenFill xmlns:a14="http://schemas.microsoft.com/office/drawing/2010/main">
+                <a:solidFill>
+                  <a:srgbClr val="FFFFFF"/>
+                </a:solidFill>
+              </a14:hiddenFill>
+            </a:ext>
+          </a:extLst>
+        </p:spPr>
+      </p:pic>
+      <p:pic>
+        <p:nvPicPr>
+          <p:cNvPr id="3" name="Picture 2">
+            <a:extLst>
+              <a:ext uri="{FF2B5EF4-FFF2-40B4-BE49-F238E27FC236}">
+                <a16:creationId xmlns:a16="http://schemas.microsoft.com/office/drawing/2014/main" id="{4751D920-8701-7B7A-A601-31AB1187DA1C}"/>
+              </a:ext>
+            </a:extLst>
+          </p:cNvPr>
+          <p:cNvPicPr>
+            <a:picLocks noChangeAspect="1"/>
+          </p:cNvPicPr>
+          <p:nvPr/>
+        </p:nvPicPr>
+        <p:blipFill>
+          <a:blip r:embed="rId4"/>
+          <a:stretch>
+            <a:fillRect/>
+          </a:stretch>
+        </p:blipFill>
+        <p:spPr>
+          <a:xfrm>
+            <a:off x="1578318" y="1603418"/>
+            <a:ext cx="8096250" cy="3305175"/>
+          </a:xfrm>
+          <a:prstGeom prst="rect">
+            <a:avLst/>
+          </a:prstGeom>
+        </p:spPr>
+      </p:pic>
+    </p:spTree>
+    <p:extLst>
+      <p:ext uri="{BB962C8B-B14F-4D97-AF65-F5344CB8AC3E}">
+        <p14:creationId xmlns:p14="http://schemas.microsoft.com/office/powerpoint/2010/main" val="4187458617"/>
+      </p:ext>
+    </p:extLst>
+  </p:cSld>
+  <p:clrMapOvr>
+    <a:masterClrMapping/>
+  </p:clrMapOvr>
+</p:sld>
+</file>
+
+<file path=ppt/slides/slide64.xml><?xml version="1.0" encoding="utf-8"?>
+<p:sld xmlns:a="http://schemas.openxmlformats.org/drawingml/2006/main" xmlns:r="http://schemas.openxmlformats.org/officeDocument/2006/relationships" xmlns:p="http://schemas.openxmlformats.org/presentationml/2006/main">
+  <p:cSld>
+    <p:spTree>
+      <p:nvGrpSpPr>
+        <p:cNvPr id="1" name=""/>
+        <p:cNvGrpSpPr/>
+        <p:nvPr/>
+      </p:nvGrpSpPr>
+      <p:grpSpPr>
+        <a:xfrm>
+          <a:off x="0" y="0"/>
+          <a:ext cx="0" cy="0"/>
+          <a:chOff x="0" y="0"/>
+          <a:chExt cx="0" cy="0"/>
+        </a:xfrm>
+      </p:grpSpPr>
+      <p:pic>
+        <p:nvPicPr>
+          <p:cNvPr id="6" name="Picture 5">
+            <a:extLst>
+              <a:ext uri="{FF2B5EF4-FFF2-40B4-BE49-F238E27FC236}">
+                <a16:creationId xmlns:a16="http://schemas.microsoft.com/office/drawing/2014/main" id="{C991D655-ED5A-7795-06E0-7DD9FF7A3A59}"/>
+              </a:ext>
+            </a:extLst>
+          </p:cNvPr>
+          <p:cNvPicPr>
+            <a:picLocks noChangeAspect="1"/>
+          </p:cNvPicPr>
+          <p:nvPr/>
+        </p:nvPicPr>
+        <p:blipFill>
+          <a:blip r:embed="rId2">
+            <a:extLst>
+              <a:ext uri="{28A0092B-C50C-407E-A947-70E740481C1C}">
+                <a14:useLocalDpi xmlns:a14="http://schemas.microsoft.com/office/drawing/2010/main" val="0"/>
+              </a:ext>
+            </a:extLst>
+          </a:blip>
+          <a:stretch>
+            <a:fillRect/>
+          </a:stretch>
+        </p:blipFill>
+        <p:spPr>
+          <a:xfrm>
+            <a:off x="11080421" y="347172"/>
+            <a:ext cx="769180" cy="618855"/>
+          </a:xfrm>
+          <a:prstGeom prst="rect">
+            <a:avLst/>
+          </a:prstGeom>
+        </p:spPr>
+      </p:pic>
+      <p:pic>
+        <p:nvPicPr>
+          <p:cNvPr id="7" name="Picture 2" descr="What is JavaScript?">
+            <a:extLst>
+              <a:ext uri="{FF2B5EF4-FFF2-40B4-BE49-F238E27FC236}">
+                <a16:creationId xmlns:a16="http://schemas.microsoft.com/office/drawing/2014/main" id="{B64EECA8-23E8-0BF4-B73B-A560CBD8CFA0}"/>
+              </a:ext>
+            </a:extLst>
+          </p:cNvPr>
+          <p:cNvPicPr>
+            <a:picLocks noGrp="1" noChangeAspect="1" noChangeArrowheads="1"/>
+          </p:cNvPicPr>
+          <p:nvPr>
+            <p:ph idx="1"/>
+          </p:nvPr>
+        </p:nvPicPr>
+        <p:blipFill>
+          <a:blip r:embed="rId3">
+            <a:extLst>
+              <a:ext uri="{28A0092B-C50C-407E-A947-70E740481C1C}">
+                <a14:useLocalDpi xmlns:a14="http://schemas.microsoft.com/office/drawing/2010/main" val="0"/>
+              </a:ext>
+            </a:extLst>
+          </a:blip>
+          <a:srcRect/>
+          <a:stretch>
+            <a:fillRect/>
+          </a:stretch>
+        </p:blipFill>
+        <p:spPr bwMode="auto">
+          <a:xfrm>
+            <a:off x="10991974" y="5653201"/>
+            <a:ext cx="857627" cy="857627"/>
+          </a:xfrm>
+          <a:prstGeom prst="rect">
+            <a:avLst/>
+          </a:prstGeom>
+          <a:noFill/>
+          <a:extLst>
+            <a:ext uri="{909E8E84-426E-40DD-AFC4-6F175D3DCCD1}">
+              <a14:hiddenFill xmlns:a14="http://schemas.microsoft.com/office/drawing/2010/main">
+                <a:solidFill>
+                  <a:srgbClr val="FFFFFF"/>
+                </a:solidFill>
+              </a14:hiddenFill>
+            </a:ext>
+          </a:extLst>
+        </p:spPr>
+      </p:pic>
+      <p:pic>
+        <p:nvPicPr>
+          <p:cNvPr id="2" name="Picture 1">
+            <a:extLst>
+              <a:ext uri="{FF2B5EF4-FFF2-40B4-BE49-F238E27FC236}">
+                <a16:creationId xmlns:a16="http://schemas.microsoft.com/office/drawing/2014/main" id="{03EDDFAE-B052-8376-96B2-7F89B80F63DD}"/>
+              </a:ext>
+            </a:extLst>
+          </p:cNvPr>
+          <p:cNvPicPr>
+            <a:picLocks noChangeAspect="1"/>
+          </p:cNvPicPr>
+          <p:nvPr/>
+        </p:nvPicPr>
+        <p:blipFill>
+          <a:blip r:embed="rId4"/>
+          <a:stretch>
+            <a:fillRect/>
+          </a:stretch>
+        </p:blipFill>
+        <p:spPr>
+          <a:xfrm>
+            <a:off x="1829443" y="1576387"/>
+            <a:ext cx="7915275" cy="3705225"/>
+          </a:xfrm>
+          <a:prstGeom prst="rect">
+            <a:avLst/>
+          </a:prstGeom>
+        </p:spPr>
+      </p:pic>
+    </p:spTree>
+    <p:extLst>
+      <p:ext uri="{BB962C8B-B14F-4D97-AF65-F5344CB8AC3E}">
+        <p14:creationId xmlns:p14="http://schemas.microsoft.com/office/powerpoint/2010/main" val="711966325"/>
+      </p:ext>
+    </p:extLst>
+  </p:cSld>
+  <p:clrMapOvr>
+    <a:masterClrMapping/>
+  </p:clrMapOvr>
+</p:sld>
+</file>
+
+<file path=ppt/slides/slide65.xml><?xml version="1.0" encoding="utf-8"?>
+<p:sld xmlns:a="http://schemas.openxmlformats.org/drawingml/2006/main" xmlns:r="http://schemas.openxmlformats.org/officeDocument/2006/relationships" xmlns:p="http://schemas.openxmlformats.org/presentationml/2006/main">
+  <p:cSld>
+    <p:spTree>
+      <p:nvGrpSpPr>
+        <p:cNvPr id="1" name=""/>
+        <p:cNvGrpSpPr/>
+        <p:nvPr/>
+      </p:nvGrpSpPr>
+      <p:grpSpPr>
+        <a:xfrm>
+          <a:off x="0" y="0"/>
+          <a:ext cx="0" cy="0"/>
+          <a:chOff x="0" y="0"/>
+          <a:chExt cx="0" cy="0"/>
+        </a:xfrm>
+      </p:grpSpPr>
+      <p:pic>
+        <p:nvPicPr>
+          <p:cNvPr id="6" name="Picture 5">
+            <a:extLst>
+              <a:ext uri="{FF2B5EF4-FFF2-40B4-BE49-F238E27FC236}">
+                <a16:creationId xmlns:a16="http://schemas.microsoft.com/office/drawing/2014/main" id="{C991D655-ED5A-7795-06E0-7DD9FF7A3A59}"/>
+              </a:ext>
+            </a:extLst>
+          </p:cNvPr>
+          <p:cNvPicPr>
+            <a:picLocks noChangeAspect="1"/>
+          </p:cNvPicPr>
+          <p:nvPr/>
+        </p:nvPicPr>
+        <p:blipFill>
+          <a:blip r:embed="rId2">
+            <a:extLst>
+              <a:ext uri="{28A0092B-C50C-407E-A947-70E740481C1C}">
+                <a14:useLocalDpi xmlns:a14="http://schemas.microsoft.com/office/drawing/2010/main" val="0"/>
+              </a:ext>
+            </a:extLst>
+          </a:blip>
+          <a:stretch>
+            <a:fillRect/>
+          </a:stretch>
+        </p:blipFill>
+        <p:spPr>
+          <a:xfrm>
+            <a:off x="11080421" y="347172"/>
+            <a:ext cx="769180" cy="618855"/>
+          </a:xfrm>
+          <a:prstGeom prst="rect">
+            <a:avLst/>
+          </a:prstGeom>
+        </p:spPr>
+      </p:pic>
+      <p:pic>
+        <p:nvPicPr>
+          <p:cNvPr id="7" name="Picture 2" descr="What is JavaScript?">
+            <a:extLst>
+              <a:ext uri="{FF2B5EF4-FFF2-40B4-BE49-F238E27FC236}">
+                <a16:creationId xmlns:a16="http://schemas.microsoft.com/office/drawing/2014/main" id="{B64EECA8-23E8-0BF4-B73B-A560CBD8CFA0}"/>
+              </a:ext>
+            </a:extLst>
+          </p:cNvPr>
+          <p:cNvPicPr>
+            <a:picLocks noGrp="1" noChangeAspect="1" noChangeArrowheads="1"/>
+          </p:cNvPicPr>
+          <p:nvPr>
+            <p:ph idx="1"/>
+          </p:nvPr>
+        </p:nvPicPr>
+        <p:blipFill>
+          <a:blip r:embed="rId3">
+            <a:extLst>
+              <a:ext uri="{28A0092B-C50C-407E-A947-70E740481C1C}">
+                <a14:useLocalDpi xmlns:a14="http://schemas.microsoft.com/office/drawing/2010/main" val="0"/>
+              </a:ext>
+            </a:extLst>
+          </a:blip>
+          <a:srcRect/>
+          <a:stretch>
+            <a:fillRect/>
+          </a:stretch>
+        </p:blipFill>
+        <p:spPr bwMode="auto">
+          <a:xfrm>
+            <a:off x="10991974" y="5653201"/>
+            <a:ext cx="857627" cy="857627"/>
+          </a:xfrm>
+          <a:prstGeom prst="rect">
+            <a:avLst/>
+          </a:prstGeom>
+          <a:noFill/>
+          <a:extLst>
+            <a:ext uri="{909E8E84-426E-40DD-AFC4-6F175D3DCCD1}">
+              <a14:hiddenFill xmlns:a14="http://schemas.microsoft.com/office/drawing/2010/main">
+                <a:solidFill>
+                  <a:srgbClr val="FFFFFF"/>
+                </a:solidFill>
+              </a14:hiddenFill>
+            </a:ext>
+          </a:extLst>
+        </p:spPr>
+      </p:pic>
+      <p:pic>
+        <p:nvPicPr>
+          <p:cNvPr id="3" name="Picture 2">
+            <a:extLst>
+              <a:ext uri="{FF2B5EF4-FFF2-40B4-BE49-F238E27FC236}">
+                <a16:creationId xmlns:a16="http://schemas.microsoft.com/office/drawing/2014/main" id="{B2D1E05F-E5BC-4BB9-750A-CE20EDC95720}"/>
+              </a:ext>
+            </a:extLst>
+          </p:cNvPr>
+          <p:cNvPicPr>
+            <a:picLocks noChangeAspect="1"/>
+          </p:cNvPicPr>
+          <p:nvPr/>
+        </p:nvPicPr>
+        <p:blipFill>
+          <a:blip r:embed="rId4"/>
+          <a:stretch>
+            <a:fillRect/>
+          </a:stretch>
+        </p:blipFill>
+        <p:spPr>
+          <a:xfrm>
+            <a:off x="2041439" y="1299004"/>
+            <a:ext cx="7886700" cy="4457700"/>
+          </a:xfrm>
+          <a:prstGeom prst="rect">
+            <a:avLst/>
+          </a:prstGeom>
+        </p:spPr>
+      </p:pic>
+    </p:spTree>
+    <p:extLst>
+      <p:ext uri="{BB962C8B-B14F-4D97-AF65-F5344CB8AC3E}">
+        <p14:creationId xmlns:p14="http://schemas.microsoft.com/office/powerpoint/2010/main" val="2975624694"/>
+      </p:ext>
+    </p:extLst>
+  </p:cSld>
+  <p:clrMapOvr>
+    <a:masterClrMapping/>
+  </p:clrMapOvr>
+</p:sld>
+</file>
+
+<file path=ppt/slides/slide66.xml><?xml version="1.0" encoding="utf-8"?>
+<p:sld xmlns:a="http://schemas.openxmlformats.org/drawingml/2006/main" xmlns:r="http://schemas.openxmlformats.org/officeDocument/2006/relationships" xmlns:p="http://schemas.openxmlformats.org/presentationml/2006/main">
+  <p:cSld>
+    <p:spTree>
+      <p:nvGrpSpPr>
+        <p:cNvPr id="1" name=""/>
+        <p:cNvGrpSpPr/>
+        <p:nvPr/>
+      </p:nvGrpSpPr>
+      <p:grpSpPr>
+        <a:xfrm>
+          <a:off x="0" y="0"/>
+          <a:ext cx="0" cy="0"/>
+          <a:chOff x="0" y="0"/>
+          <a:chExt cx="0" cy="0"/>
+        </a:xfrm>
+      </p:grpSpPr>
+      <p:pic>
+        <p:nvPicPr>
+          <p:cNvPr id="4" name="Picture 3">
+            <a:extLst>
+              <a:ext uri="{FF2B5EF4-FFF2-40B4-BE49-F238E27FC236}">
+                <a16:creationId xmlns:a16="http://schemas.microsoft.com/office/drawing/2014/main" id="{AE62B719-B914-D5F9-06B1-1A4B941ECE1D}"/>
+              </a:ext>
+            </a:extLst>
+          </p:cNvPr>
+          <p:cNvPicPr>
+            <a:picLocks noChangeAspect="1"/>
+          </p:cNvPicPr>
+          <p:nvPr/>
+        </p:nvPicPr>
+        <p:blipFill>
+          <a:blip r:embed="rId2">
+            <a:extLst>
+              <a:ext uri="{28A0092B-C50C-407E-A947-70E740481C1C}">
+                <a14:useLocalDpi xmlns:a14="http://schemas.microsoft.com/office/drawing/2010/main" val="0"/>
+              </a:ext>
+            </a:extLst>
+          </a:blip>
+          <a:stretch>
+            <a:fillRect/>
+          </a:stretch>
+        </p:blipFill>
+        <p:spPr>
+          <a:xfrm>
+            <a:off x="10969210" y="718478"/>
+            <a:ext cx="769180" cy="618855"/>
+          </a:xfrm>
+          <a:prstGeom prst="rect">
+            <a:avLst/>
+          </a:prstGeom>
+        </p:spPr>
+      </p:pic>
+      <p:pic>
+        <p:nvPicPr>
+          <p:cNvPr id="5" name="Picture 2" descr="What is JavaScript?">
+            <a:extLst>
+              <a:ext uri="{FF2B5EF4-FFF2-40B4-BE49-F238E27FC236}">
+                <a16:creationId xmlns:a16="http://schemas.microsoft.com/office/drawing/2014/main" id="{B5BA5B41-48BE-16AB-D8CF-0B3416882642}"/>
+              </a:ext>
+            </a:extLst>
+          </p:cNvPr>
+          <p:cNvPicPr>
+            <a:picLocks noGrp="1" noChangeAspect="1" noChangeArrowheads="1"/>
+          </p:cNvPicPr>
+          <p:nvPr>
+            <p:ph idx="1"/>
+          </p:nvPr>
+        </p:nvPicPr>
+        <p:blipFill>
+          <a:blip r:embed="rId3">
+            <a:extLst>
+              <a:ext uri="{28A0092B-C50C-407E-A947-70E740481C1C}">
+                <a14:useLocalDpi xmlns:a14="http://schemas.microsoft.com/office/drawing/2010/main" val="0"/>
+              </a:ext>
+            </a:extLst>
+          </a:blip>
+          <a:srcRect/>
+          <a:stretch>
+            <a:fillRect/>
+          </a:stretch>
+        </p:blipFill>
+        <p:spPr bwMode="auto">
+          <a:xfrm>
+            <a:off x="10763494" y="5653201"/>
+            <a:ext cx="857627" cy="857627"/>
+          </a:xfrm>
+          <a:prstGeom prst="rect">
+            <a:avLst/>
+          </a:prstGeom>
+          <a:noFill/>
+          <a:extLst>
+            <a:ext uri="{909E8E84-426E-40DD-AFC4-6F175D3DCCD1}">
+              <a14:hiddenFill xmlns:a14="http://schemas.microsoft.com/office/drawing/2010/main">
+                <a:solidFill>
+                  <a:srgbClr val="FFFFFF"/>
+                </a:solidFill>
+              </a14:hiddenFill>
+            </a:ext>
+          </a:extLst>
+        </p:spPr>
+      </p:pic>
+      <p:pic>
+        <p:nvPicPr>
+          <p:cNvPr id="7" name="Picture 6">
+            <a:extLst>
+              <a:ext uri="{FF2B5EF4-FFF2-40B4-BE49-F238E27FC236}">
+                <a16:creationId xmlns:a16="http://schemas.microsoft.com/office/drawing/2014/main" id="{528AA009-0787-028B-107E-5E831D8AF680}"/>
+              </a:ext>
+            </a:extLst>
+          </p:cNvPr>
+          <p:cNvPicPr>
+            <a:picLocks noChangeAspect="1"/>
+          </p:cNvPicPr>
+          <p:nvPr/>
+        </p:nvPicPr>
+        <p:blipFill>
+          <a:blip r:embed="rId4"/>
+          <a:stretch>
+            <a:fillRect/>
+          </a:stretch>
+        </p:blipFill>
+        <p:spPr>
+          <a:xfrm>
+            <a:off x="1605092" y="1337333"/>
+            <a:ext cx="7943850" cy="3571875"/>
+          </a:xfrm>
+          <a:prstGeom prst="rect">
+            <a:avLst/>
+          </a:prstGeom>
+        </p:spPr>
+      </p:pic>
+    </p:spTree>
+    <p:extLst>
+      <p:ext uri="{BB962C8B-B14F-4D97-AF65-F5344CB8AC3E}">
+        <p14:creationId xmlns:p14="http://schemas.microsoft.com/office/powerpoint/2010/main" val="1201286803"/>
+      </p:ext>
+    </p:extLst>
+  </p:cSld>
+  <p:clrMapOvr>
+    <a:masterClrMapping/>
+  </p:clrMapOvr>
+</p:sld>
+</file>
+
+<file path=ppt/slides/slide67.xml><?xml version="1.0" encoding="utf-8"?>
+<p:sld xmlns:a="http://schemas.openxmlformats.org/drawingml/2006/main" xmlns:r="http://schemas.openxmlformats.org/officeDocument/2006/relationships" xmlns:p="http://schemas.openxmlformats.org/presentationml/2006/main">
+  <p:cSld>
+    <p:spTree>
+      <p:nvGrpSpPr>
+        <p:cNvPr id="1" name=""/>
+        <p:cNvGrpSpPr/>
+        <p:nvPr/>
+      </p:nvGrpSpPr>
+      <p:grpSpPr>
+        <a:xfrm>
+          <a:off x="0" y="0"/>
+          <a:ext cx="0" cy="0"/>
+          <a:chOff x="0" y="0"/>
+          <a:chExt cx="0" cy="0"/>
+        </a:xfrm>
+      </p:grpSpPr>
+      <p:pic>
+        <p:nvPicPr>
+          <p:cNvPr id="4" name="Picture 3">
+            <a:extLst>
+              <a:ext uri="{FF2B5EF4-FFF2-40B4-BE49-F238E27FC236}">
+                <a16:creationId xmlns:a16="http://schemas.microsoft.com/office/drawing/2014/main" id="{E286D7D3-2217-12C7-BE70-7F4EB49A68D9}"/>
+              </a:ext>
+            </a:extLst>
+          </p:cNvPr>
+          <p:cNvPicPr>
+            <a:picLocks noChangeAspect="1"/>
+          </p:cNvPicPr>
+          <p:nvPr/>
+        </p:nvPicPr>
+        <p:blipFill>
+          <a:blip r:embed="rId2">
+            <a:extLst>
+              <a:ext uri="{28A0092B-C50C-407E-A947-70E740481C1C}">
+                <a14:useLocalDpi xmlns:a14="http://schemas.microsoft.com/office/drawing/2010/main" val="0"/>
+              </a:ext>
+            </a:extLst>
+          </a:blip>
+          <a:stretch>
+            <a:fillRect/>
+          </a:stretch>
+        </p:blipFill>
+        <p:spPr>
+          <a:xfrm>
+            <a:off x="10969210" y="718478"/>
+            <a:ext cx="769180" cy="618855"/>
+          </a:xfrm>
+          <a:prstGeom prst="rect">
+            <a:avLst/>
+          </a:prstGeom>
+        </p:spPr>
+      </p:pic>
+      <p:pic>
+        <p:nvPicPr>
+          <p:cNvPr id="5" name="Picture 2" descr="What is JavaScript?">
+            <a:extLst>
+              <a:ext uri="{FF2B5EF4-FFF2-40B4-BE49-F238E27FC236}">
+                <a16:creationId xmlns:a16="http://schemas.microsoft.com/office/drawing/2014/main" id="{8FECA726-4CED-3ED9-F69B-92A26C6B2B56}"/>
+              </a:ext>
+            </a:extLst>
+          </p:cNvPr>
+          <p:cNvPicPr>
+            <a:picLocks noGrp="1" noChangeAspect="1" noChangeArrowheads="1"/>
+          </p:cNvPicPr>
+          <p:nvPr>
+            <p:ph idx="1"/>
+          </p:nvPr>
+        </p:nvPicPr>
+        <p:blipFill>
+          <a:blip r:embed="rId3">
+            <a:extLst>
+              <a:ext uri="{28A0092B-C50C-407E-A947-70E740481C1C}">
+                <a14:useLocalDpi xmlns:a14="http://schemas.microsoft.com/office/drawing/2010/main" val="0"/>
+              </a:ext>
+            </a:extLst>
+          </a:blip>
+          <a:srcRect/>
+          <a:stretch>
+            <a:fillRect/>
+          </a:stretch>
+        </p:blipFill>
+        <p:spPr bwMode="auto">
+          <a:xfrm>
+            <a:off x="10763494" y="5653201"/>
+            <a:ext cx="857627" cy="857627"/>
+          </a:xfrm>
+          <a:prstGeom prst="rect">
+            <a:avLst/>
+          </a:prstGeom>
+          <a:noFill/>
+          <a:extLst>
+            <a:ext uri="{909E8E84-426E-40DD-AFC4-6F175D3DCCD1}">
+              <a14:hiddenFill xmlns:a14="http://schemas.microsoft.com/office/drawing/2010/main">
+                <a:solidFill>
+                  <a:srgbClr val="FFFFFF"/>
+                </a:solidFill>
+              </a14:hiddenFill>
+            </a:ext>
+          </a:extLst>
+        </p:spPr>
+      </p:pic>
+      <p:pic>
+        <p:nvPicPr>
+          <p:cNvPr id="7" name="Picture 6">
+            <a:extLst>
+              <a:ext uri="{FF2B5EF4-FFF2-40B4-BE49-F238E27FC236}">
+                <a16:creationId xmlns:a16="http://schemas.microsoft.com/office/drawing/2014/main" id="{CD4ECA9E-9FE1-8B50-9C41-3880A180CDA0}"/>
+              </a:ext>
+            </a:extLst>
+          </p:cNvPr>
+          <p:cNvPicPr>
+            <a:picLocks noChangeAspect="1"/>
+          </p:cNvPicPr>
+          <p:nvPr/>
+        </p:nvPicPr>
+        <p:blipFill>
+          <a:blip r:embed="rId4"/>
+          <a:stretch>
+            <a:fillRect/>
+          </a:stretch>
+        </p:blipFill>
+        <p:spPr>
+          <a:xfrm>
+            <a:off x="2162175" y="1857375"/>
+            <a:ext cx="7867650" cy="3143250"/>
+          </a:xfrm>
+          <a:prstGeom prst="rect">
+            <a:avLst/>
+          </a:prstGeom>
+        </p:spPr>
+      </p:pic>
+    </p:spTree>
+    <p:extLst>
+      <p:ext uri="{BB962C8B-B14F-4D97-AF65-F5344CB8AC3E}">
+        <p14:creationId xmlns:p14="http://schemas.microsoft.com/office/powerpoint/2010/main" val="741915424"/>
+      </p:ext>
+    </p:extLst>
+  </p:cSld>
+  <p:clrMapOvr>
+    <a:masterClrMapping/>
+  </p:clrMapOvr>
+</p:sld>
+</file>
+
+<file path=ppt/slides/slide68.xml><?xml version="1.0" encoding="utf-8"?>
+<p:sld xmlns:a="http://schemas.openxmlformats.org/drawingml/2006/main" xmlns:r="http://schemas.openxmlformats.org/officeDocument/2006/relationships" xmlns:p="http://schemas.openxmlformats.org/presentationml/2006/main">
+  <p:cSld>
+    <p:spTree>
+      <p:nvGrpSpPr>
+        <p:cNvPr id="1" name=""/>
+        <p:cNvGrpSpPr/>
+        <p:nvPr/>
+      </p:nvGrpSpPr>
+      <p:grpSpPr>
+        <a:xfrm>
+          <a:off x="0" y="0"/>
+          <a:ext cx="0" cy="0"/>
+          <a:chOff x="0" y="0"/>
+          <a:chExt cx="0" cy="0"/>
+        </a:xfrm>
+      </p:grpSpPr>
+      <p:pic>
+        <p:nvPicPr>
+          <p:cNvPr id="4" name="Picture 3">
+            <a:extLst>
+              <a:ext uri="{FF2B5EF4-FFF2-40B4-BE49-F238E27FC236}">
+                <a16:creationId xmlns:a16="http://schemas.microsoft.com/office/drawing/2014/main" id="{29FA6089-478F-34AB-F6D8-89E11E93BBBD}"/>
+              </a:ext>
+            </a:extLst>
+          </p:cNvPr>
+          <p:cNvPicPr>
+            <a:picLocks noChangeAspect="1"/>
+          </p:cNvPicPr>
+          <p:nvPr/>
+        </p:nvPicPr>
+        <p:blipFill>
+          <a:blip r:embed="rId2">
+            <a:extLst>
+              <a:ext uri="{28A0092B-C50C-407E-A947-70E740481C1C}">
+                <a14:useLocalDpi xmlns:a14="http://schemas.microsoft.com/office/drawing/2010/main" val="0"/>
+              </a:ext>
+            </a:extLst>
+          </a:blip>
+          <a:stretch>
+            <a:fillRect/>
+          </a:stretch>
+        </p:blipFill>
+        <p:spPr>
+          <a:xfrm>
+            <a:off x="10969210" y="718478"/>
+            <a:ext cx="769180" cy="618855"/>
+          </a:xfrm>
+          <a:prstGeom prst="rect">
+            <a:avLst/>
+          </a:prstGeom>
+        </p:spPr>
+      </p:pic>
+      <p:pic>
+        <p:nvPicPr>
+          <p:cNvPr id="5" name="Picture 2" descr="What is JavaScript?">
+            <a:extLst>
+              <a:ext uri="{FF2B5EF4-FFF2-40B4-BE49-F238E27FC236}">
+                <a16:creationId xmlns:a16="http://schemas.microsoft.com/office/drawing/2014/main" id="{412B9758-0D51-DE69-9ADC-AB805C1CD0C5}"/>
+              </a:ext>
+            </a:extLst>
+          </p:cNvPr>
+          <p:cNvPicPr>
+            <a:picLocks noGrp="1" noChangeAspect="1" noChangeArrowheads="1"/>
+          </p:cNvPicPr>
+          <p:nvPr>
+            <p:ph idx="1"/>
+          </p:nvPr>
+        </p:nvPicPr>
+        <p:blipFill>
+          <a:blip r:embed="rId3">
+            <a:extLst>
+              <a:ext uri="{28A0092B-C50C-407E-A947-70E740481C1C}">
+                <a14:useLocalDpi xmlns:a14="http://schemas.microsoft.com/office/drawing/2010/main" val="0"/>
+              </a:ext>
+            </a:extLst>
+          </a:blip>
+          <a:srcRect/>
+          <a:stretch>
+            <a:fillRect/>
+          </a:stretch>
+        </p:blipFill>
+        <p:spPr bwMode="auto">
+          <a:xfrm>
+            <a:off x="10763494" y="5653201"/>
+            <a:ext cx="857627" cy="857627"/>
+          </a:xfrm>
+          <a:prstGeom prst="rect">
+            <a:avLst/>
+          </a:prstGeom>
+          <a:noFill/>
+          <a:extLst>
+            <a:ext uri="{909E8E84-426E-40DD-AFC4-6F175D3DCCD1}">
+              <a14:hiddenFill xmlns:a14="http://schemas.microsoft.com/office/drawing/2010/main">
+                <a:solidFill>
+                  <a:srgbClr val="FFFFFF"/>
+                </a:solidFill>
+              </a14:hiddenFill>
+            </a:ext>
+          </a:extLst>
+        </p:spPr>
+      </p:pic>
+      <p:pic>
+        <p:nvPicPr>
+          <p:cNvPr id="7" name="Picture 6">
+            <a:extLst>
+              <a:ext uri="{FF2B5EF4-FFF2-40B4-BE49-F238E27FC236}">
+                <a16:creationId xmlns:a16="http://schemas.microsoft.com/office/drawing/2014/main" id="{365123AD-5BEB-4C0D-669E-2BCD9FAF5BD4}"/>
+              </a:ext>
+            </a:extLst>
+          </p:cNvPr>
+          <p:cNvPicPr>
+            <a:picLocks noChangeAspect="1"/>
+          </p:cNvPicPr>
+          <p:nvPr/>
+        </p:nvPicPr>
+        <p:blipFill>
+          <a:blip r:embed="rId4"/>
+          <a:stretch>
+            <a:fillRect/>
+          </a:stretch>
+        </p:blipFill>
+        <p:spPr>
+          <a:xfrm>
+            <a:off x="1090790" y="1337333"/>
+            <a:ext cx="10010420" cy="3667663"/>
+          </a:xfrm>
+          <a:prstGeom prst="rect">
+            <a:avLst/>
+          </a:prstGeom>
+        </p:spPr>
+      </p:pic>
     </p:spTree>
     <p:extLst>
       <p:ext uri="{BB962C8B-B14F-4D97-AF65-F5344CB8AC3E}">

</xml_diff>